<commit_message>
Datasheet complétée à 85%, manque les mesures et reste un paragraphe à rédiger
</commit_message>
<xml_diff>
--- a/Datasheet/Datasheet_capteur_2025.pptx
+++ b/Datasheet/Datasheet_capteur_2025.pptx
@@ -8,6 +8,8 @@
     <p:sldId id="256" r:id="rId2"/>
     <p:sldId id="257" r:id="rId3"/>
     <p:sldId id="258" r:id="rId4"/>
+    <p:sldId id="259" r:id="rId5"/>
+    <p:sldId id="260" r:id="rId6"/>
   </p:sldIdLst>
   <p:sldSz cx="6858000" cy="9906000" type="A4"/>
   <p:notesSz cx="6858000" cy="9144000"/>
@@ -3286,8 +3288,8 @@
         </p:nvSpPr>
         <p:spPr>
           <a:xfrm>
-            <a:off x="176213" y="2189873"/>
-            <a:ext cx="2857500" cy="1877437"/>
+            <a:off x="176212" y="2189873"/>
+            <a:ext cx="3603143" cy="1877437"/>
           </a:xfrm>
           <a:prstGeom prst="rect">
             <a:avLst/>
@@ -3322,37 +3324,37 @@
           <a:p>
             <a:r>
               <a:rPr lang="en-US" sz="1400" dirty="0"/>
-              <a:t>-Low power consumption</a:t>
+              <a:t>-Low power consumption (3V-5V)</a:t>
             </a:r>
           </a:p>
           <a:p>
             <a:r>
               <a:rPr lang="en-US" sz="1400" dirty="0"/>
-              <a:t>-Low cost</a:t>
+              <a:t>-Low cost </a:t>
             </a:r>
           </a:p>
           <a:p>
             <a:r>
               <a:rPr lang="en-US" sz="1400" dirty="0"/>
-              <a:t>-Light and small</a:t>
+              <a:t>-Light and small (10cm2)</a:t>
             </a:r>
           </a:p>
           <a:p>
             <a:r>
               <a:rPr lang="en-US" sz="1400" dirty="0"/>
-              <a:t>-Flexible </a:t>
+              <a:t>-Flexible and biodegradable</a:t>
             </a:r>
           </a:p>
           <a:p>
             <a:r>
               <a:rPr lang="en-US" sz="1400" dirty="0"/>
-              <a:t>-Easy-to-use </a:t>
+              <a:t>-Easy-to-use : plug and use</a:t>
             </a:r>
           </a:p>
           <a:p>
             <a:r>
               <a:rPr lang="en-US" sz="1400" dirty="0"/>
-              <a:t>-Environment friendly </a:t>
+              <a:t>-Easily replaceable and reproductible)</a:t>
             </a:r>
           </a:p>
           <a:p>
@@ -3381,8 +3383,8 @@
         </p:nvSpPr>
         <p:spPr>
           <a:xfrm>
-            <a:off x="221146" y="4159956"/>
-            <a:ext cx="2857500" cy="584775"/>
+            <a:off x="190207" y="4152848"/>
+            <a:ext cx="6681788" cy="4462760"/>
           </a:xfrm>
           <a:prstGeom prst="rect">
             <a:avLst/>
@@ -3410,16 +3412,76 @@
           </a:p>
           <a:p>
             <a:r>
-              <a:rPr lang="fr-FR" sz="1400" dirty="0" err="1">
-                <a:latin typeface="Arial" panose="020B0604020202020204" pitchFamily="34" charset="0"/>
-                <a:cs typeface="Arial" panose="020B0604020202020204" pitchFamily="34" charset="0"/>
-              </a:rPr>
-              <a:t>djf</a:t>
-            </a:r>
-            <a:endParaRPr lang="fr-FR" sz="1400" dirty="0">
-              <a:latin typeface="Arial" panose="020B0604020202020204" pitchFamily="34" charset="0"/>
-              <a:cs typeface="Arial" panose="020B0604020202020204" pitchFamily="34" charset="0"/>
-            </a:endParaRPr>
+              <a:rPr lang="en-US" sz="1400" dirty="0"/>
+              <a:t>The strain sensor was developed and made in the Applied Physics Department at the National Institute of Applied Sciences (INSA) of Toulouse, France. </a:t>
+            </a:r>
+          </a:p>
+          <a:p>
+            <a:endParaRPr lang="en-US" sz="1400" dirty="0"/>
+          </a:p>
+          <a:p>
+            <a:r>
+              <a:rPr lang="en-US" sz="1400" dirty="0"/>
+              <a:t>The sensor technology is based on </a:t>
+            </a:r>
+            <a:r>
+              <a:rPr lang="en-US" sz="1400" dirty="0" err="1"/>
+              <a:t>chemiresistor</a:t>
+            </a:r>
+            <a:r>
+              <a:rPr lang="en-US" sz="1400" dirty="0"/>
+              <a:t> properties of graphite found in the article  "</a:t>
+            </a:r>
+            <a:r>
+              <a:rPr lang="en-US" sz="1400" i="1" dirty="0"/>
+              <a:t>Pencil Drawn Strain Gauges and </a:t>
+            </a:r>
+            <a:r>
+              <a:rPr lang="en-US" sz="1400" i="1" dirty="0" err="1"/>
+              <a:t>Chemiresistors</a:t>
+            </a:r>
+            <a:r>
+              <a:rPr lang="en-US" sz="1400" i="1" dirty="0"/>
+              <a:t> on Paper</a:t>
+            </a:r>
+            <a:r>
+              <a:rPr lang="en-US" sz="1400" dirty="0"/>
+              <a:t>" published in 2014  by Cheng-Wei Lin, </a:t>
+            </a:r>
+            <a:r>
+              <a:rPr lang="en-US" sz="1400" dirty="0" err="1"/>
+              <a:t>Zhibo</a:t>
+            </a:r>
+            <a:r>
+              <a:rPr lang="en-US" sz="1400" dirty="0"/>
+              <a:t> Zhao, </a:t>
+            </a:r>
+            <a:r>
+              <a:rPr lang="en-US" sz="1400" dirty="0" err="1"/>
+              <a:t>Jaemyung</a:t>
+            </a:r>
+            <a:r>
+              <a:rPr lang="en-US" sz="1400" dirty="0"/>
+              <a:t> Kim, and Jiaxing Huang. The sensor can measure a resistance variation </a:t>
+            </a:r>
+          </a:p>
+          <a:p>
+            <a:endParaRPr lang="en-US" sz="1400" dirty="0"/>
+          </a:p>
+          <a:p>
+            <a:r>
+              <a:rPr lang="en-US" sz="1400" dirty="0"/>
+              <a:t>This sensor consists of a small piece of paper coated with a graphite layer from a pencil. It can measure a resistance variation when applying a strain. The deformation leads to a change of the number of connected graphite particles in the thin layer of graphite and so it changes the resistance of the sensor. This allows us to measure deformation, like a traditional strain gauge. </a:t>
+            </a:r>
+          </a:p>
+          <a:p>
+            <a:endParaRPr lang="en-US" sz="1400" dirty="0"/>
+          </a:p>
+          <a:p>
+            <a:r>
+              <a:rPr lang="en-US" sz="1400" dirty="0"/>
+              <a:t>The structure of the graphite layer varies depending on the type of pencil used. In order to fully understand the impact of the graphite structure on the variation of the resistance, we conducted tests with two types of pencils: HB (medium hardness) and 2B (softer). To achieve this, our sensors were coupled with a transimpedance amplifier and an Arduino Uno, all integrated on a PCB designed for tests. </a:t>
+            </a:r>
           </a:p>
         </p:txBody>
       </p:sp>
@@ -3437,8 +3499,8 @@
         </p:nvSpPr>
         <p:spPr>
           <a:xfrm>
-            <a:off x="125896" y="6775014"/>
-            <a:ext cx="2857500" cy="369332"/>
+            <a:off x="221145" y="8716447"/>
+            <a:ext cx="3558209" cy="369332"/>
           </a:xfrm>
           <a:prstGeom prst="rect">
             <a:avLst/>
@@ -3455,7 +3517,7 @@
               <a:rPr lang="fr-FR" b="1" u="sng" dirty="0">
                 <a:latin typeface="Abadi" panose="020B0604020104020204" pitchFamily="34" charset="0"/>
               </a:rPr>
-              <a:t>Pin configuration</a:t>
+              <a:t>Pin configuration and dimensions</a:t>
             </a:r>
             <a:r>
               <a:rPr lang="fr-FR" dirty="0">
@@ -3582,7 +3644,7 @@
         </p:nvSpPr>
         <p:spPr>
           <a:xfrm>
-            <a:off x="49696" y="3526989"/>
+            <a:off x="142564" y="5238322"/>
             <a:ext cx="2857500" cy="369332"/>
           </a:xfrm>
           <a:prstGeom prst="rect">
@@ -3637,7 +3699,7 @@
         </p:nvSpPr>
         <p:spPr>
           <a:xfrm>
-            <a:off x="221146" y="2288381"/>
+            <a:off x="125896" y="2905422"/>
             <a:ext cx="2857500" cy="369332"/>
           </a:xfrm>
           <a:prstGeom prst="rect">
@@ -3801,7 +3863,7 @@
         </p:nvSpPr>
         <p:spPr>
           <a:xfrm>
-            <a:off x="159233" y="4170284"/>
+            <a:off x="178216" y="8933789"/>
             <a:ext cx="2857500" cy="369332"/>
           </a:xfrm>
           <a:prstGeom prst="rect">
@@ -4019,6 +4081,2335 @@
           </a:p>
         </p:txBody>
       </p:sp>
+      <p:graphicFrame>
+        <p:nvGraphicFramePr>
+          <p:cNvPr id="18" name="Tableau 17">
+            <a:extLst>
+              <a:ext uri="{FF2B5EF4-FFF2-40B4-BE49-F238E27FC236}">
+                <a16:creationId xmlns:a16="http://schemas.microsoft.com/office/drawing/2014/main" id="{0B976A25-FBAD-5E1A-A7AB-963F823272E8}"/>
+              </a:ext>
+            </a:extLst>
+          </p:cNvPr>
+          <p:cNvGraphicFramePr>
+            <a:graphicFrameLocks noGrp="1"/>
+          </p:cNvGraphicFramePr>
+          <p:nvPr>
+            <p:extLst>
+              <p:ext uri="{D42A27DB-BD31-4B8C-83A1-F6EECF244321}">
+                <p14:modId xmlns:p14="http://schemas.microsoft.com/office/powerpoint/2010/main" val="446406124"/>
+              </p:ext>
+            </p:extLst>
+          </p:nvPr>
+        </p:nvGraphicFramePr>
+        <p:xfrm>
+          <a:off x="221146" y="5709415"/>
+          <a:ext cx="6274904" cy="3098800"/>
+        </p:xfrm>
+        <a:graphic>
+          <a:graphicData uri="http://schemas.openxmlformats.org/drawingml/2006/table">
+            <a:tbl>
+              <a:tblPr>
+                <a:tableStyleId>{073A0DAA-6AF3-43AB-8588-CEC1D06C72B9}</a:tableStyleId>
+              </a:tblPr>
+              <a:tblGrid>
+                <a:gridCol w="3137452">
+                  <a:extLst>
+                    <a:ext uri="{9D8B030D-6E8A-4147-A177-3AD203B41FA5}">
+                      <a16:colId xmlns:a16="http://schemas.microsoft.com/office/drawing/2014/main" val="1577052314"/>
+                    </a:ext>
+                  </a:extLst>
+                </a:gridCol>
+                <a:gridCol w="3137452">
+                  <a:extLst>
+                    <a:ext uri="{9D8B030D-6E8A-4147-A177-3AD203B41FA5}">
+                      <a16:colId xmlns:a16="http://schemas.microsoft.com/office/drawing/2014/main" val="2627660328"/>
+                    </a:ext>
+                  </a:extLst>
+                </a:gridCol>
+              </a:tblGrid>
+              <a:tr h="370840">
+                <a:tc>
+                  <a:txBody>
+                    <a:bodyPr/>
+                    <a:lstStyle/>
+                    <a:p>
+                      <a:pPr algn="ctr"/>
+                      <a:r>
+                        <a:rPr lang="fr-FR" dirty="0"/>
+                        <a:t>Type</a:t>
+                      </a:r>
+                    </a:p>
+                  </a:txBody>
+                  <a:tcPr>
+                    <a:lnL w="12700" cap="flat" cmpd="sng" algn="ctr">
+                      <a:solidFill>
+                        <a:schemeClr val="tx1"/>
+                      </a:solidFill>
+                      <a:prstDash val="solid"/>
+                      <a:round/>
+                      <a:headEnd type="none" w="med" len="med"/>
+                      <a:tailEnd type="none" w="med" len="med"/>
+                    </a:lnL>
+                    <a:lnR w="12700" cap="flat" cmpd="sng" algn="ctr">
+                      <a:solidFill>
+                        <a:schemeClr val="tx1"/>
+                      </a:solidFill>
+                      <a:prstDash val="solid"/>
+                      <a:round/>
+                      <a:headEnd type="none" w="med" len="med"/>
+                      <a:tailEnd type="none" w="med" len="med"/>
+                    </a:lnR>
+                    <a:lnT w="12700" cap="flat" cmpd="sng" algn="ctr">
+                      <a:solidFill>
+                        <a:schemeClr val="tx1"/>
+                      </a:solidFill>
+                      <a:prstDash val="solid"/>
+                      <a:round/>
+                      <a:headEnd type="none" w="med" len="med"/>
+                      <a:tailEnd type="none" w="med" len="med"/>
+                    </a:lnT>
+                    <a:lnB w="12700" cap="flat" cmpd="sng" algn="ctr">
+                      <a:solidFill>
+                        <a:schemeClr val="tx1"/>
+                      </a:solidFill>
+                      <a:prstDash val="solid"/>
+                      <a:round/>
+                      <a:headEnd type="none" w="med" len="med"/>
+                      <a:tailEnd type="none" w="med" len="med"/>
+                    </a:lnB>
+                    <a:solidFill>
+                      <a:schemeClr val="bg1">
+                        <a:lumMod val="75000"/>
+                      </a:schemeClr>
+                    </a:solidFill>
+                  </a:tcPr>
+                </a:tc>
+                <a:tc>
+                  <a:txBody>
+                    <a:bodyPr/>
+                    <a:lstStyle/>
+                    <a:p>
+                      <a:pPr algn="ctr"/>
+                      <a:r>
+                        <a:rPr lang="fr-FR" dirty="0" err="1"/>
+                        <a:t>Strain</a:t>
+                      </a:r>
+                      <a:r>
+                        <a:rPr lang="fr-FR" dirty="0"/>
+                        <a:t> </a:t>
+                      </a:r>
+                      <a:r>
+                        <a:rPr lang="fr-FR" dirty="0" err="1"/>
+                        <a:t>sensor</a:t>
+                      </a:r>
+                      <a:endParaRPr lang="fr-FR" dirty="0"/>
+                    </a:p>
+                  </a:txBody>
+                  <a:tcPr>
+                    <a:lnL w="12700" cap="flat" cmpd="sng" algn="ctr">
+                      <a:solidFill>
+                        <a:schemeClr val="tx1"/>
+                      </a:solidFill>
+                      <a:prstDash val="solid"/>
+                      <a:round/>
+                      <a:headEnd type="none" w="med" len="med"/>
+                      <a:tailEnd type="none" w="med" len="med"/>
+                    </a:lnL>
+                    <a:lnR w="12700" cap="flat" cmpd="sng" algn="ctr">
+                      <a:solidFill>
+                        <a:schemeClr val="tx1"/>
+                      </a:solidFill>
+                      <a:prstDash val="solid"/>
+                      <a:round/>
+                      <a:headEnd type="none" w="med" len="med"/>
+                      <a:tailEnd type="none" w="med" len="med"/>
+                    </a:lnR>
+                    <a:lnT w="12700" cap="flat" cmpd="sng" algn="ctr">
+                      <a:solidFill>
+                        <a:schemeClr val="tx1"/>
+                      </a:solidFill>
+                      <a:prstDash val="solid"/>
+                      <a:round/>
+                      <a:headEnd type="none" w="med" len="med"/>
+                      <a:tailEnd type="none" w="med" len="med"/>
+                    </a:lnT>
+                    <a:lnB w="12700" cap="flat" cmpd="sng" algn="ctr">
+                      <a:solidFill>
+                        <a:schemeClr val="tx1"/>
+                      </a:solidFill>
+                      <a:prstDash val="solid"/>
+                      <a:round/>
+                      <a:headEnd type="none" w="med" len="med"/>
+                      <a:tailEnd type="none" w="med" len="med"/>
+                    </a:lnB>
+                  </a:tcPr>
+                </a:tc>
+                <a:extLst>
+                  <a:ext uri="{0D108BD9-81ED-4DB2-BD59-A6C34878D82A}">
+                    <a16:rowId xmlns:a16="http://schemas.microsoft.com/office/drawing/2014/main" val="2366489648"/>
+                  </a:ext>
+                </a:extLst>
+              </a:tr>
+              <a:tr h="370840">
+                <a:tc>
+                  <a:txBody>
+                    <a:bodyPr/>
+                    <a:lstStyle/>
+                    <a:p>
+                      <a:pPr algn="ctr"/>
+                      <a:r>
+                        <a:rPr lang="fr-FR" dirty="0"/>
+                        <a:t>Materials</a:t>
+                      </a:r>
+                    </a:p>
+                  </a:txBody>
+                  <a:tcPr>
+                    <a:lnL w="12700" cap="flat" cmpd="sng" algn="ctr">
+                      <a:solidFill>
+                        <a:schemeClr val="tx1"/>
+                      </a:solidFill>
+                      <a:prstDash val="solid"/>
+                      <a:round/>
+                      <a:headEnd type="none" w="med" len="med"/>
+                      <a:tailEnd type="none" w="med" len="med"/>
+                    </a:lnL>
+                    <a:lnR w="12700" cap="flat" cmpd="sng" algn="ctr">
+                      <a:solidFill>
+                        <a:schemeClr val="tx1"/>
+                      </a:solidFill>
+                      <a:prstDash val="solid"/>
+                      <a:round/>
+                      <a:headEnd type="none" w="med" len="med"/>
+                      <a:tailEnd type="none" w="med" len="med"/>
+                    </a:lnR>
+                    <a:lnT w="12700" cap="flat" cmpd="sng" algn="ctr">
+                      <a:solidFill>
+                        <a:schemeClr val="tx1"/>
+                      </a:solidFill>
+                      <a:prstDash val="solid"/>
+                      <a:round/>
+                      <a:headEnd type="none" w="med" len="med"/>
+                      <a:tailEnd type="none" w="med" len="med"/>
+                    </a:lnT>
+                    <a:lnB w="12700" cap="flat" cmpd="sng" algn="ctr">
+                      <a:solidFill>
+                        <a:schemeClr val="tx1"/>
+                      </a:solidFill>
+                      <a:prstDash val="solid"/>
+                      <a:round/>
+                      <a:headEnd type="none" w="med" len="med"/>
+                      <a:tailEnd type="none" w="med" len="med"/>
+                    </a:lnB>
+                    <a:solidFill>
+                      <a:schemeClr val="bg1">
+                        <a:lumMod val="75000"/>
+                      </a:schemeClr>
+                    </a:solidFill>
+                  </a:tcPr>
+                </a:tc>
+                <a:tc>
+                  <a:txBody>
+                    <a:bodyPr/>
+                    <a:lstStyle/>
+                    <a:p>
+                      <a:pPr algn="ctr"/>
+                      <a:r>
+                        <a:rPr lang="fr-FR" dirty="0"/>
+                        <a:t>Graphite (4B to 2H graphite </a:t>
+                      </a:r>
+                      <a:r>
+                        <a:rPr lang="fr-FR" dirty="0" err="1"/>
+                        <a:t>pencil</a:t>
+                      </a:r>
+                      <a:r>
+                        <a:rPr lang="fr-FR" dirty="0"/>
+                        <a:t>)</a:t>
+                      </a:r>
+                    </a:p>
+                  </a:txBody>
+                  <a:tcPr>
+                    <a:lnL w="12700" cap="flat" cmpd="sng" algn="ctr">
+                      <a:solidFill>
+                        <a:schemeClr val="tx1"/>
+                      </a:solidFill>
+                      <a:prstDash val="solid"/>
+                      <a:round/>
+                      <a:headEnd type="none" w="med" len="med"/>
+                      <a:tailEnd type="none" w="med" len="med"/>
+                    </a:lnL>
+                    <a:lnR w="12700" cap="flat" cmpd="sng" algn="ctr">
+                      <a:solidFill>
+                        <a:schemeClr val="tx1"/>
+                      </a:solidFill>
+                      <a:prstDash val="solid"/>
+                      <a:round/>
+                      <a:headEnd type="none" w="med" len="med"/>
+                      <a:tailEnd type="none" w="med" len="med"/>
+                    </a:lnR>
+                    <a:lnT w="12700" cap="flat" cmpd="sng" algn="ctr">
+                      <a:solidFill>
+                        <a:schemeClr val="tx1"/>
+                      </a:solidFill>
+                      <a:prstDash val="solid"/>
+                      <a:round/>
+                      <a:headEnd type="none" w="med" len="med"/>
+                      <a:tailEnd type="none" w="med" len="med"/>
+                    </a:lnT>
+                    <a:lnB w="12700" cap="flat" cmpd="sng" algn="ctr">
+                      <a:solidFill>
+                        <a:schemeClr val="tx1"/>
+                      </a:solidFill>
+                      <a:prstDash val="solid"/>
+                      <a:round/>
+                      <a:headEnd type="none" w="med" len="med"/>
+                      <a:tailEnd type="none" w="med" len="med"/>
+                    </a:lnB>
+                  </a:tcPr>
+                </a:tc>
+                <a:extLst>
+                  <a:ext uri="{0D108BD9-81ED-4DB2-BD59-A6C34878D82A}">
+                    <a16:rowId xmlns:a16="http://schemas.microsoft.com/office/drawing/2014/main" val="398796235"/>
+                  </a:ext>
+                </a:extLst>
+              </a:tr>
+              <a:tr h="370840">
+                <a:tc>
+                  <a:txBody>
+                    <a:bodyPr/>
+                    <a:lstStyle/>
+                    <a:p>
+                      <a:pPr algn="ctr"/>
+                      <a:r>
+                        <a:rPr lang="fr-FR" dirty="0" err="1"/>
+                        <a:t>Sensor</a:t>
+                      </a:r>
+                      <a:r>
+                        <a:rPr lang="fr-FR" dirty="0"/>
+                        <a:t> type</a:t>
+                      </a:r>
+                    </a:p>
+                  </a:txBody>
+                  <a:tcPr>
+                    <a:lnL w="12700" cap="flat" cmpd="sng" algn="ctr">
+                      <a:solidFill>
+                        <a:schemeClr val="tx1"/>
+                      </a:solidFill>
+                      <a:prstDash val="solid"/>
+                      <a:round/>
+                      <a:headEnd type="none" w="med" len="med"/>
+                      <a:tailEnd type="none" w="med" len="med"/>
+                    </a:lnL>
+                    <a:lnR w="12700" cap="flat" cmpd="sng" algn="ctr">
+                      <a:solidFill>
+                        <a:schemeClr val="tx1"/>
+                      </a:solidFill>
+                      <a:prstDash val="solid"/>
+                      <a:round/>
+                      <a:headEnd type="none" w="med" len="med"/>
+                      <a:tailEnd type="none" w="med" len="med"/>
+                    </a:lnR>
+                    <a:lnT w="12700" cap="flat" cmpd="sng" algn="ctr">
+                      <a:solidFill>
+                        <a:schemeClr val="tx1"/>
+                      </a:solidFill>
+                      <a:prstDash val="solid"/>
+                      <a:round/>
+                      <a:headEnd type="none" w="med" len="med"/>
+                      <a:tailEnd type="none" w="med" len="med"/>
+                    </a:lnT>
+                    <a:lnB w="12700" cap="flat" cmpd="sng" algn="ctr">
+                      <a:solidFill>
+                        <a:schemeClr val="tx1"/>
+                      </a:solidFill>
+                      <a:prstDash val="solid"/>
+                      <a:round/>
+                      <a:headEnd type="none" w="med" len="med"/>
+                      <a:tailEnd type="none" w="med" len="med"/>
+                    </a:lnB>
+                    <a:solidFill>
+                      <a:schemeClr val="bg1">
+                        <a:lumMod val="75000"/>
+                      </a:schemeClr>
+                    </a:solidFill>
+                  </a:tcPr>
+                </a:tc>
+                <a:tc>
+                  <a:txBody>
+                    <a:bodyPr/>
+                    <a:lstStyle/>
+                    <a:p>
+                      <a:pPr algn="ctr"/>
+                      <a:r>
+                        <a:rPr lang="fr-FR" dirty="0"/>
+                        <a:t>Passive: Power </a:t>
+                      </a:r>
+                      <a:r>
+                        <a:rPr lang="fr-FR" dirty="0" err="1"/>
+                        <a:t>suply</a:t>
+                      </a:r>
+                      <a:r>
+                        <a:rPr lang="fr-FR" dirty="0"/>
+                        <a:t> </a:t>
+                      </a:r>
+                      <a:r>
+                        <a:rPr lang="fr-FR" dirty="0" err="1"/>
+                        <a:t>required</a:t>
+                      </a:r>
+                      <a:r>
+                        <a:rPr lang="fr-FR" dirty="0"/>
+                        <a:t> </a:t>
+                      </a:r>
+                    </a:p>
+                  </a:txBody>
+                  <a:tcPr>
+                    <a:lnL w="12700" cap="flat" cmpd="sng" algn="ctr">
+                      <a:solidFill>
+                        <a:schemeClr val="tx1"/>
+                      </a:solidFill>
+                      <a:prstDash val="solid"/>
+                      <a:round/>
+                      <a:headEnd type="none" w="med" len="med"/>
+                      <a:tailEnd type="none" w="med" len="med"/>
+                    </a:lnL>
+                    <a:lnR w="12700" cap="flat" cmpd="sng" algn="ctr">
+                      <a:solidFill>
+                        <a:schemeClr val="tx1"/>
+                      </a:solidFill>
+                      <a:prstDash val="solid"/>
+                      <a:round/>
+                      <a:headEnd type="none" w="med" len="med"/>
+                      <a:tailEnd type="none" w="med" len="med"/>
+                    </a:lnR>
+                    <a:lnT w="12700" cap="flat" cmpd="sng" algn="ctr">
+                      <a:solidFill>
+                        <a:schemeClr val="tx1"/>
+                      </a:solidFill>
+                      <a:prstDash val="solid"/>
+                      <a:round/>
+                      <a:headEnd type="none" w="med" len="med"/>
+                      <a:tailEnd type="none" w="med" len="med"/>
+                    </a:lnT>
+                    <a:lnB w="12700" cap="flat" cmpd="sng" algn="ctr">
+                      <a:solidFill>
+                        <a:schemeClr val="tx1"/>
+                      </a:solidFill>
+                      <a:prstDash val="solid"/>
+                      <a:round/>
+                      <a:headEnd type="none" w="med" len="med"/>
+                      <a:tailEnd type="none" w="med" len="med"/>
+                    </a:lnB>
+                  </a:tcPr>
+                </a:tc>
+                <a:extLst>
+                  <a:ext uri="{0D108BD9-81ED-4DB2-BD59-A6C34878D82A}">
+                    <a16:rowId xmlns:a16="http://schemas.microsoft.com/office/drawing/2014/main" val="3125264454"/>
+                  </a:ext>
+                </a:extLst>
+              </a:tr>
+              <a:tr h="370840">
+                <a:tc>
+                  <a:txBody>
+                    <a:bodyPr/>
+                    <a:lstStyle/>
+                    <a:p>
+                      <a:pPr algn="ctr"/>
+                      <a:r>
+                        <a:rPr lang="fr-FR" dirty="0"/>
+                        <a:t>Power </a:t>
+                      </a:r>
+                      <a:r>
+                        <a:rPr lang="fr-FR" dirty="0" err="1"/>
+                        <a:t>supply</a:t>
+                      </a:r>
+                      <a:endParaRPr lang="fr-FR" dirty="0"/>
+                    </a:p>
+                  </a:txBody>
+                  <a:tcPr>
+                    <a:lnL w="12700" cap="flat" cmpd="sng" algn="ctr">
+                      <a:solidFill>
+                        <a:schemeClr val="tx1"/>
+                      </a:solidFill>
+                      <a:prstDash val="solid"/>
+                      <a:round/>
+                      <a:headEnd type="none" w="med" len="med"/>
+                      <a:tailEnd type="none" w="med" len="med"/>
+                    </a:lnL>
+                    <a:lnR w="12700" cap="flat" cmpd="sng" algn="ctr">
+                      <a:solidFill>
+                        <a:schemeClr val="tx1"/>
+                      </a:solidFill>
+                      <a:prstDash val="solid"/>
+                      <a:round/>
+                      <a:headEnd type="none" w="med" len="med"/>
+                      <a:tailEnd type="none" w="med" len="med"/>
+                    </a:lnR>
+                    <a:lnT w="12700" cap="flat" cmpd="sng" algn="ctr">
+                      <a:solidFill>
+                        <a:schemeClr val="tx1"/>
+                      </a:solidFill>
+                      <a:prstDash val="solid"/>
+                      <a:round/>
+                      <a:headEnd type="none" w="med" len="med"/>
+                      <a:tailEnd type="none" w="med" len="med"/>
+                    </a:lnT>
+                    <a:lnB w="12700" cap="flat" cmpd="sng" algn="ctr">
+                      <a:solidFill>
+                        <a:schemeClr val="tx1"/>
+                      </a:solidFill>
+                      <a:prstDash val="solid"/>
+                      <a:round/>
+                      <a:headEnd type="none" w="med" len="med"/>
+                      <a:tailEnd type="none" w="med" len="med"/>
+                    </a:lnB>
+                    <a:solidFill>
+                      <a:schemeClr val="bg1">
+                        <a:lumMod val="75000"/>
+                      </a:schemeClr>
+                    </a:solidFill>
+                  </a:tcPr>
+                </a:tc>
+                <a:tc>
+                  <a:txBody>
+                    <a:bodyPr/>
+                    <a:lstStyle/>
+                    <a:p>
+                      <a:pPr algn="ctr"/>
+                      <a:r>
+                        <a:rPr lang="fr-FR" dirty="0"/>
+                        <a:t>Vcc=+5V</a:t>
+                      </a:r>
+                    </a:p>
+                  </a:txBody>
+                  <a:tcPr>
+                    <a:lnL w="12700" cap="flat" cmpd="sng" algn="ctr">
+                      <a:solidFill>
+                        <a:schemeClr val="tx1"/>
+                      </a:solidFill>
+                      <a:prstDash val="solid"/>
+                      <a:round/>
+                      <a:headEnd type="none" w="med" len="med"/>
+                      <a:tailEnd type="none" w="med" len="med"/>
+                    </a:lnL>
+                    <a:lnR w="12700" cap="flat" cmpd="sng" algn="ctr">
+                      <a:solidFill>
+                        <a:schemeClr val="tx1"/>
+                      </a:solidFill>
+                      <a:prstDash val="solid"/>
+                      <a:round/>
+                      <a:headEnd type="none" w="med" len="med"/>
+                      <a:tailEnd type="none" w="med" len="med"/>
+                    </a:lnR>
+                    <a:lnT w="12700" cap="flat" cmpd="sng" algn="ctr">
+                      <a:solidFill>
+                        <a:schemeClr val="tx1"/>
+                      </a:solidFill>
+                      <a:prstDash val="solid"/>
+                      <a:round/>
+                      <a:headEnd type="none" w="med" len="med"/>
+                      <a:tailEnd type="none" w="med" len="med"/>
+                    </a:lnT>
+                    <a:lnB w="12700" cap="flat" cmpd="sng" algn="ctr">
+                      <a:solidFill>
+                        <a:schemeClr val="tx1"/>
+                      </a:solidFill>
+                      <a:prstDash val="solid"/>
+                      <a:round/>
+                      <a:headEnd type="none" w="med" len="med"/>
+                      <a:tailEnd type="none" w="med" len="med"/>
+                    </a:lnB>
+                  </a:tcPr>
+                </a:tc>
+                <a:extLst>
+                  <a:ext uri="{0D108BD9-81ED-4DB2-BD59-A6C34878D82A}">
+                    <a16:rowId xmlns:a16="http://schemas.microsoft.com/office/drawing/2014/main" val="1546417385"/>
+                  </a:ext>
+                </a:extLst>
+              </a:tr>
+              <a:tr h="370840">
+                <a:tc>
+                  <a:txBody>
+                    <a:bodyPr/>
+                    <a:lstStyle/>
+                    <a:p>
+                      <a:pPr algn="ctr"/>
+                      <a:r>
+                        <a:rPr lang="fr-FR" dirty="0"/>
+                        <a:t>Nature of output signal</a:t>
+                      </a:r>
+                    </a:p>
+                  </a:txBody>
+                  <a:tcPr>
+                    <a:lnL w="12700" cap="flat" cmpd="sng" algn="ctr">
+                      <a:solidFill>
+                        <a:schemeClr val="tx1"/>
+                      </a:solidFill>
+                      <a:prstDash val="solid"/>
+                      <a:round/>
+                      <a:headEnd type="none" w="med" len="med"/>
+                      <a:tailEnd type="none" w="med" len="med"/>
+                    </a:lnL>
+                    <a:lnR w="12700" cap="flat" cmpd="sng" algn="ctr">
+                      <a:solidFill>
+                        <a:schemeClr val="tx1"/>
+                      </a:solidFill>
+                      <a:prstDash val="solid"/>
+                      <a:round/>
+                      <a:headEnd type="none" w="med" len="med"/>
+                      <a:tailEnd type="none" w="med" len="med"/>
+                    </a:lnR>
+                    <a:lnT w="12700" cap="flat" cmpd="sng" algn="ctr">
+                      <a:solidFill>
+                        <a:schemeClr val="tx1"/>
+                      </a:solidFill>
+                      <a:prstDash val="solid"/>
+                      <a:round/>
+                      <a:headEnd type="none" w="med" len="med"/>
+                      <a:tailEnd type="none" w="med" len="med"/>
+                    </a:lnT>
+                    <a:lnB w="12700" cap="flat" cmpd="sng" algn="ctr">
+                      <a:solidFill>
+                        <a:schemeClr val="tx1"/>
+                      </a:solidFill>
+                      <a:prstDash val="solid"/>
+                      <a:round/>
+                      <a:headEnd type="none" w="med" len="med"/>
+                      <a:tailEnd type="none" w="med" len="med"/>
+                    </a:lnB>
+                    <a:solidFill>
+                      <a:schemeClr val="bg1">
+                        <a:lumMod val="75000"/>
+                      </a:schemeClr>
+                    </a:solidFill>
+                  </a:tcPr>
+                </a:tc>
+                <a:tc>
+                  <a:txBody>
+                    <a:bodyPr/>
+                    <a:lstStyle/>
+                    <a:p>
+                      <a:pPr algn="ctr"/>
+                      <a:r>
+                        <a:rPr lang="fr-FR" dirty="0" err="1"/>
+                        <a:t>Analog</a:t>
+                      </a:r>
+                      <a:endParaRPr lang="fr-FR" dirty="0"/>
+                    </a:p>
+                  </a:txBody>
+                  <a:tcPr>
+                    <a:lnL w="12700" cap="flat" cmpd="sng" algn="ctr">
+                      <a:solidFill>
+                        <a:schemeClr val="tx1"/>
+                      </a:solidFill>
+                      <a:prstDash val="solid"/>
+                      <a:round/>
+                      <a:headEnd type="none" w="med" len="med"/>
+                      <a:tailEnd type="none" w="med" len="med"/>
+                    </a:lnL>
+                    <a:lnR w="12700" cap="flat" cmpd="sng" algn="ctr">
+                      <a:solidFill>
+                        <a:schemeClr val="tx1"/>
+                      </a:solidFill>
+                      <a:prstDash val="solid"/>
+                      <a:round/>
+                      <a:headEnd type="none" w="med" len="med"/>
+                      <a:tailEnd type="none" w="med" len="med"/>
+                    </a:lnR>
+                    <a:lnT w="12700" cap="flat" cmpd="sng" algn="ctr">
+                      <a:solidFill>
+                        <a:schemeClr val="tx1"/>
+                      </a:solidFill>
+                      <a:prstDash val="solid"/>
+                      <a:round/>
+                      <a:headEnd type="none" w="med" len="med"/>
+                      <a:tailEnd type="none" w="med" len="med"/>
+                    </a:lnT>
+                    <a:lnB w="12700" cap="flat" cmpd="sng" algn="ctr">
+                      <a:solidFill>
+                        <a:schemeClr val="tx1"/>
+                      </a:solidFill>
+                      <a:prstDash val="solid"/>
+                      <a:round/>
+                      <a:headEnd type="none" w="med" len="med"/>
+                      <a:tailEnd type="none" w="med" len="med"/>
+                    </a:lnB>
+                  </a:tcPr>
+                </a:tc>
+                <a:extLst>
+                  <a:ext uri="{0D108BD9-81ED-4DB2-BD59-A6C34878D82A}">
+                    <a16:rowId xmlns:a16="http://schemas.microsoft.com/office/drawing/2014/main" val="3728315334"/>
+                  </a:ext>
+                </a:extLst>
+              </a:tr>
+              <a:tr h="370840">
+                <a:tc>
+                  <a:txBody>
+                    <a:bodyPr/>
+                    <a:lstStyle/>
+                    <a:p>
+                      <a:pPr algn="ctr"/>
+                      <a:r>
+                        <a:rPr lang="fr-FR" dirty="0"/>
+                        <a:t>Nature of </a:t>
+                      </a:r>
+                      <a:r>
+                        <a:rPr lang="fr-FR" dirty="0" err="1"/>
+                        <a:t>measurand</a:t>
+                      </a:r>
+                      <a:endParaRPr lang="fr-FR" dirty="0"/>
+                    </a:p>
+                  </a:txBody>
+                  <a:tcPr>
+                    <a:lnL w="12700" cap="flat" cmpd="sng" algn="ctr">
+                      <a:solidFill>
+                        <a:schemeClr val="tx1"/>
+                      </a:solidFill>
+                      <a:prstDash val="solid"/>
+                      <a:round/>
+                      <a:headEnd type="none" w="med" len="med"/>
+                      <a:tailEnd type="none" w="med" len="med"/>
+                    </a:lnL>
+                    <a:lnR w="12700" cap="flat" cmpd="sng" algn="ctr">
+                      <a:solidFill>
+                        <a:schemeClr val="tx1"/>
+                      </a:solidFill>
+                      <a:prstDash val="solid"/>
+                      <a:round/>
+                      <a:headEnd type="none" w="med" len="med"/>
+                      <a:tailEnd type="none" w="med" len="med"/>
+                    </a:lnR>
+                    <a:lnT w="12700" cap="flat" cmpd="sng" algn="ctr">
+                      <a:solidFill>
+                        <a:schemeClr val="tx1"/>
+                      </a:solidFill>
+                      <a:prstDash val="solid"/>
+                      <a:round/>
+                      <a:headEnd type="none" w="med" len="med"/>
+                      <a:tailEnd type="none" w="med" len="med"/>
+                    </a:lnT>
+                    <a:lnB w="12700" cap="flat" cmpd="sng" algn="ctr">
+                      <a:solidFill>
+                        <a:schemeClr val="tx1"/>
+                      </a:solidFill>
+                      <a:prstDash val="solid"/>
+                      <a:round/>
+                      <a:headEnd type="none" w="med" len="med"/>
+                      <a:tailEnd type="none" w="med" len="med"/>
+                    </a:lnB>
+                    <a:solidFill>
+                      <a:schemeClr val="bg1">
+                        <a:lumMod val="75000"/>
+                      </a:schemeClr>
+                    </a:solidFill>
+                  </a:tcPr>
+                </a:tc>
+                <a:tc>
+                  <a:txBody>
+                    <a:bodyPr/>
+                    <a:lstStyle/>
+                    <a:p>
+                      <a:pPr algn="ctr"/>
+                      <a:r>
+                        <a:rPr lang="fr-FR" dirty="0"/>
+                        <a:t>Voltage</a:t>
+                      </a:r>
+                    </a:p>
+                  </a:txBody>
+                  <a:tcPr>
+                    <a:lnL w="12700" cap="flat" cmpd="sng" algn="ctr">
+                      <a:solidFill>
+                        <a:schemeClr val="tx1"/>
+                      </a:solidFill>
+                      <a:prstDash val="solid"/>
+                      <a:round/>
+                      <a:headEnd type="none" w="med" len="med"/>
+                      <a:tailEnd type="none" w="med" len="med"/>
+                    </a:lnL>
+                    <a:lnR w="12700" cap="flat" cmpd="sng" algn="ctr">
+                      <a:solidFill>
+                        <a:schemeClr val="tx1"/>
+                      </a:solidFill>
+                      <a:prstDash val="solid"/>
+                      <a:round/>
+                      <a:headEnd type="none" w="med" len="med"/>
+                      <a:tailEnd type="none" w="med" len="med"/>
+                    </a:lnR>
+                    <a:lnT w="12700" cap="flat" cmpd="sng" algn="ctr">
+                      <a:solidFill>
+                        <a:schemeClr val="tx1"/>
+                      </a:solidFill>
+                      <a:prstDash val="solid"/>
+                      <a:round/>
+                      <a:headEnd type="none" w="med" len="med"/>
+                      <a:tailEnd type="none" w="med" len="med"/>
+                    </a:lnT>
+                    <a:lnB w="12700" cap="flat" cmpd="sng" algn="ctr">
+                      <a:solidFill>
+                        <a:schemeClr val="tx1"/>
+                      </a:solidFill>
+                      <a:prstDash val="solid"/>
+                      <a:round/>
+                      <a:headEnd type="none" w="med" len="med"/>
+                      <a:tailEnd type="none" w="med" len="med"/>
+                    </a:lnB>
+                  </a:tcPr>
+                </a:tc>
+                <a:extLst>
+                  <a:ext uri="{0D108BD9-81ED-4DB2-BD59-A6C34878D82A}">
+                    <a16:rowId xmlns:a16="http://schemas.microsoft.com/office/drawing/2014/main" val="3844440029"/>
+                  </a:ext>
+                </a:extLst>
+              </a:tr>
+              <a:tr h="370840">
+                <a:tc>
+                  <a:txBody>
+                    <a:bodyPr/>
+                    <a:lstStyle/>
+                    <a:p>
+                      <a:pPr algn="ctr"/>
+                      <a:r>
+                        <a:rPr lang="fr-FR" dirty="0" err="1"/>
+                        <a:t>Typical</a:t>
+                      </a:r>
+                      <a:r>
+                        <a:rPr lang="fr-FR" dirty="0"/>
+                        <a:t> </a:t>
+                      </a:r>
+                      <a:r>
+                        <a:rPr lang="fr-FR" dirty="0" err="1"/>
+                        <a:t>response</a:t>
+                      </a:r>
+                      <a:r>
+                        <a:rPr lang="fr-FR" dirty="0"/>
+                        <a:t> time</a:t>
+                      </a:r>
+                    </a:p>
+                  </a:txBody>
+                  <a:tcPr>
+                    <a:lnL w="12700" cap="flat" cmpd="sng" algn="ctr">
+                      <a:solidFill>
+                        <a:schemeClr val="tx1"/>
+                      </a:solidFill>
+                      <a:prstDash val="solid"/>
+                      <a:round/>
+                      <a:headEnd type="none" w="med" len="med"/>
+                      <a:tailEnd type="none" w="med" len="med"/>
+                    </a:lnL>
+                    <a:lnR w="12700" cap="flat" cmpd="sng" algn="ctr">
+                      <a:solidFill>
+                        <a:schemeClr val="tx1"/>
+                      </a:solidFill>
+                      <a:prstDash val="solid"/>
+                      <a:round/>
+                      <a:headEnd type="none" w="med" len="med"/>
+                      <a:tailEnd type="none" w="med" len="med"/>
+                    </a:lnR>
+                    <a:lnT w="12700" cap="flat" cmpd="sng" algn="ctr">
+                      <a:solidFill>
+                        <a:schemeClr val="tx1"/>
+                      </a:solidFill>
+                      <a:prstDash val="solid"/>
+                      <a:round/>
+                      <a:headEnd type="none" w="med" len="med"/>
+                      <a:tailEnd type="none" w="med" len="med"/>
+                    </a:lnT>
+                    <a:lnB w="12700" cap="flat" cmpd="sng" algn="ctr">
+                      <a:solidFill>
+                        <a:schemeClr val="tx1"/>
+                      </a:solidFill>
+                      <a:prstDash val="solid"/>
+                      <a:round/>
+                      <a:headEnd type="none" w="med" len="med"/>
+                      <a:tailEnd type="none" w="med" len="med"/>
+                    </a:lnB>
+                    <a:solidFill>
+                      <a:schemeClr val="bg1">
+                        <a:lumMod val="75000"/>
+                      </a:schemeClr>
+                    </a:solidFill>
+                  </a:tcPr>
+                </a:tc>
+                <a:tc>
+                  <a:txBody>
+                    <a:bodyPr/>
+                    <a:lstStyle/>
+                    <a:p>
+                      <a:pPr algn="ctr"/>
+                      <a:r>
+                        <a:rPr lang="fr-FR" dirty="0" err="1"/>
+                        <a:t>Less</a:t>
+                      </a:r>
+                      <a:r>
+                        <a:rPr lang="fr-FR" dirty="0"/>
+                        <a:t> </a:t>
+                      </a:r>
+                      <a:r>
+                        <a:rPr lang="fr-FR" dirty="0" err="1"/>
+                        <a:t>than</a:t>
+                      </a:r>
+                      <a:r>
+                        <a:rPr lang="fr-FR" dirty="0"/>
+                        <a:t> 50 ms</a:t>
+                      </a:r>
+                    </a:p>
+                  </a:txBody>
+                  <a:tcPr>
+                    <a:lnL w="12700" cap="flat" cmpd="sng" algn="ctr">
+                      <a:solidFill>
+                        <a:schemeClr val="tx1"/>
+                      </a:solidFill>
+                      <a:prstDash val="solid"/>
+                      <a:round/>
+                      <a:headEnd type="none" w="med" len="med"/>
+                      <a:tailEnd type="none" w="med" len="med"/>
+                    </a:lnL>
+                    <a:lnR w="12700" cap="flat" cmpd="sng" algn="ctr">
+                      <a:solidFill>
+                        <a:schemeClr val="tx1"/>
+                      </a:solidFill>
+                      <a:prstDash val="solid"/>
+                      <a:round/>
+                      <a:headEnd type="none" w="med" len="med"/>
+                      <a:tailEnd type="none" w="med" len="med"/>
+                    </a:lnR>
+                    <a:lnT w="12700" cap="flat" cmpd="sng" algn="ctr">
+                      <a:solidFill>
+                        <a:schemeClr val="tx1"/>
+                      </a:solidFill>
+                      <a:prstDash val="solid"/>
+                      <a:round/>
+                      <a:headEnd type="none" w="med" len="med"/>
+                      <a:tailEnd type="none" w="med" len="med"/>
+                    </a:lnT>
+                    <a:lnB w="12700" cap="flat" cmpd="sng" algn="ctr">
+                      <a:solidFill>
+                        <a:schemeClr val="tx1"/>
+                      </a:solidFill>
+                      <a:prstDash val="solid"/>
+                      <a:round/>
+                      <a:headEnd type="none" w="med" len="med"/>
+                      <a:tailEnd type="none" w="med" len="med"/>
+                    </a:lnB>
+                  </a:tcPr>
+                </a:tc>
+                <a:extLst>
+                  <a:ext uri="{0D108BD9-81ED-4DB2-BD59-A6C34878D82A}">
+                    <a16:rowId xmlns:a16="http://schemas.microsoft.com/office/drawing/2014/main" val="532409427"/>
+                  </a:ext>
+                </a:extLst>
+              </a:tr>
+              <a:tr h="370840">
+                <a:tc>
+                  <a:txBody>
+                    <a:bodyPr/>
+                    <a:lstStyle/>
+                    <a:p>
+                      <a:pPr algn="ctr"/>
+                      <a:r>
+                        <a:rPr lang="fr-FR" dirty="0" err="1"/>
+                        <a:t>Typical</a:t>
+                      </a:r>
+                      <a:r>
+                        <a:rPr lang="fr-FR" dirty="0"/>
+                        <a:t> use</a:t>
+                      </a:r>
+                    </a:p>
+                  </a:txBody>
+                  <a:tcPr>
+                    <a:lnL w="12700" cap="flat" cmpd="sng" algn="ctr">
+                      <a:solidFill>
+                        <a:schemeClr val="tx1"/>
+                      </a:solidFill>
+                      <a:prstDash val="solid"/>
+                      <a:round/>
+                      <a:headEnd type="none" w="med" len="med"/>
+                      <a:tailEnd type="none" w="med" len="med"/>
+                    </a:lnL>
+                    <a:lnR w="12700" cap="flat" cmpd="sng" algn="ctr">
+                      <a:solidFill>
+                        <a:schemeClr val="tx1"/>
+                      </a:solidFill>
+                      <a:prstDash val="solid"/>
+                      <a:round/>
+                      <a:headEnd type="none" w="med" len="med"/>
+                      <a:tailEnd type="none" w="med" len="med"/>
+                    </a:lnR>
+                    <a:lnT w="12700" cap="flat" cmpd="sng" algn="ctr">
+                      <a:solidFill>
+                        <a:schemeClr val="tx1"/>
+                      </a:solidFill>
+                      <a:prstDash val="solid"/>
+                      <a:round/>
+                      <a:headEnd type="none" w="med" len="med"/>
+                      <a:tailEnd type="none" w="med" len="med"/>
+                    </a:lnT>
+                    <a:lnB w="12700" cap="flat" cmpd="sng" algn="ctr">
+                      <a:solidFill>
+                        <a:schemeClr val="tx1"/>
+                      </a:solidFill>
+                      <a:prstDash val="solid"/>
+                      <a:round/>
+                      <a:headEnd type="none" w="med" len="med"/>
+                      <a:tailEnd type="none" w="med" len="med"/>
+                    </a:lnB>
+                    <a:solidFill>
+                      <a:schemeClr val="bg1">
+                        <a:lumMod val="75000"/>
+                      </a:schemeClr>
+                    </a:solidFill>
+                  </a:tcPr>
+                </a:tc>
+                <a:tc>
+                  <a:txBody>
+                    <a:bodyPr/>
+                    <a:lstStyle/>
+                    <a:p>
+                      <a:pPr algn="ctr"/>
+                      <a:r>
+                        <a:rPr lang="fr-FR" dirty="0" err="1"/>
+                        <a:t>Measurement</a:t>
+                      </a:r>
+                      <a:r>
+                        <a:rPr lang="fr-FR" dirty="0"/>
+                        <a:t> of compression </a:t>
+                      </a:r>
+                      <a:r>
+                        <a:rPr lang="fr-FR" dirty="0" err="1"/>
+                        <a:t>deformation</a:t>
+                      </a:r>
+                      <a:endParaRPr lang="fr-FR" dirty="0"/>
+                    </a:p>
+                  </a:txBody>
+                  <a:tcPr>
+                    <a:lnL w="12700" cap="flat" cmpd="sng" algn="ctr">
+                      <a:solidFill>
+                        <a:schemeClr val="tx1"/>
+                      </a:solidFill>
+                      <a:prstDash val="solid"/>
+                      <a:round/>
+                      <a:headEnd type="none" w="med" len="med"/>
+                      <a:tailEnd type="none" w="med" len="med"/>
+                    </a:lnL>
+                    <a:lnR w="12700" cap="flat" cmpd="sng" algn="ctr">
+                      <a:solidFill>
+                        <a:schemeClr val="tx1"/>
+                      </a:solidFill>
+                      <a:prstDash val="solid"/>
+                      <a:round/>
+                      <a:headEnd type="none" w="med" len="med"/>
+                      <a:tailEnd type="none" w="med" len="med"/>
+                    </a:lnR>
+                    <a:lnT w="12700" cap="flat" cmpd="sng" algn="ctr">
+                      <a:solidFill>
+                        <a:schemeClr val="tx1"/>
+                      </a:solidFill>
+                      <a:prstDash val="solid"/>
+                      <a:round/>
+                      <a:headEnd type="none" w="med" len="med"/>
+                      <a:tailEnd type="none" w="med" len="med"/>
+                    </a:lnT>
+                    <a:lnB w="12700" cap="flat" cmpd="sng" algn="ctr">
+                      <a:solidFill>
+                        <a:schemeClr val="tx1"/>
+                      </a:solidFill>
+                      <a:prstDash val="solid"/>
+                      <a:round/>
+                      <a:headEnd type="none" w="med" len="med"/>
+                      <a:tailEnd type="none" w="med" len="med"/>
+                    </a:lnB>
+                  </a:tcPr>
+                </a:tc>
+                <a:extLst>
+                  <a:ext uri="{0D108BD9-81ED-4DB2-BD59-A6C34878D82A}">
+                    <a16:rowId xmlns:a16="http://schemas.microsoft.com/office/drawing/2014/main" val="1873305476"/>
+                  </a:ext>
+                </a:extLst>
+              </a:tr>
+            </a:tbl>
+          </a:graphicData>
+        </a:graphic>
+      </p:graphicFrame>
+      <p:pic>
+        <p:nvPicPr>
+          <p:cNvPr id="19" name="Image 18">
+            <a:extLst>
+              <a:ext uri="{FF2B5EF4-FFF2-40B4-BE49-F238E27FC236}">
+                <a16:creationId xmlns:a16="http://schemas.microsoft.com/office/drawing/2014/main" id="{9F46C129-32D0-3977-449B-B16D3B35224A}"/>
+              </a:ext>
+            </a:extLst>
+          </p:cNvPr>
+          <p:cNvPicPr>
+            <a:picLocks noChangeAspect="1"/>
+          </p:cNvPicPr>
+          <p:nvPr/>
+        </p:nvPicPr>
+        <p:blipFill>
+          <a:blip r:embed="rId3"/>
+          <a:stretch>
+            <a:fillRect/>
+          </a:stretch>
+        </p:blipFill>
+        <p:spPr>
+          <a:xfrm>
+            <a:off x="178216" y="1277505"/>
+            <a:ext cx="4122929" cy="1322316"/>
+          </a:xfrm>
+          <a:prstGeom prst="rect">
+            <a:avLst/>
+          </a:prstGeom>
+        </p:spPr>
+      </p:pic>
+      <p:graphicFrame>
+        <p:nvGraphicFramePr>
+          <p:cNvPr id="21" name="Tableau 20">
+            <a:extLst>
+              <a:ext uri="{FF2B5EF4-FFF2-40B4-BE49-F238E27FC236}">
+                <a16:creationId xmlns:a16="http://schemas.microsoft.com/office/drawing/2014/main" id="{954E3276-A641-41A0-7614-F79AE2421E93}"/>
+              </a:ext>
+            </a:extLst>
+          </p:cNvPr>
+          <p:cNvGraphicFramePr>
+            <a:graphicFrameLocks noGrp="1"/>
+          </p:cNvGraphicFramePr>
+          <p:nvPr>
+            <p:extLst>
+              <p:ext uri="{D42A27DB-BD31-4B8C-83A1-F6EECF244321}">
+                <p14:modId xmlns:p14="http://schemas.microsoft.com/office/powerpoint/2010/main" val="109542920"/>
+              </p:ext>
+            </p:extLst>
+          </p:nvPr>
+        </p:nvGraphicFramePr>
+        <p:xfrm>
+          <a:off x="4301145" y="1323641"/>
+          <a:ext cx="2150974" cy="1450340"/>
+        </p:xfrm>
+        <a:graphic>
+          <a:graphicData uri="http://schemas.openxmlformats.org/drawingml/2006/table">
+            <a:tbl>
+              <a:tblPr firstRow="1">
+                <a:tableStyleId>{073A0DAA-6AF3-43AB-8588-CEC1D06C72B9}</a:tableStyleId>
+              </a:tblPr>
+              <a:tblGrid>
+                <a:gridCol w="1075487">
+                  <a:extLst>
+                    <a:ext uri="{9D8B030D-6E8A-4147-A177-3AD203B41FA5}">
+                      <a16:colId xmlns:a16="http://schemas.microsoft.com/office/drawing/2014/main" val="1354687187"/>
+                    </a:ext>
+                  </a:extLst>
+                </a:gridCol>
+                <a:gridCol w="1075487">
+                  <a:extLst>
+                    <a:ext uri="{9D8B030D-6E8A-4147-A177-3AD203B41FA5}">
+                      <a16:colId xmlns:a16="http://schemas.microsoft.com/office/drawing/2014/main" val="3042079582"/>
+                    </a:ext>
+                  </a:extLst>
+                </a:gridCol>
+              </a:tblGrid>
+              <a:tr h="244877">
+                <a:tc>
+                  <a:txBody>
+                    <a:bodyPr/>
+                    <a:lstStyle/>
+                    <a:p>
+                      <a:pPr marL="0" marR="0" lvl="0" indent="0" algn="l" defTabSz="685800" rtl="0" eaLnBrk="1" fontAlgn="auto" latinLnBrk="0" hangingPunct="1">
+                        <a:lnSpc>
+                          <a:spcPct val="100000"/>
+                        </a:lnSpc>
+                        <a:spcBef>
+                          <a:spcPts val="0"/>
+                        </a:spcBef>
+                        <a:spcAft>
+                          <a:spcPts val="0"/>
+                        </a:spcAft>
+                        <a:buClrTx/>
+                        <a:buSzTx/>
+                        <a:buFontTx/>
+                        <a:buNone/>
+                        <a:tabLst/>
+                        <a:defRPr/>
+                      </a:pPr>
+                      <a:r>
+                        <a:rPr lang="fr-FR" dirty="0"/>
+                        <a:t>Pin </a:t>
+                      </a:r>
+                      <a:r>
+                        <a:rPr lang="fr-FR" dirty="0" err="1"/>
+                        <a:t>Number</a:t>
+                      </a:r>
+                      <a:endParaRPr lang="fr-FR" dirty="0"/>
+                    </a:p>
+                    <a:p>
+                      <a:endParaRPr lang="fr-FR" dirty="0"/>
+                    </a:p>
+                  </a:txBody>
+                  <a:tcPr>
+                    <a:lnL w="12700" cap="flat" cmpd="sng" algn="ctr">
+                      <a:solidFill>
+                        <a:schemeClr val="tx1"/>
+                      </a:solidFill>
+                      <a:prstDash val="solid"/>
+                      <a:round/>
+                      <a:headEnd type="none" w="med" len="med"/>
+                      <a:tailEnd type="none" w="med" len="med"/>
+                    </a:lnL>
+                    <a:lnR w="12700" cap="flat" cmpd="sng" algn="ctr">
+                      <a:solidFill>
+                        <a:schemeClr val="tx1"/>
+                      </a:solidFill>
+                      <a:prstDash val="solid"/>
+                      <a:round/>
+                      <a:headEnd type="none" w="med" len="med"/>
+                      <a:tailEnd type="none" w="med" len="med"/>
+                    </a:lnR>
+                    <a:lnT w="12700" cap="flat" cmpd="sng" algn="ctr">
+                      <a:solidFill>
+                        <a:schemeClr val="tx1"/>
+                      </a:solidFill>
+                      <a:prstDash val="solid"/>
+                      <a:round/>
+                      <a:headEnd type="none" w="med" len="med"/>
+                      <a:tailEnd type="none" w="med" len="med"/>
+                    </a:lnT>
+                    <a:lnB w="12700" cap="flat" cmpd="sng" algn="ctr">
+                      <a:solidFill>
+                        <a:schemeClr val="tx1"/>
+                      </a:solidFill>
+                      <a:prstDash val="solid"/>
+                      <a:round/>
+                      <a:headEnd type="none" w="med" len="med"/>
+                      <a:tailEnd type="none" w="med" len="med"/>
+                    </a:lnB>
+                    <a:solidFill>
+                      <a:schemeClr val="tx1">
+                        <a:lumMod val="50000"/>
+                        <a:lumOff val="50000"/>
+                      </a:schemeClr>
+                    </a:solidFill>
+                  </a:tcPr>
+                </a:tc>
+                <a:tc>
+                  <a:txBody>
+                    <a:bodyPr/>
+                    <a:lstStyle/>
+                    <a:p>
+                      <a:pPr marL="0" marR="0" lvl="0" indent="0" algn="l" defTabSz="685800" rtl="0" eaLnBrk="1" fontAlgn="auto" latinLnBrk="0" hangingPunct="1">
+                        <a:lnSpc>
+                          <a:spcPct val="100000"/>
+                        </a:lnSpc>
+                        <a:spcBef>
+                          <a:spcPts val="0"/>
+                        </a:spcBef>
+                        <a:spcAft>
+                          <a:spcPts val="0"/>
+                        </a:spcAft>
+                        <a:buClrTx/>
+                        <a:buSzTx/>
+                        <a:buFontTx/>
+                        <a:buNone/>
+                        <a:tabLst/>
+                        <a:defRPr/>
+                      </a:pPr>
+                      <a:r>
+                        <a:rPr lang="fr-FR" dirty="0"/>
+                        <a:t>Usage</a:t>
+                      </a:r>
+                    </a:p>
+                  </a:txBody>
+                  <a:tcPr>
+                    <a:lnL w="12700" cap="flat" cmpd="sng" algn="ctr">
+                      <a:solidFill>
+                        <a:schemeClr val="tx1"/>
+                      </a:solidFill>
+                      <a:prstDash val="solid"/>
+                      <a:round/>
+                      <a:headEnd type="none" w="med" len="med"/>
+                      <a:tailEnd type="none" w="med" len="med"/>
+                    </a:lnL>
+                    <a:lnR w="12700" cap="flat" cmpd="sng" algn="ctr">
+                      <a:solidFill>
+                        <a:schemeClr val="tx1"/>
+                      </a:solidFill>
+                      <a:prstDash val="solid"/>
+                      <a:round/>
+                      <a:headEnd type="none" w="med" len="med"/>
+                      <a:tailEnd type="none" w="med" len="med"/>
+                    </a:lnR>
+                    <a:lnT w="12700" cap="flat" cmpd="sng" algn="ctr">
+                      <a:solidFill>
+                        <a:schemeClr val="tx1"/>
+                      </a:solidFill>
+                      <a:prstDash val="solid"/>
+                      <a:round/>
+                      <a:headEnd type="none" w="med" len="med"/>
+                      <a:tailEnd type="none" w="med" len="med"/>
+                    </a:lnT>
+                    <a:lnB w="12700" cap="flat" cmpd="sng" algn="ctr">
+                      <a:solidFill>
+                        <a:schemeClr val="tx1"/>
+                      </a:solidFill>
+                      <a:prstDash val="solid"/>
+                      <a:round/>
+                      <a:headEnd type="none" w="med" len="med"/>
+                      <a:tailEnd type="none" w="med" len="med"/>
+                    </a:lnB>
+                    <a:solidFill>
+                      <a:schemeClr val="tx1">
+                        <a:lumMod val="50000"/>
+                        <a:lumOff val="50000"/>
+                      </a:schemeClr>
+                    </a:solidFill>
+                  </a:tcPr>
+                </a:tc>
+                <a:extLst>
+                  <a:ext uri="{0D108BD9-81ED-4DB2-BD59-A6C34878D82A}">
+                    <a16:rowId xmlns:a16="http://schemas.microsoft.com/office/drawing/2014/main" val="1267937961"/>
+                  </a:ext>
+                </a:extLst>
+              </a:tr>
+              <a:tr h="370840">
+                <a:tc>
+                  <a:txBody>
+                    <a:bodyPr/>
+                    <a:lstStyle/>
+                    <a:p>
+                      <a:pPr algn="ctr"/>
+                      <a:r>
+                        <a:rPr lang="fr-FR" sz="1600" b="1" dirty="0">
+                          <a:solidFill>
+                            <a:schemeClr val="tx1"/>
+                          </a:solidFill>
+                        </a:rPr>
+                        <a:t>1</a:t>
+                      </a:r>
+                    </a:p>
+                  </a:txBody>
+                  <a:tcPr>
+                    <a:lnL w="12700" cap="flat" cmpd="sng" algn="ctr">
+                      <a:solidFill>
+                        <a:schemeClr val="tx1"/>
+                      </a:solidFill>
+                      <a:prstDash val="solid"/>
+                      <a:round/>
+                      <a:headEnd type="none" w="med" len="med"/>
+                      <a:tailEnd type="none" w="med" len="med"/>
+                    </a:lnL>
+                    <a:lnR w="12700" cap="flat" cmpd="sng" algn="ctr">
+                      <a:solidFill>
+                        <a:schemeClr val="tx1"/>
+                      </a:solidFill>
+                      <a:prstDash val="solid"/>
+                      <a:round/>
+                      <a:headEnd type="none" w="med" len="med"/>
+                      <a:tailEnd type="none" w="med" len="med"/>
+                    </a:lnR>
+                    <a:lnT w="12700" cap="flat" cmpd="sng" algn="ctr">
+                      <a:solidFill>
+                        <a:schemeClr val="tx1"/>
+                      </a:solidFill>
+                      <a:prstDash val="solid"/>
+                      <a:round/>
+                      <a:headEnd type="none" w="med" len="med"/>
+                      <a:tailEnd type="none" w="med" len="med"/>
+                    </a:lnT>
+                    <a:lnB w="12700" cap="flat" cmpd="sng" algn="ctr">
+                      <a:solidFill>
+                        <a:schemeClr val="tx1"/>
+                      </a:solidFill>
+                      <a:prstDash val="solid"/>
+                      <a:round/>
+                      <a:headEnd type="none" w="med" len="med"/>
+                      <a:tailEnd type="none" w="med" len="med"/>
+                    </a:lnB>
+                  </a:tcPr>
+                </a:tc>
+                <a:tc>
+                  <a:txBody>
+                    <a:bodyPr/>
+                    <a:lstStyle/>
+                    <a:p>
+                      <a:pPr algn="ctr"/>
+                      <a:r>
+                        <a:rPr lang="fr-FR" dirty="0"/>
+                        <a:t>Vin</a:t>
+                      </a:r>
+                    </a:p>
+                  </a:txBody>
+                  <a:tcPr>
+                    <a:lnL w="12700" cap="flat" cmpd="sng" algn="ctr">
+                      <a:solidFill>
+                        <a:schemeClr val="tx1"/>
+                      </a:solidFill>
+                      <a:prstDash val="solid"/>
+                      <a:round/>
+                      <a:headEnd type="none" w="med" len="med"/>
+                      <a:tailEnd type="none" w="med" len="med"/>
+                    </a:lnL>
+                    <a:lnR w="12700" cap="flat" cmpd="sng" algn="ctr">
+                      <a:solidFill>
+                        <a:schemeClr val="tx1"/>
+                      </a:solidFill>
+                      <a:prstDash val="solid"/>
+                      <a:round/>
+                      <a:headEnd type="none" w="med" len="med"/>
+                      <a:tailEnd type="none" w="med" len="med"/>
+                    </a:lnR>
+                    <a:lnT w="12700" cap="flat" cmpd="sng" algn="ctr">
+                      <a:solidFill>
+                        <a:schemeClr val="tx1"/>
+                      </a:solidFill>
+                      <a:prstDash val="solid"/>
+                      <a:round/>
+                      <a:headEnd type="none" w="med" len="med"/>
+                      <a:tailEnd type="none" w="med" len="med"/>
+                    </a:lnT>
+                    <a:lnB w="12700" cap="flat" cmpd="sng" algn="ctr">
+                      <a:solidFill>
+                        <a:schemeClr val="tx1"/>
+                      </a:solidFill>
+                      <a:prstDash val="solid"/>
+                      <a:round/>
+                      <a:headEnd type="none" w="med" len="med"/>
+                      <a:tailEnd type="none" w="med" len="med"/>
+                    </a:lnB>
+                  </a:tcPr>
+                </a:tc>
+                <a:extLst>
+                  <a:ext uri="{0D108BD9-81ED-4DB2-BD59-A6C34878D82A}">
+                    <a16:rowId xmlns:a16="http://schemas.microsoft.com/office/drawing/2014/main" val="3854206675"/>
+                  </a:ext>
+                </a:extLst>
+              </a:tr>
+              <a:tr h="370840">
+                <a:tc>
+                  <a:txBody>
+                    <a:bodyPr/>
+                    <a:lstStyle/>
+                    <a:p>
+                      <a:pPr algn="ctr"/>
+                      <a:r>
+                        <a:rPr lang="fr-FR" sz="1600" b="1" dirty="0">
+                          <a:solidFill>
+                            <a:schemeClr val="tx1"/>
+                          </a:solidFill>
+                        </a:rPr>
+                        <a:t>2</a:t>
+                      </a:r>
+                    </a:p>
+                  </a:txBody>
+                  <a:tcPr>
+                    <a:lnL w="12700" cap="flat" cmpd="sng" algn="ctr">
+                      <a:solidFill>
+                        <a:schemeClr val="tx1"/>
+                      </a:solidFill>
+                      <a:prstDash val="solid"/>
+                      <a:round/>
+                      <a:headEnd type="none" w="med" len="med"/>
+                      <a:tailEnd type="none" w="med" len="med"/>
+                    </a:lnL>
+                    <a:lnR w="12700" cap="flat" cmpd="sng" algn="ctr">
+                      <a:solidFill>
+                        <a:schemeClr val="tx1"/>
+                      </a:solidFill>
+                      <a:prstDash val="solid"/>
+                      <a:round/>
+                      <a:headEnd type="none" w="med" len="med"/>
+                      <a:tailEnd type="none" w="med" len="med"/>
+                    </a:lnR>
+                    <a:lnT w="12700" cap="flat" cmpd="sng" algn="ctr">
+                      <a:solidFill>
+                        <a:schemeClr val="tx1"/>
+                      </a:solidFill>
+                      <a:prstDash val="solid"/>
+                      <a:round/>
+                      <a:headEnd type="none" w="med" len="med"/>
+                      <a:tailEnd type="none" w="med" len="med"/>
+                    </a:lnT>
+                    <a:lnB w="12700" cap="flat" cmpd="sng" algn="ctr">
+                      <a:solidFill>
+                        <a:schemeClr val="tx1"/>
+                      </a:solidFill>
+                      <a:prstDash val="solid"/>
+                      <a:round/>
+                      <a:headEnd type="none" w="med" len="med"/>
+                      <a:tailEnd type="none" w="med" len="med"/>
+                    </a:lnB>
+                  </a:tcPr>
+                </a:tc>
+                <a:tc>
+                  <a:txBody>
+                    <a:bodyPr/>
+                    <a:lstStyle/>
+                    <a:p>
+                      <a:pPr algn="ctr"/>
+                      <a:r>
+                        <a:rPr lang="fr-FR" dirty="0"/>
+                        <a:t>+Vcc (5V)</a:t>
+                      </a:r>
+                    </a:p>
+                  </a:txBody>
+                  <a:tcPr>
+                    <a:lnL w="12700" cap="flat" cmpd="sng" algn="ctr">
+                      <a:solidFill>
+                        <a:schemeClr val="tx1"/>
+                      </a:solidFill>
+                      <a:prstDash val="solid"/>
+                      <a:round/>
+                      <a:headEnd type="none" w="med" len="med"/>
+                      <a:tailEnd type="none" w="med" len="med"/>
+                    </a:lnL>
+                    <a:lnR w="12700" cap="flat" cmpd="sng" algn="ctr">
+                      <a:solidFill>
+                        <a:schemeClr val="tx1"/>
+                      </a:solidFill>
+                      <a:prstDash val="solid"/>
+                      <a:round/>
+                      <a:headEnd type="none" w="med" len="med"/>
+                      <a:tailEnd type="none" w="med" len="med"/>
+                    </a:lnR>
+                    <a:lnT w="12700" cap="flat" cmpd="sng" algn="ctr">
+                      <a:solidFill>
+                        <a:schemeClr val="tx1"/>
+                      </a:solidFill>
+                      <a:prstDash val="solid"/>
+                      <a:round/>
+                      <a:headEnd type="none" w="med" len="med"/>
+                      <a:tailEnd type="none" w="med" len="med"/>
+                    </a:lnT>
+                    <a:lnB w="12700" cap="flat" cmpd="sng" algn="ctr">
+                      <a:solidFill>
+                        <a:schemeClr val="tx1"/>
+                      </a:solidFill>
+                      <a:prstDash val="solid"/>
+                      <a:round/>
+                      <a:headEnd type="none" w="med" len="med"/>
+                      <a:tailEnd type="none" w="med" len="med"/>
+                    </a:lnB>
+                  </a:tcPr>
+                </a:tc>
+                <a:extLst>
+                  <a:ext uri="{0D108BD9-81ED-4DB2-BD59-A6C34878D82A}">
+                    <a16:rowId xmlns:a16="http://schemas.microsoft.com/office/drawing/2014/main" val="2525468591"/>
+                  </a:ext>
+                </a:extLst>
+              </a:tr>
+            </a:tbl>
+          </a:graphicData>
+        </a:graphic>
+      </p:graphicFrame>
+      <p:sp>
+        <p:nvSpPr>
+          <p:cNvPr id="22" name="ZoneTexte 21">
+            <a:extLst>
+              <a:ext uri="{FF2B5EF4-FFF2-40B4-BE49-F238E27FC236}">
+                <a16:creationId xmlns:a16="http://schemas.microsoft.com/office/drawing/2014/main" id="{51BCFC8A-7E85-9D97-12B0-32308C569DA4}"/>
+              </a:ext>
+            </a:extLst>
+          </p:cNvPr>
+          <p:cNvSpPr txBox="1"/>
+          <p:nvPr/>
+        </p:nvSpPr>
+        <p:spPr>
+          <a:xfrm>
+            <a:off x="2261275" y="1576609"/>
+            <a:ext cx="405881" cy="369332"/>
+          </a:xfrm>
+          <a:prstGeom prst="rect">
+            <a:avLst/>
+          </a:prstGeom>
+          <a:noFill/>
+        </p:spPr>
+        <p:txBody>
+          <a:bodyPr wrap="square" rtlCol="0">
+            <a:spAutoFit/>
+          </a:bodyPr>
+          <a:lstStyle/>
+          <a:p>
+            <a:r>
+              <a:rPr lang="fr-FR" b="1" dirty="0">
+                <a:solidFill>
+                  <a:schemeClr val="bg1"/>
+                </a:solidFill>
+              </a:rPr>
+              <a:t>1</a:t>
+            </a:r>
+          </a:p>
+        </p:txBody>
+      </p:sp>
+      <p:sp>
+        <p:nvSpPr>
+          <p:cNvPr id="23" name="ZoneTexte 22">
+            <a:extLst>
+              <a:ext uri="{FF2B5EF4-FFF2-40B4-BE49-F238E27FC236}">
+                <a16:creationId xmlns:a16="http://schemas.microsoft.com/office/drawing/2014/main" id="{01CD3A20-A9EC-5FD3-8828-844E94645054}"/>
+              </a:ext>
+            </a:extLst>
+          </p:cNvPr>
+          <p:cNvSpPr txBox="1"/>
+          <p:nvPr/>
+        </p:nvSpPr>
+        <p:spPr>
+          <a:xfrm>
+            <a:off x="2261275" y="1966549"/>
+            <a:ext cx="405881" cy="369332"/>
+          </a:xfrm>
+          <a:prstGeom prst="rect">
+            <a:avLst/>
+          </a:prstGeom>
+          <a:noFill/>
+        </p:spPr>
+        <p:txBody>
+          <a:bodyPr wrap="square" rtlCol="0">
+            <a:spAutoFit/>
+          </a:bodyPr>
+          <a:lstStyle/>
+          <a:p>
+            <a:r>
+              <a:rPr lang="fr-FR" b="1" dirty="0">
+                <a:solidFill>
+                  <a:schemeClr val="bg1"/>
+                </a:solidFill>
+              </a:rPr>
+              <a:t>2</a:t>
+            </a:r>
+          </a:p>
+        </p:txBody>
+      </p:sp>
+      <p:graphicFrame>
+        <p:nvGraphicFramePr>
+          <p:cNvPr id="24" name="Tableau 23">
+            <a:extLst>
+              <a:ext uri="{FF2B5EF4-FFF2-40B4-BE49-F238E27FC236}">
+                <a16:creationId xmlns:a16="http://schemas.microsoft.com/office/drawing/2014/main" id="{BCF91B16-3752-D725-5C83-E5C0762B364C}"/>
+              </a:ext>
+            </a:extLst>
+          </p:cNvPr>
+          <p:cNvGraphicFramePr>
+            <a:graphicFrameLocks noGrp="1"/>
+          </p:cNvGraphicFramePr>
+          <p:nvPr>
+            <p:extLst>
+              <p:ext uri="{D42A27DB-BD31-4B8C-83A1-F6EECF244321}">
+                <p14:modId xmlns:p14="http://schemas.microsoft.com/office/powerpoint/2010/main" val="2905982416"/>
+              </p:ext>
+            </p:extLst>
+          </p:nvPr>
+        </p:nvGraphicFramePr>
+        <p:xfrm>
+          <a:off x="221146" y="3357658"/>
+          <a:ext cx="6274905" cy="1626591"/>
+        </p:xfrm>
+        <a:graphic>
+          <a:graphicData uri="http://schemas.openxmlformats.org/drawingml/2006/table">
+            <a:tbl>
+              <a:tblPr firstRow="1">
+                <a:tableStyleId>{073A0DAA-6AF3-43AB-8588-CEC1D06C72B9}</a:tableStyleId>
+              </a:tblPr>
+              <a:tblGrid>
+                <a:gridCol w="2091635">
+                  <a:extLst>
+                    <a:ext uri="{9D8B030D-6E8A-4147-A177-3AD203B41FA5}">
+                      <a16:colId xmlns:a16="http://schemas.microsoft.com/office/drawing/2014/main" val="3610702983"/>
+                    </a:ext>
+                  </a:extLst>
+                </a:gridCol>
+                <a:gridCol w="2091635">
+                  <a:extLst>
+                    <a:ext uri="{9D8B030D-6E8A-4147-A177-3AD203B41FA5}">
+                      <a16:colId xmlns:a16="http://schemas.microsoft.com/office/drawing/2014/main" val="1918606946"/>
+                    </a:ext>
+                  </a:extLst>
+                </a:gridCol>
+                <a:gridCol w="2091635">
+                  <a:extLst>
+                    <a:ext uri="{9D8B030D-6E8A-4147-A177-3AD203B41FA5}">
+                      <a16:colId xmlns:a16="http://schemas.microsoft.com/office/drawing/2014/main" val="3139002967"/>
+                    </a:ext>
+                  </a:extLst>
+                </a:gridCol>
+              </a:tblGrid>
+              <a:tr h="374557">
+                <a:tc>
+                  <a:txBody>
+                    <a:bodyPr/>
+                    <a:lstStyle/>
+                    <a:p>
+                      <a:endParaRPr lang="fr-FR" dirty="0"/>
+                    </a:p>
+                  </a:txBody>
+                  <a:tcPr>
+                    <a:lnL w="12700" cap="flat" cmpd="sng" algn="ctr">
+                      <a:solidFill>
+                        <a:schemeClr val="tx1"/>
+                      </a:solidFill>
+                      <a:prstDash val="solid"/>
+                      <a:round/>
+                      <a:headEnd type="none" w="med" len="med"/>
+                      <a:tailEnd type="none" w="med" len="med"/>
+                    </a:lnL>
+                    <a:lnR w="12700" cap="flat" cmpd="sng" algn="ctr">
+                      <a:solidFill>
+                        <a:schemeClr val="tx1"/>
+                      </a:solidFill>
+                      <a:prstDash val="solid"/>
+                      <a:round/>
+                      <a:headEnd type="none" w="med" len="med"/>
+                      <a:tailEnd type="none" w="med" len="med"/>
+                    </a:lnR>
+                    <a:lnT w="12700" cap="flat" cmpd="sng" algn="ctr">
+                      <a:solidFill>
+                        <a:schemeClr val="tx1"/>
+                      </a:solidFill>
+                      <a:prstDash val="solid"/>
+                      <a:round/>
+                      <a:headEnd type="none" w="med" len="med"/>
+                      <a:tailEnd type="none" w="med" len="med"/>
+                    </a:lnT>
+                    <a:lnB w="12700" cap="flat" cmpd="sng" algn="ctr">
+                      <a:solidFill>
+                        <a:schemeClr val="tx1"/>
+                      </a:solidFill>
+                      <a:prstDash val="solid"/>
+                      <a:round/>
+                      <a:headEnd type="none" w="med" len="med"/>
+                      <a:tailEnd type="none" w="med" len="med"/>
+                    </a:lnB>
+                    <a:solidFill>
+                      <a:schemeClr val="bg1"/>
+                    </a:solidFill>
+                  </a:tcPr>
+                </a:tc>
+                <a:tc>
+                  <a:txBody>
+                    <a:bodyPr/>
+                    <a:lstStyle/>
+                    <a:p>
+                      <a:pPr algn="ctr"/>
+                      <a:r>
+                        <a:rPr lang="fr-FR" dirty="0" err="1"/>
+                        <a:t>Typical</a:t>
+                      </a:r>
+                      <a:r>
+                        <a:rPr lang="fr-FR" dirty="0"/>
+                        <a:t> Value</a:t>
+                      </a:r>
+                    </a:p>
+                  </a:txBody>
+                  <a:tcPr>
+                    <a:lnL w="12700" cap="flat" cmpd="sng" algn="ctr">
+                      <a:solidFill>
+                        <a:schemeClr val="tx1"/>
+                      </a:solidFill>
+                      <a:prstDash val="solid"/>
+                      <a:round/>
+                      <a:headEnd type="none" w="med" len="med"/>
+                      <a:tailEnd type="none" w="med" len="med"/>
+                    </a:lnL>
+                    <a:lnR w="12700" cap="flat" cmpd="sng" algn="ctr">
+                      <a:solidFill>
+                        <a:schemeClr val="tx1"/>
+                      </a:solidFill>
+                      <a:prstDash val="solid"/>
+                      <a:round/>
+                      <a:headEnd type="none" w="med" len="med"/>
+                      <a:tailEnd type="none" w="med" len="med"/>
+                    </a:lnR>
+                    <a:lnT w="12700" cap="flat" cmpd="sng" algn="ctr">
+                      <a:solidFill>
+                        <a:schemeClr val="tx1"/>
+                      </a:solidFill>
+                      <a:prstDash val="solid"/>
+                      <a:round/>
+                      <a:headEnd type="none" w="med" len="med"/>
+                      <a:tailEnd type="none" w="med" len="med"/>
+                    </a:lnT>
+                    <a:lnB w="12700" cap="flat" cmpd="sng" algn="ctr">
+                      <a:solidFill>
+                        <a:schemeClr val="tx1"/>
+                      </a:solidFill>
+                      <a:prstDash val="solid"/>
+                      <a:round/>
+                      <a:headEnd type="none" w="med" len="med"/>
+                      <a:tailEnd type="none" w="med" len="med"/>
+                    </a:lnB>
+                    <a:solidFill>
+                      <a:schemeClr val="tx1">
+                        <a:lumMod val="50000"/>
+                        <a:lumOff val="50000"/>
+                      </a:schemeClr>
+                    </a:solidFill>
+                  </a:tcPr>
+                </a:tc>
+                <a:tc>
+                  <a:txBody>
+                    <a:bodyPr/>
+                    <a:lstStyle/>
+                    <a:p>
+                      <a:pPr algn="ctr"/>
+                      <a:r>
+                        <a:rPr lang="fr-FR" dirty="0"/>
+                        <a:t>Unit</a:t>
+                      </a:r>
+                    </a:p>
+                  </a:txBody>
+                  <a:tcPr>
+                    <a:lnL w="12700" cap="flat" cmpd="sng" algn="ctr">
+                      <a:solidFill>
+                        <a:schemeClr val="tx1"/>
+                      </a:solidFill>
+                      <a:prstDash val="solid"/>
+                      <a:round/>
+                      <a:headEnd type="none" w="med" len="med"/>
+                      <a:tailEnd type="none" w="med" len="med"/>
+                    </a:lnL>
+                    <a:lnR w="12700" cap="flat" cmpd="sng" algn="ctr">
+                      <a:solidFill>
+                        <a:schemeClr val="tx1"/>
+                      </a:solidFill>
+                      <a:prstDash val="solid"/>
+                      <a:round/>
+                      <a:headEnd type="none" w="med" len="med"/>
+                      <a:tailEnd type="none" w="med" len="med"/>
+                    </a:lnR>
+                    <a:lnT w="12700" cap="flat" cmpd="sng" algn="ctr">
+                      <a:solidFill>
+                        <a:schemeClr val="tx1"/>
+                      </a:solidFill>
+                      <a:prstDash val="solid"/>
+                      <a:round/>
+                      <a:headEnd type="none" w="med" len="med"/>
+                      <a:tailEnd type="none" w="med" len="med"/>
+                    </a:lnT>
+                    <a:lnB w="12700" cap="flat" cmpd="sng" algn="ctr">
+                      <a:solidFill>
+                        <a:schemeClr val="tx1"/>
+                      </a:solidFill>
+                      <a:prstDash val="solid"/>
+                      <a:round/>
+                      <a:headEnd type="none" w="med" len="med"/>
+                      <a:tailEnd type="none" w="med" len="med"/>
+                    </a:lnB>
+                    <a:solidFill>
+                      <a:schemeClr val="tx1">
+                        <a:lumMod val="50000"/>
+                        <a:lumOff val="50000"/>
+                      </a:schemeClr>
+                    </a:solidFill>
+                  </a:tcPr>
+                </a:tc>
+                <a:extLst>
+                  <a:ext uri="{0D108BD9-81ED-4DB2-BD59-A6C34878D82A}">
+                    <a16:rowId xmlns:a16="http://schemas.microsoft.com/office/drawing/2014/main" val="3173636204"/>
+                  </a:ext>
+                </a:extLst>
+              </a:tr>
+              <a:tr h="374557">
+                <a:tc>
+                  <a:txBody>
+                    <a:bodyPr/>
+                    <a:lstStyle/>
+                    <a:p>
+                      <a:pPr algn="ctr"/>
+                      <a:r>
+                        <a:rPr lang="fr-FR" dirty="0" err="1"/>
+                        <a:t>Temperature</a:t>
+                      </a:r>
+                      <a:endParaRPr lang="fr-FR" dirty="0"/>
+                    </a:p>
+                  </a:txBody>
+                  <a:tcPr>
+                    <a:lnL w="12700" cap="flat" cmpd="sng" algn="ctr">
+                      <a:solidFill>
+                        <a:schemeClr val="tx1"/>
+                      </a:solidFill>
+                      <a:prstDash val="solid"/>
+                      <a:round/>
+                      <a:headEnd type="none" w="med" len="med"/>
+                      <a:tailEnd type="none" w="med" len="med"/>
+                    </a:lnL>
+                    <a:lnR w="12700" cap="flat" cmpd="sng" algn="ctr">
+                      <a:solidFill>
+                        <a:schemeClr val="tx1"/>
+                      </a:solidFill>
+                      <a:prstDash val="solid"/>
+                      <a:round/>
+                      <a:headEnd type="none" w="med" len="med"/>
+                      <a:tailEnd type="none" w="med" len="med"/>
+                    </a:lnR>
+                    <a:lnT w="12700" cap="flat" cmpd="sng" algn="ctr">
+                      <a:solidFill>
+                        <a:schemeClr val="tx1"/>
+                      </a:solidFill>
+                      <a:prstDash val="solid"/>
+                      <a:round/>
+                      <a:headEnd type="none" w="med" len="med"/>
+                      <a:tailEnd type="none" w="med" len="med"/>
+                    </a:lnT>
+                    <a:lnB w="12700" cap="flat" cmpd="sng" algn="ctr">
+                      <a:solidFill>
+                        <a:schemeClr val="tx1"/>
+                      </a:solidFill>
+                      <a:prstDash val="solid"/>
+                      <a:round/>
+                      <a:headEnd type="none" w="med" len="med"/>
+                      <a:tailEnd type="none" w="med" len="med"/>
+                    </a:lnB>
+                    <a:solidFill>
+                      <a:schemeClr val="bg1">
+                        <a:lumMod val="75000"/>
+                      </a:schemeClr>
+                    </a:solidFill>
+                  </a:tcPr>
+                </a:tc>
+                <a:tc>
+                  <a:txBody>
+                    <a:bodyPr/>
+                    <a:lstStyle/>
+                    <a:p>
+                      <a:pPr algn="ctr"/>
+                      <a:r>
+                        <a:rPr lang="fr-FR" dirty="0"/>
+                        <a:t>20±5</a:t>
+                      </a:r>
+                    </a:p>
+                  </a:txBody>
+                  <a:tcPr>
+                    <a:lnL w="12700" cap="flat" cmpd="sng" algn="ctr">
+                      <a:solidFill>
+                        <a:schemeClr val="tx1"/>
+                      </a:solidFill>
+                      <a:prstDash val="solid"/>
+                      <a:round/>
+                      <a:headEnd type="none" w="med" len="med"/>
+                      <a:tailEnd type="none" w="med" len="med"/>
+                    </a:lnL>
+                    <a:lnR w="12700" cap="flat" cmpd="sng" algn="ctr">
+                      <a:solidFill>
+                        <a:schemeClr val="tx1"/>
+                      </a:solidFill>
+                      <a:prstDash val="solid"/>
+                      <a:round/>
+                      <a:headEnd type="none" w="med" len="med"/>
+                      <a:tailEnd type="none" w="med" len="med"/>
+                    </a:lnR>
+                    <a:lnT w="12700" cap="flat" cmpd="sng" algn="ctr">
+                      <a:solidFill>
+                        <a:schemeClr val="tx1"/>
+                      </a:solidFill>
+                      <a:prstDash val="solid"/>
+                      <a:round/>
+                      <a:headEnd type="none" w="med" len="med"/>
+                      <a:tailEnd type="none" w="med" len="med"/>
+                    </a:lnT>
+                    <a:lnB w="12700" cap="flat" cmpd="sng" algn="ctr">
+                      <a:solidFill>
+                        <a:schemeClr val="tx1"/>
+                      </a:solidFill>
+                      <a:prstDash val="solid"/>
+                      <a:round/>
+                      <a:headEnd type="none" w="med" len="med"/>
+                      <a:tailEnd type="none" w="med" len="med"/>
+                    </a:lnB>
+                  </a:tcPr>
+                </a:tc>
+                <a:tc>
+                  <a:txBody>
+                    <a:bodyPr/>
+                    <a:lstStyle/>
+                    <a:p>
+                      <a:pPr algn="ctr"/>
+                      <a:r>
+                        <a:rPr lang="fr-FR" dirty="0"/>
+                        <a:t>°C</a:t>
+                      </a:r>
+                    </a:p>
+                  </a:txBody>
+                  <a:tcPr>
+                    <a:lnL w="12700" cap="flat" cmpd="sng" algn="ctr">
+                      <a:solidFill>
+                        <a:schemeClr val="tx1"/>
+                      </a:solidFill>
+                      <a:prstDash val="solid"/>
+                      <a:round/>
+                      <a:headEnd type="none" w="med" len="med"/>
+                      <a:tailEnd type="none" w="med" len="med"/>
+                    </a:lnL>
+                    <a:lnR w="12700" cap="flat" cmpd="sng" algn="ctr">
+                      <a:solidFill>
+                        <a:schemeClr val="tx1"/>
+                      </a:solidFill>
+                      <a:prstDash val="solid"/>
+                      <a:round/>
+                      <a:headEnd type="none" w="med" len="med"/>
+                      <a:tailEnd type="none" w="med" len="med"/>
+                    </a:lnR>
+                    <a:lnT w="12700" cap="flat" cmpd="sng" algn="ctr">
+                      <a:solidFill>
+                        <a:schemeClr val="tx1"/>
+                      </a:solidFill>
+                      <a:prstDash val="solid"/>
+                      <a:round/>
+                      <a:headEnd type="none" w="med" len="med"/>
+                      <a:tailEnd type="none" w="med" len="med"/>
+                    </a:lnT>
+                    <a:lnB w="12700" cap="flat" cmpd="sng" algn="ctr">
+                      <a:solidFill>
+                        <a:schemeClr val="tx1"/>
+                      </a:solidFill>
+                      <a:prstDash val="solid"/>
+                      <a:round/>
+                      <a:headEnd type="none" w="med" len="med"/>
+                      <a:tailEnd type="none" w="med" len="med"/>
+                    </a:lnB>
+                  </a:tcPr>
+                </a:tc>
+                <a:extLst>
+                  <a:ext uri="{0D108BD9-81ED-4DB2-BD59-A6C34878D82A}">
+                    <a16:rowId xmlns:a16="http://schemas.microsoft.com/office/drawing/2014/main" val="2051792826"/>
+                  </a:ext>
+                </a:extLst>
+              </a:tr>
+              <a:tr h="374557">
+                <a:tc>
+                  <a:txBody>
+                    <a:bodyPr/>
+                    <a:lstStyle/>
+                    <a:p>
+                      <a:pPr algn="ctr"/>
+                      <a:r>
+                        <a:rPr lang="fr-FR" dirty="0" err="1"/>
+                        <a:t>Humidity</a:t>
+                      </a:r>
+                      <a:endParaRPr lang="fr-FR" dirty="0"/>
+                    </a:p>
+                  </a:txBody>
+                  <a:tcPr>
+                    <a:lnL w="12700" cap="flat" cmpd="sng" algn="ctr">
+                      <a:solidFill>
+                        <a:schemeClr val="tx1"/>
+                      </a:solidFill>
+                      <a:prstDash val="solid"/>
+                      <a:round/>
+                      <a:headEnd type="none" w="med" len="med"/>
+                      <a:tailEnd type="none" w="med" len="med"/>
+                    </a:lnL>
+                    <a:lnR w="12700" cap="flat" cmpd="sng" algn="ctr">
+                      <a:solidFill>
+                        <a:schemeClr val="tx1"/>
+                      </a:solidFill>
+                      <a:prstDash val="solid"/>
+                      <a:round/>
+                      <a:headEnd type="none" w="med" len="med"/>
+                      <a:tailEnd type="none" w="med" len="med"/>
+                    </a:lnR>
+                    <a:lnT w="12700" cap="flat" cmpd="sng" algn="ctr">
+                      <a:solidFill>
+                        <a:schemeClr val="tx1"/>
+                      </a:solidFill>
+                      <a:prstDash val="solid"/>
+                      <a:round/>
+                      <a:headEnd type="none" w="med" len="med"/>
+                      <a:tailEnd type="none" w="med" len="med"/>
+                    </a:lnT>
+                    <a:lnB w="12700" cap="flat" cmpd="sng" algn="ctr">
+                      <a:solidFill>
+                        <a:schemeClr val="tx1"/>
+                      </a:solidFill>
+                      <a:prstDash val="solid"/>
+                      <a:round/>
+                      <a:headEnd type="none" w="med" len="med"/>
+                      <a:tailEnd type="none" w="med" len="med"/>
+                    </a:lnB>
+                    <a:solidFill>
+                      <a:schemeClr val="bg1">
+                        <a:lumMod val="75000"/>
+                      </a:schemeClr>
+                    </a:solidFill>
+                  </a:tcPr>
+                </a:tc>
+                <a:tc>
+                  <a:txBody>
+                    <a:bodyPr/>
+                    <a:lstStyle/>
+                    <a:p>
+                      <a:pPr algn="ctr"/>
+                      <a:r>
+                        <a:rPr lang="fr-FR" dirty="0"/>
+                        <a:t>50±5</a:t>
+                      </a:r>
+                    </a:p>
+                  </a:txBody>
+                  <a:tcPr>
+                    <a:lnL w="12700" cap="flat" cmpd="sng" algn="ctr">
+                      <a:solidFill>
+                        <a:schemeClr val="tx1"/>
+                      </a:solidFill>
+                      <a:prstDash val="solid"/>
+                      <a:round/>
+                      <a:headEnd type="none" w="med" len="med"/>
+                      <a:tailEnd type="none" w="med" len="med"/>
+                    </a:lnL>
+                    <a:lnR w="12700" cap="flat" cmpd="sng" algn="ctr">
+                      <a:solidFill>
+                        <a:schemeClr val="tx1"/>
+                      </a:solidFill>
+                      <a:prstDash val="solid"/>
+                      <a:round/>
+                      <a:headEnd type="none" w="med" len="med"/>
+                      <a:tailEnd type="none" w="med" len="med"/>
+                    </a:lnR>
+                    <a:lnT w="12700" cap="flat" cmpd="sng" algn="ctr">
+                      <a:solidFill>
+                        <a:schemeClr val="tx1"/>
+                      </a:solidFill>
+                      <a:prstDash val="solid"/>
+                      <a:round/>
+                      <a:headEnd type="none" w="med" len="med"/>
+                      <a:tailEnd type="none" w="med" len="med"/>
+                    </a:lnT>
+                    <a:lnB w="12700" cap="flat" cmpd="sng" algn="ctr">
+                      <a:solidFill>
+                        <a:schemeClr val="tx1"/>
+                      </a:solidFill>
+                      <a:prstDash val="solid"/>
+                      <a:round/>
+                      <a:headEnd type="none" w="med" len="med"/>
+                      <a:tailEnd type="none" w="med" len="med"/>
+                    </a:lnB>
+                  </a:tcPr>
+                </a:tc>
+                <a:tc>
+                  <a:txBody>
+                    <a:bodyPr/>
+                    <a:lstStyle/>
+                    <a:p>
+                      <a:pPr algn="ctr"/>
+                      <a:r>
+                        <a:rPr lang="fr-FR" dirty="0"/>
+                        <a:t>%</a:t>
+                      </a:r>
+                    </a:p>
+                  </a:txBody>
+                  <a:tcPr>
+                    <a:lnL w="12700" cap="flat" cmpd="sng" algn="ctr">
+                      <a:solidFill>
+                        <a:schemeClr val="tx1"/>
+                      </a:solidFill>
+                      <a:prstDash val="solid"/>
+                      <a:round/>
+                      <a:headEnd type="none" w="med" len="med"/>
+                      <a:tailEnd type="none" w="med" len="med"/>
+                    </a:lnL>
+                    <a:lnR w="12700" cap="flat" cmpd="sng" algn="ctr">
+                      <a:solidFill>
+                        <a:schemeClr val="tx1"/>
+                      </a:solidFill>
+                      <a:prstDash val="solid"/>
+                      <a:round/>
+                      <a:headEnd type="none" w="med" len="med"/>
+                      <a:tailEnd type="none" w="med" len="med"/>
+                    </a:lnR>
+                    <a:lnT w="12700" cap="flat" cmpd="sng" algn="ctr">
+                      <a:solidFill>
+                        <a:schemeClr val="tx1"/>
+                      </a:solidFill>
+                      <a:prstDash val="solid"/>
+                      <a:round/>
+                      <a:headEnd type="none" w="med" len="med"/>
+                      <a:tailEnd type="none" w="med" len="med"/>
+                    </a:lnT>
+                    <a:lnB w="12700" cap="flat" cmpd="sng" algn="ctr">
+                      <a:solidFill>
+                        <a:schemeClr val="tx1"/>
+                      </a:solidFill>
+                      <a:prstDash val="solid"/>
+                      <a:round/>
+                      <a:headEnd type="none" w="med" len="med"/>
+                      <a:tailEnd type="none" w="med" len="med"/>
+                    </a:lnB>
+                  </a:tcPr>
+                </a:tc>
+                <a:extLst>
+                  <a:ext uri="{0D108BD9-81ED-4DB2-BD59-A6C34878D82A}">
+                    <a16:rowId xmlns:a16="http://schemas.microsoft.com/office/drawing/2014/main" val="865389852"/>
+                  </a:ext>
+                </a:extLst>
+              </a:tr>
+              <a:tr h="374557">
+                <a:tc>
+                  <a:txBody>
+                    <a:bodyPr/>
+                    <a:lstStyle/>
+                    <a:p>
+                      <a:pPr algn="ctr"/>
+                      <a:r>
+                        <a:rPr lang="fr-FR" dirty="0"/>
+                        <a:t>Bluetooth </a:t>
+                      </a:r>
+                      <a:r>
+                        <a:rPr lang="fr-FR" dirty="0" err="1"/>
+                        <a:t>operation</a:t>
+                      </a:r>
+                      <a:r>
+                        <a:rPr lang="fr-FR" dirty="0"/>
+                        <a:t> distance</a:t>
+                      </a:r>
+                    </a:p>
+                  </a:txBody>
+                  <a:tcPr>
+                    <a:lnL w="12700" cap="flat" cmpd="sng" algn="ctr">
+                      <a:solidFill>
+                        <a:schemeClr val="tx1"/>
+                      </a:solidFill>
+                      <a:prstDash val="solid"/>
+                      <a:round/>
+                      <a:headEnd type="none" w="med" len="med"/>
+                      <a:tailEnd type="none" w="med" len="med"/>
+                    </a:lnL>
+                    <a:lnR w="12700" cap="flat" cmpd="sng" algn="ctr">
+                      <a:solidFill>
+                        <a:schemeClr val="tx1"/>
+                      </a:solidFill>
+                      <a:prstDash val="solid"/>
+                      <a:round/>
+                      <a:headEnd type="none" w="med" len="med"/>
+                      <a:tailEnd type="none" w="med" len="med"/>
+                    </a:lnR>
+                    <a:lnT w="12700" cap="flat" cmpd="sng" algn="ctr">
+                      <a:solidFill>
+                        <a:schemeClr val="tx1"/>
+                      </a:solidFill>
+                      <a:prstDash val="solid"/>
+                      <a:round/>
+                      <a:headEnd type="none" w="med" len="med"/>
+                      <a:tailEnd type="none" w="med" len="med"/>
+                    </a:lnT>
+                    <a:lnB w="12700" cap="flat" cmpd="sng" algn="ctr">
+                      <a:solidFill>
+                        <a:schemeClr val="tx1"/>
+                      </a:solidFill>
+                      <a:prstDash val="solid"/>
+                      <a:round/>
+                      <a:headEnd type="none" w="med" len="med"/>
+                      <a:tailEnd type="none" w="med" len="med"/>
+                    </a:lnB>
+                    <a:solidFill>
+                      <a:schemeClr val="bg1">
+                        <a:lumMod val="75000"/>
+                      </a:schemeClr>
+                    </a:solidFill>
+                  </a:tcPr>
+                </a:tc>
+                <a:tc>
+                  <a:txBody>
+                    <a:bodyPr/>
+                    <a:lstStyle/>
+                    <a:p>
+                      <a:pPr algn="ctr"/>
+                      <a:r>
+                        <a:rPr lang="fr-FR" dirty="0"/>
+                        <a:t>1±4</a:t>
+                      </a:r>
+                    </a:p>
+                  </a:txBody>
+                  <a:tcPr>
+                    <a:lnL w="12700" cap="flat" cmpd="sng" algn="ctr">
+                      <a:solidFill>
+                        <a:schemeClr val="tx1"/>
+                      </a:solidFill>
+                      <a:prstDash val="solid"/>
+                      <a:round/>
+                      <a:headEnd type="none" w="med" len="med"/>
+                      <a:tailEnd type="none" w="med" len="med"/>
+                    </a:lnL>
+                    <a:lnR w="12700" cap="flat" cmpd="sng" algn="ctr">
+                      <a:solidFill>
+                        <a:schemeClr val="tx1"/>
+                      </a:solidFill>
+                      <a:prstDash val="solid"/>
+                      <a:round/>
+                      <a:headEnd type="none" w="med" len="med"/>
+                      <a:tailEnd type="none" w="med" len="med"/>
+                    </a:lnR>
+                    <a:lnT w="12700" cap="flat" cmpd="sng" algn="ctr">
+                      <a:solidFill>
+                        <a:schemeClr val="tx1"/>
+                      </a:solidFill>
+                      <a:prstDash val="solid"/>
+                      <a:round/>
+                      <a:headEnd type="none" w="med" len="med"/>
+                      <a:tailEnd type="none" w="med" len="med"/>
+                    </a:lnT>
+                    <a:lnB w="12700" cap="flat" cmpd="sng" algn="ctr">
+                      <a:solidFill>
+                        <a:schemeClr val="tx1"/>
+                      </a:solidFill>
+                      <a:prstDash val="solid"/>
+                      <a:round/>
+                      <a:headEnd type="none" w="med" len="med"/>
+                      <a:tailEnd type="none" w="med" len="med"/>
+                    </a:lnB>
+                  </a:tcPr>
+                </a:tc>
+                <a:tc>
+                  <a:txBody>
+                    <a:bodyPr/>
+                    <a:lstStyle/>
+                    <a:p>
+                      <a:pPr algn="ctr"/>
+                      <a:r>
+                        <a:rPr lang="fr-FR" dirty="0"/>
+                        <a:t>m</a:t>
+                      </a:r>
+                    </a:p>
+                  </a:txBody>
+                  <a:tcPr>
+                    <a:lnL w="12700" cap="flat" cmpd="sng" algn="ctr">
+                      <a:solidFill>
+                        <a:schemeClr val="tx1"/>
+                      </a:solidFill>
+                      <a:prstDash val="solid"/>
+                      <a:round/>
+                      <a:headEnd type="none" w="med" len="med"/>
+                      <a:tailEnd type="none" w="med" len="med"/>
+                    </a:lnL>
+                    <a:lnR w="12700" cap="flat" cmpd="sng" algn="ctr">
+                      <a:solidFill>
+                        <a:schemeClr val="tx1"/>
+                      </a:solidFill>
+                      <a:prstDash val="solid"/>
+                      <a:round/>
+                      <a:headEnd type="none" w="med" len="med"/>
+                      <a:tailEnd type="none" w="med" len="med"/>
+                    </a:lnR>
+                    <a:lnT w="12700" cap="flat" cmpd="sng" algn="ctr">
+                      <a:solidFill>
+                        <a:schemeClr val="tx1"/>
+                      </a:solidFill>
+                      <a:prstDash val="solid"/>
+                      <a:round/>
+                      <a:headEnd type="none" w="med" len="med"/>
+                      <a:tailEnd type="none" w="med" len="med"/>
+                    </a:lnT>
+                    <a:lnB w="12700" cap="flat" cmpd="sng" algn="ctr">
+                      <a:solidFill>
+                        <a:schemeClr val="tx1"/>
+                      </a:solidFill>
+                      <a:prstDash val="solid"/>
+                      <a:round/>
+                      <a:headEnd type="none" w="med" len="med"/>
+                      <a:tailEnd type="none" w="med" len="med"/>
+                    </a:lnB>
+                  </a:tcPr>
+                </a:tc>
+                <a:extLst>
+                  <a:ext uri="{0D108BD9-81ED-4DB2-BD59-A6C34878D82A}">
+                    <a16:rowId xmlns:a16="http://schemas.microsoft.com/office/drawing/2014/main" val="3904461452"/>
+                  </a:ext>
+                </a:extLst>
+              </a:tr>
+            </a:tbl>
+          </a:graphicData>
+        </a:graphic>
+      </p:graphicFrame>
     </p:spTree>
     <p:extLst>
       <p:ext uri="{BB962C8B-B14F-4D97-AF65-F5344CB8AC3E}">
@@ -4184,7 +6575,7 @@
         </p:nvSpPr>
         <p:spPr>
           <a:xfrm>
-            <a:off x="125896" y="1377971"/>
+            <a:off x="125896" y="2926304"/>
             <a:ext cx="3693629" cy="369332"/>
           </a:xfrm>
           <a:prstGeom prst="rect">
@@ -4404,10 +6795,10 @@
       </p:sp>
       <p:sp>
         <p:nvSpPr>
-          <p:cNvPr id="14" name="ZoneTexte 13">
+          <p:cNvPr id="20" name="ZoneTexte 19">
             <a:extLst>
               <a:ext uri="{FF2B5EF4-FFF2-40B4-BE49-F238E27FC236}">
-                <a16:creationId xmlns:a16="http://schemas.microsoft.com/office/drawing/2014/main" id="{797E5605-BAD3-3266-C4AD-15F8796B4CC9}"/>
+                <a16:creationId xmlns:a16="http://schemas.microsoft.com/office/drawing/2014/main" id="{396F83C7-EA33-2FB7-E38B-6D91075CC22D}"/>
               </a:ext>
             </a:extLst>
           </p:cNvPr>
@@ -4416,8 +6807,8 @@
         </p:nvSpPr>
         <p:spPr>
           <a:xfrm>
-            <a:off x="159233" y="4170284"/>
-            <a:ext cx="2857500" cy="369332"/>
+            <a:off x="159233" y="1698263"/>
+            <a:ext cx="5761040" cy="646331"/>
           </a:xfrm>
           <a:prstGeom prst="rect">
             <a:avLst/>
@@ -4431,17 +6822,425 @@
           <a:lstStyle/>
           <a:p>
             <a:r>
-              <a:rPr lang="fr-FR" b="1" u="sng" dirty="0">
+              <a:rPr lang="fr-FR" dirty="0"/>
+              <a:t>Pencil type-unit of the </a:t>
+            </a:r>
+            <a:r>
+              <a:rPr lang="fr-FR" dirty="0" err="1"/>
+              <a:t>resistance</a:t>
+            </a:r>
+            <a:r>
+              <a:rPr lang="fr-FR" dirty="0"/>
+              <a:t> and the </a:t>
+            </a:r>
+            <a:r>
+              <a:rPr lang="fr-FR" dirty="0" err="1"/>
+              <a:t>resistance</a:t>
+            </a:r>
+            <a:r>
+              <a:rPr lang="fr-FR" dirty="0"/>
+              <a:t> </a:t>
+            </a:r>
+            <a:r>
+              <a:rPr lang="fr-FR" dirty="0" err="1"/>
+              <a:t>when</a:t>
+            </a:r>
+            <a:r>
+              <a:rPr lang="fr-FR" dirty="0"/>
+              <a:t> no </a:t>
+            </a:r>
+            <a:r>
+              <a:rPr lang="fr-FR" dirty="0" err="1"/>
+              <a:t>strain</a:t>
+            </a:r>
+            <a:r>
+              <a:rPr lang="fr-FR" dirty="0"/>
+              <a:t> </a:t>
+            </a:r>
+            <a:r>
+              <a:rPr lang="fr-FR" dirty="0" err="1"/>
+              <a:t>applied</a:t>
+            </a:r>
+            <a:endParaRPr lang="fr-FR" dirty="0"/>
+          </a:p>
+        </p:txBody>
+      </p:sp>
+      <p:sp>
+        <p:nvSpPr>
+          <p:cNvPr id="21" name="ZoneTexte 20">
+            <a:extLst>
+              <a:ext uri="{FF2B5EF4-FFF2-40B4-BE49-F238E27FC236}">
+                <a16:creationId xmlns:a16="http://schemas.microsoft.com/office/drawing/2014/main" id="{1F091296-1DF4-AB2A-06F2-975A135F539E}"/>
+              </a:ext>
+            </a:extLst>
+          </p:cNvPr>
+          <p:cNvSpPr txBox="1"/>
+          <p:nvPr/>
+        </p:nvSpPr>
+        <p:spPr>
+          <a:xfrm>
+            <a:off x="265353" y="4429373"/>
+            <a:ext cx="5761040" cy="646331"/>
+          </a:xfrm>
+          <a:prstGeom prst="rect">
+            <a:avLst/>
+          </a:prstGeom>
+          <a:noFill/>
+        </p:spPr>
+        <p:txBody>
+          <a:bodyPr wrap="square" rtlCol="0">
+            <a:spAutoFit/>
+          </a:bodyPr>
+          <a:lstStyle/>
+          <a:p>
+            <a:r>
+              <a:rPr lang="fr-FR" dirty="0"/>
+              <a:t>Courbes de </a:t>
+            </a:r>
+            <a:r>
+              <a:rPr lang="fr-FR" dirty="0" err="1"/>
+              <a:t>deltaR</a:t>
+            </a:r>
+            <a:r>
+              <a:rPr lang="fr-FR" dirty="0"/>
+              <a:t>/R0 en fonction de la </a:t>
+            </a:r>
+            <a:r>
+              <a:rPr lang="fr-FR" dirty="0" err="1"/>
+              <a:t>deformation</a:t>
+            </a:r>
+            <a:r>
+              <a:rPr lang="fr-FR" dirty="0"/>
+              <a:t> soit en % soit en cm</a:t>
+            </a:r>
+          </a:p>
+        </p:txBody>
+      </p:sp>
+    </p:spTree>
+    <p:extLst>
+      <p:ext uri="{BB962C8B-B14F-4D97-AF65-F5344CB8AC3E}">
+        <p14:creationId xmlns:p14="http://schemas.microsoft.com/office/powerpoint/2010/main" val="3233950406"/>
+      </p:ext>
+    </p:extLst>
+  </p:cSld>
+  <p:clrMapOvr>
+    <a:masterClrMapping/>
+  </p:clrMapOvr>
+</p:sld>
+</file>
+
+<file path=ppt/slides/slide4.xml><?xml version="1.0" encoding="utf-8"?>
+<p:sld xmlns:a="http://schemas.openxmlformats.org/drawingml/2006/main" xmlns:r="http://schemas.openxmlformats.org/officeDocument/2006/relationships" xmlns:p="http://schemas.openxmlformats.org/presentationml/2006/main">
+  <p:cSld>
+    <p:spTree>
+      <p:nvGrpSpPr>
+        <p:cNvPr id="1" name=""/>
+        <p:cNvGrpSpPr/>
+        <p:nvPr/>
+      </p:nvGrpSpPr>
+      <p:grpSpPr>
+        <a:xfrm>
+          <a:off x="0" y="0"/>
+          <a:ext cx="0" cy="0"/>
+          <a:chOff x="0" y="0"/>
+          <a:chExt cx="0" cy="0"/>
+        </a:xfrm>
+      </p:grpSpPr>
+      <p:sp>
+        <p:nvSpPr>
+          <p:cNvPr id="4" name="ZoneTexte 3">
+            <a:extLst>
+              <a:ext uri="{FF2B5EF4-FFF2-40B4-BE49-F238E27FC236}">
+                <a16:creationId xmlns:a16="http://schemas.microsoft.com/office/drawing/2014/main" id="{1A4C90C0-A119-2634-433A-F2F4F3791D52}"/>
+              </a:ext>
+            </a:extLst>
+          </p:cNvPr>
+          <p:cNvSpPr txBox="1"/>
+          <p:nvPr/>
+        </p:nvSpPr>
+        <p:spPr>
+          <a:xfrm>
+            <a:off x="125896" y="9484518"/>
+            <a:ext cx="2890837" cy="276999"/>
+          </a:xfrm>
+          <a:prstGeom prst="rect">
+            <a:avLst/>
+          </a:prstGeom>
+          <a:noFill/>
+        </p:spPr>
+        <p:txBody>
+          <a:bodyPr wrap="square" rtlCol="0">
+            <a:spAutoFit/>
+          </a:bodyPr>
+          <a:lstStyle/>
+          <a:p>
+            <a:r>
+              <a:rPr lang="fr-FR" sz="1200" dirty="0">
                 <a:latin typeface="Abadi" panose="020B0604020104020204" pitchFamily="34" charset="0"/>
               </a:rPr>
-              <a:t>Dimensions</a:t>
-            </a:r>
-            <a:r>
-              <a:rPr lang="fr-FR" dirty="0">
+              <a:t>HAMADI </a:t>
+            </a:r>
+            <a:r>
+              <a:rPr lang="fr-FR" sz="1200" dirty="0" err="1">
                 <a:latin typeface="Abadi" panose="020B0604020104020204" pitchFamily="34" charset="0"/>
               </a:rPr>
-              <a:t>: </a:t>
-            </a:r>
+              <a:t>Maoulida</a:t>
+            </a:r>
+            <a:r>
+              <a:rPr lang="fr-FR" sz="1200" dirty="0">
+                <a:latin typeface="Abadi" panose="020B0604020104020204" pitchFamily="34" charset="0"/>
+              </a:rPr>
+              <a:t> - TARTERA Maëlys</a:t>
+            </a:r>
+          </a:p>
+        </p:txBody>
+      </p:sp>
+      <p:cxnSp>
+        <p:nvCxnSpPr>
+          <p:cNvPr id="5" name="Connecteur droit 4">
+            <a:extLst>
+              <a:ext uri="{FF2B5EF4-FFF2-40B4-BE49-F238E27FC236}">
+                <a16:creationId xmlns:a16="http://schemas.microsoft.com/office/drawing/2014/main" id="{1EB347D6-BB79-E9C0-76AE-401AA7D3B582}"/>
+              </a:ext>
+            </a:extLst>
+          </p:cNvPr>
+          <p:cNvCxnSpPr/>
+          <p:nvPr/>
+        </p:nvCxnSpPr>
+        <p:spPr>
+          <a:xfrm>
+            <a:off x="221146" y="9446805"/>
+            <a:ext cx="6274904" cy="0"/>
+          </a:xfrm>
+          <a:prstGeom prst="line">
+            <a:avLst/>
+          </a:prstGeom>
+          <a:ln w="6350"/>
+        </p:spPr>
+        <p:style>
+          <a:lnRef idx="2">
+            <a:schemeClr val="dk1"/>
+          </a:lnRef>
+          <a:fillRef idx="0">
+            <a:schemeClr val="dk1"/>
+          </a:fillRef>
+          <a:effectRef idx="1">
+            <a:schemeClr val="dk1"/>
+          </a:effectRef>
+          <a:fontRef idx="minor">
+            <a:schemeClr val="tx1"/>
+          </a:fontRef>
+        </p:style>
+      </p:cxnSp>
+      <p:sp>
+        <p:nvSpPr>
+          <p:cNvPr id="6" name="ZoneTexte 5">
+            <a:extLst>
+              <a:ext uri="{FF2B5EF4-FFF2-40B4-BE49-F238E27FC236}">
+                <a16:creationId xmlns:a16="http://schemas.microsoft.com/office/drawing/2014/main" id="{A042F4A8-CD79-9840-1791-5ACD0BD1E4E7}"/>
+              </a:ext>
+            </a:extLst>
+          </p:cNvPr>
+          <p:cNvSpPr txBox="1"/>
+          <p:nvPr/>
+        </p:nvSpPr>
+        <p:spPr>
+          <a:xfrm>
+            <a:off x="6286500" y="9484518"/>
+            <a:ext cx="308098" cy="369332"/>
+          </a:xfrm>
+          <a:prstGeom prst="rect">
+            <a:avLst/>
+          </a:prstGeom>
+          <a:noFill/>
+        </p:spPr>
+        <p:txBody>
+          <a:bodyPr wrap="none" rtlCol="0">
+            <a:spAutoFit/>
+          </a:bodyPr>
+          <a:lstStyle/>
+          <a:p>
+            <a:r>
+              <a:rPr lang="fr-FR" dirty="0"/>
+              <a:t>4</a:t>
+            </a:r>
+          </a:p>
+        </p:txBody>
+      </p:sp>
+      <p:cxnSp>
+        <p:nvCxnSpPr>
+          <p:cNvPr id="7" name="Connecteur droit 6">
+            <a:extLst>
+              <a:ext uri="{FF2B5EF4-FFF2-40B4-BE49-F238E27FC236}">
+                <a16:creationId xmlns:a16="http://schemas.microsoft.com/office/drawing/2014/main" id="{327A0165-2137-A16A-614E-B91AAFC86BAB}"/>
+              </a:ext>
+            </a:extLst>
+          </p:cNvPr>
+          <p:cNvCxnSpPr/>
+          <p:nvPr/>
+        </p:nvCxnSpPr>
+        <p:spPr>
+          <a:xfrm>
+            <a:off x="221146" y="966787"/>
+            <a:ext cx="6274904" cy="0"/>
+          </a:xfrm>
+          <a:prstGeom prst="line">
+            <a:avLst/>
+          </a:prstGeom>
+          <a:ln w="76200"/>
+        </p:spPr>
+        <p:style>
+          <a:lnRef idx="2">
+            <a:schemeClr val="dk1"/>
+          </a:lnRef>
+          <a:fillRef idx="0">
+            <a:schemeClr val="dk1"/>
+          </a:fillRef>
+          <a:effectRef idx="1">
+            <a:schemeClr val="dk1"/>
+          </a:effectRef>
+          <a:fontRef idx="minor">
+            <a:schemeClr val="tx1"/>
+          </a:fontRef>
+        </p:style>
+      </p:cxnSp>
+      <p:cxnSp>
+        <p:nvCxnSpPr>
+          <p:cNvPr id="8" name="Connecteur droit 7">
+            <a:extLst>
+              <a:ext uri="{FF2B5EF4-FFF2-40B4-BE49-F238E27FC236}">
+                <a16:creationId xmlns:a16="http://schemas.microsoft.com/office/drawing/2014/main" id="{BC65B826-22D5-8144-6CF9-4129F94EADBD}"/>
+              </a:ext>
+            </a:extLst>
+          </p:cNvPr>
+          <p:cNvCxnSpPr/>
+          <p:nvPr/>
+        </p:nvCxnSpPr>
+        <p:spPr>
+          <a:xfrm>
+            <a:off x="221146" y="1109662"/>
+            <a:ext cx="6274904" cy="0"/>
+          </a:xfrm>
+          <a:prstGeom prst="line">
+            <a:avLst/>
+          </a:prstGeom>
+          <a:ln w="28575"/>
+        </p:spPr>
+        <p:style>
+          <a:lnRef idx="2">
+            <a:schemeClr val="dk1"/>
+          </a:lnRef>
+          <a:fillRef idx="0">
+            <a:schemeClr val="dk1"/>
+          </a:fillRef>
+          <a:effectRef idx="1">
+            <a:schemeClr val="dk1"/>
+          </a:effectRef>
+          <a:fontRef idx="minor">
+            <a:schemeClr val="tx1"/>
+          </a:fontRef>
+        </p:style>
+      </p:cxnSp>
+      <p:pic>
+        <p:nvPicPr>
+          <p:cNvPr id="9" name="Picture 2" descr="INSA Toulouse">
+            <a:extLst>
+              <a:ext uri="{FF2B5EF4-FFF2-40B4-BE49-F238E27FC236}">
+                <a16:creationId xmlns:a16="http://schemas.microsoft.com/office/drawing/2014/main" id="{6574BE70-21C9-2EA1-0CBA-3D63594CBD33}"/>
+              </a:ext>
+            </a:extLst>
+          </p:cNvPr>
+          <p:cNvPicPr>
+            <a:picLocks noChangeAspect="1" noChangeArrowheads="1"/>
+          </p:cNvPicPr>
+          <p:nvPr/>
+        </p:nvPicPr>
+        <p:blipFill rotWithShape="1">
+          <a:blip r:embed="rId2">
+            <a:extLst>
+              <a:ext uri="{28A0092B-C50C-407E-A947-70E740481C1C}">
+                <a14:useLocalDpi xmlns:a14="http://schemas.microsoft.com/office/drawing/2010/main" val="0"/>
+              </a:ext>
+            </a:extLst>
+          </a:blip>
+          <a:srcRect b="16429"/>
+          <a:stretch/>
+        </p:blipFill>
+        <p:spPr bwMode="auto">
+          <a:xfrm>
+            <a:off x="221146" y="15590"/>
+            <a:ext cx="1066800" cy="891544"/>
+          </a:xfrm>
+          <a:prstGeom prst="rect">
+            <a:avLst/>
+          </a:prstGeom>
+          <a:noFill/>
+          <a:extLst>
+            <a:ext uri="{909E8E84-426E-40DD-AFC4-6F175D3DCCD1}">
+              <a14:hiddenFill xmlns:a14="http://schemas.microsoft.com/office/drawing/2010/main">
+                <a:solidFill>
+                  <a:srgbClr val="FFFFFF"/>
+                </a:solidFill>
+              </a14:hiddenFill>
+            </a:ext>
+          </a:extLst>
+        </p:spPr>
+      </p:pic>
+      <p:sp>
+        <p:nvSpPr>
+          <p:cNvPr id="10" name="ZoneTexte 9">
+            <a:extLst>
+              <a:ext uri="{FF2B5EF4-FFF2-40B4-BE49-F238E27FC236}">
+                <a16:creationId xmlns:a16="http://schemas.microsoft.com/office/drawing/2014/main" id="{A8898891-C1B9-19EE-F3A8-3B5117BA3295}"/>
+              </a:ext>
+            </a:extLst>
+          </p:cNvPr>
+          <p:cNvSpPr txBox="1"/>
+          <p:nvPr/>
+        </p:nvSpPr>
+        <p:spPr>
+          <a:xfrm>
+            <a:off x="1892782" y="454283"/>
+            <a:ext cx="5441468" cy="369332"/>
+          </a:xfrm>
+          <a:prstGeom prst="rect">
+            <a:avLst/>
+          </a:prstGeom>
+          <a:noFill/>
+        </p:spPr>
+        <p:txBody>
+          <a:bodyPr wrap="square" rtlCol="0">
+            <a:spAutoFit/>
+          </a:bodyPr>
+          <a:lstStyle/>
+          <a:p>
+            <a:r>
+              <a:rPr lang="fr-FR" b="1" dirty="0">
+                <a:latin typeface="Abadi" panose="020B0604020104020204" pitchFamily="34" charset="0"/>
+              </a:rPr>
+              <a:t>GT-LGT2803-Low Tech Graphite </a:t>
+            </a:r>
+            <a:r>
+              <a:rPr lang="fr-FR" b="1" dirty="0" err="1">
+                <a:latin typeface="Abadi" panose="020B0604020104020204" pitchFamily="34" charset="0"/>
+              </a:rPr>
+              <a:t>Strain</a:t>
+            </a:r>
+            <a:r>
+              <a:rPr lang="fr-FR" b="1" dirty="0">
+                <a:latin typeface="Abadi" panose="020B0604020104020204" pitchFamily="34" charset="0"/>
+              </a:rPr>
+              <a:t> </a:t>
+            </a:r>
+            <a:r>
+              <a:rPr lang="fr-FR" b="1" dirty="0" err="1">
+                <a:latin typeface="Abadi" panose="020B0604020104020204" pitchFamily="34" charset="0"/>
+              </a:rPr>
+              <a:t>Sensor</a:t>
+            </a:r>
+            <a:endParaRPr lang="fr-FR" b="1" dirty="0">
+              <a:latin typeface="Abadi" panose="020B0604020104020204" pitchFamily="34" charset="0"/>
+            </a:endParaRPr>
           </a:p>
         </p:txBody>
       </p:sp>
@@ -4459,7 +7258,7 @@
         </p:nvSpPr>
         <p:spPr>
           <a:xfrm>
-            <a:off x="125896" y="6103859"/>
+            <a:off x="142564" y="1289903"/>
             <a:ext cx="2857500" cy="369332"/>
           </a:xfrm>
           <a:prstGeom prst="rect">
@@ -4494,10 +7293,667 @@
           </a:p>
         </p:txBody>
       </p:sp>
+      <p:pic>
+        <p:nvPicPr>
+          <p:cNvPr id="19" name="Image 18">
+            <a:extLst>
+              <a:ext uri="{FF2B5EF4-FFF2-40B4-BE49-F238E27FC236}">
+                <a16:creationId xmlns:a16="http://schemas.microsoft.com/office/drawing/2014/main" id="{CD543208-3651-6C55-568A-ABC5969E6775}"/>
+              </a:ext>
+            </a:extLst>
+          </p:cNvPr>
+          <p:cNvPicPr>
+            <a:picLocks noChangeAspect="1"/>
+          </p:cNvPicPr>
+          <p:nvPr/>
+        </p:nvPicPr>
+        <p:blipFill>
+          <a:blip r:embed="rId3"/>
+          <a:stretch>
+            <a:fillRect/>
+          </a:stretch>
+        </p:blipFill>
+        <p:spPr>
+          <a:xfrm>
+            <a:off x="221146" y="1778830"/>
+            <a:ext cx="5900739" cy="2048468"/>
+          </a:xfrm>
+          <a:prstGeom prst="rect">
+            <a:avLst/>
+          </a:prstGeom>
+        </p:spPr>
+      </p:pic>
+      <p:sp>
+        <p:nvSpPr>
+          <p:cNvPr id="13" name="ZoneTexte 12">
+            <a:extLst>
+              <a:ext uri="{FF2B5EF4-FFF2-40B4-BE49-F238E27FC236}">
+                <a16:creationId xmlns:a16="http://schemas.microsoft.com/office/drawing/2014/main" id="{67C71F0A-70DE-B87C-7E2D-EF1061F36C38}"/>
+              </a:ext>
+            </a:extLst>
+          </p:cNvPr>
+          <p:cNvSpPr txBox="1"/>
+          <p:nvPr/>
+        </p:nvSpPr>
+        <p:spPr>
+          <a:xfrm>
+            <a:off x="201251" y="4163402"/>
+            <a:ext cx="6218210" cy="1169551"/>
+          </a:xfrm>
+          <a:prstGeom prst="rect">
+            <a:avLst/>
+          </a:prstGeom>
+          <a:noFill/>
+        </p:spPr>
+        <p:txBody>
+          <a:bodyPr wrap="square" rtlCol="0">
+            <a:spAutoFit/>
+          </a:bodyPr>
+          <a:lstStyle/>
+          <a:p>
+            <a:r>
+              <a:rPr lang="fr-FR" sz="1400" dirty="0">
+                <a:latin typeface="Arial" panose="020B0604020202020204" pitchFamily="34" charset="0"/>
+                <a:cs typeface="Arial" panose="020B0604020202020204" pitchFamily="34" charset="0"/>
+              </a:rPr>
+              <a:t>The graphite </a:t>
+            </a:r>
+            <a:r>
+              <a:rPr lang="fr-FR" sz="1400" dirty="0" err="1">
+                <a:latin typeface="Arial" panose="020B0604020202020204" pitchFamily="34" charset="0"/>
+                <a:cs typeface="Arial" panose="020B0604020202020204" pitchFamily="34" charset="0"/>
+              </a:rPr>
+              <a:t>strain</a:t>
+            </a:r>
+            <a:r>
+              <a:rPr lang="fr-FR" sz="1400" dirty="0">
+                <a:latin typeface="Arial" panose="020B0604020202020204" pitchFamily="34" charset="0"/>
+                <a:cs typeface="Arial" panose="020B0604020202020204" pitchFamily="34" charset="0"/>
+              </a:rPr>
+              <a:t> </a:t>
+            </a:r>
+            <a:r>
+              <a:rPr lang="fr-FR" sz="1400" dirty="0" err="1">
+                <a:latin typeface="Arial" panose="020B0604020202020204" pitchFamily="34" charset="0"/>
+                <a:cs typeface="Arial" panose="020B0604020202020204" pitchFamily="34" charset="0"/>
+              </a:rPr>
+              <a:t>sensor</a:t>
+            </a:r>
+            <a:r>
+              <a:rPr lang="fr-FR" sz="1400" dirty="0">
+                <a:latin typeface="Arial" panose="020B0604020202020204" pitchFamily="34" charset="0"/>
+                <a:cs typeface="Arial" panose="020B0604020202020204" pitchFamily="34" charset="0"/>
+              </a:rPr>
+              <a:t> GT-LGT2803 </a:t>
+            </a:r>
+            <a:r>
+              <a:rPr lang="fr-FR" sz="1400" dirty="0" err="1">
+                <a:latin typeface="Arial" panose="020B0604020202020204" pitchFamily="34" charset="0"/>
+                <a:cs typeface="Arial" panose="020B0604020202020204" pitchFamily="34" charset="0"/>
+              </a:rPr>
+              <a:t>is</a:t>
+            </a:r>
+            <a:r>
+              <a:rPr lang="fr-FR" sz="1400" dirty="0">
+                <a:latin typeface="Arial" panose="020B0604020202020204" pitchFamily="34" charset="0"/>
+                <a:cs typeface="Arial" panose="020B0604020202020204" pitchFamily="34" charset="0"/>
+              </a:rPr>
+              <a:t> </a:t>
+            </a:r>
+            <a:r>
+              <a:rPr lang="fr-FR" sz="1400" dirty="0" err="1">
+                <a:latin typeface="Arial" panose="020B0604020202020204" pitchFamily="34" charset="0"/>
+                <a:cs typeface="Arial" panose="020B0604020202020204" pitchFamily="34" charset="0"/>
+              </a:rPr>
+              <a:t>connected</a:t>
+            </a:r>
+            <a:r>
+              <a:rPr lang="fr-FR" sz="1400" dirty="0">
+                <a:latin typeface="Arial" panose="020B0604020202020204" pitchFamily="34" charset="0"/>
+                <a:cs typeface="Arial" panose="020B0604020202020204" pitchFamily="34" charset="0"/>
+              </a:rPr>
+              <a:t> to a Vcc=5V power </a:t>
+            </a:r>
+            <a:r>
+              <a:rPr lang="fr-FR" sz="1400" dirty="0" err="1">
+                <a:latin typeface="Arial" panose="020B0604020202020204" pitchFamily="34" charset="0"/>
+                <a:cs typeface="Arial" panose="020B0604020202020204" pitchFamily="34" charset="0"/>
+              </a:rPr>
+              <a:t>supply</a:t>
+            </a:r>
+            <a:r>
+              <a:rPr lang="fr-FR" sz="1400" dirty="0">
+                <a:latin typeface="Arial" panose="020B0604020202020204" pitchFamily="34" charset="0"/>
+                <a:cs typeface="Arial" panose="020B0604020202020204" pitchFamily="34" charset="0"/>
+              </a:rPr>
+              <a:t> on </a:t>
+            </a:r>
+            <a:r>
+              <a:rPr lang="fr-FR" sz="1400" dirty="0" err="1">
+                <a:latin typeface="Arial" panose="020B0604020202020204" pitchFamily="34" charset="0"/>
+                <a:cs typeface="Arial" panose="020B0604020202020204" pitchFamily="34" charset="0"/>
+              </a:rPr>
+              <a:t>its</a:t>
+            </a:r>
+            <a:r>
+              <a:rPr lang="fr-FR" sz="1400" dirty="0">
+                <a:latin typeface="Arial" panose="020B0604020202020204" pitchFamily="34" charset="0"/>
+                <a:cs typeface="Arial" panose="020B0604020202020204" pitchFamily="34" charset="0"/>
+              </a:rPr>
+              <a:t> pin 2, </a:t>
+            </a:r>
+            <a:r>
+              <a:rPr lang="fr-FR" sz="1400" dirty="0" err="1">
+                <a:latin typeface="Arial" panose="020B0604020202020204" pitchFamily="34" charset="0"/>
+                <a:cs typeface="Arial" panose="020B0604020202020204" pitchFamily="34" charset="0"/>
+              </a:rPr>
+              <a:t>its</a:t>
+            </a:r>
+            <a:r>
+              <a:rPr lang="fr-FR" sz="1400" dirty="0">
+                <a:latin typeface="Arial" panose="020B0604020202020204" pitchFamily="34" charset="0"/>
+                <a:cs typeface="Arial" panose="020B0604020202020204" pitchFamily="34" charset="0"/>
+              </a:rPr>
+              <a:t> pin 1 </a:t>
+            </a:r>
+            <a:r>
+              <a:rPr lang="fr-FR" sz="1400" dirty="0" err="1">
+                <a:latin typeface="Arial" panose="020B0604020202020204" pitchFamily="34" charset="0"/>
+                <a:cs typeface="Arial" panose="020B0604020202020204" pitchFamily="34" charset="0"/>
+              </a:rPr>
+              <a:t>is</a:t>
+            </a:r>
+            <a:r>
+              <a:rPr lang="fr-FR" sz="1400" dirty="0">
+                <a:latin typeface="Arial" panose="020B0604020202020204" pitchFamily="34" charset="0"/>
+                <a:cs typeface="Arial" panose="020B0604020202020204" pitchFamily="34" charset="0"/>
+              </a:rPr>
+              <a:t> </a:t>
+            </a:r>
+            <a:r>
+              <a:rPr lang="fr-FR" sz="1400" dirty="0" err="1">
+                <a:latin typeface="Arial" panose="020B0604020202020204" pitchFamily="34" charset="0"/>
+                <a:cs typeface="Arial" panose="020B0604020202020204" pitchFamily="34" charset="0"/>
+              </a:rPr>
+              <a:t>connected</a:t>
+            </a:r>
+            <a:r>
+              <a:rPr lang="fr-FR" sz="1400" dirty="0">
+                <a:latin typeface="Arial" panose="020B0604020202020204" pitchFamily="34" charset="0"/>
+                <a:cs typeface="Arial" panose="020B0604020202020204" pitchFamily="34" charset="0"/>
+              </a:rPr>
+              <a:t> to a </a:t>
+            </a:r>
+            <a:r>
+              <a:rPr lang="fr-FR" sz="1400" dirty="0" err="1">
+                <a:latin typeface="Arial" panose="020B0604020202020204" pitchFamily="34" charset="0"/>
+                <a:cs typeface="Arial" panose="020B0604020202020204" pitchFamily="34" charset="0"/>
+              </a:rPr>
+              <a:t>transimpedence</a:t>
+            </a:r>
+            <a:r>
+              <a:rPr lang="fr-FR" sz="1400" dirty="0">
+                <a:latin typeface="Arial" panose="020B0604020202020204" pitchFamily="34" charset="0"/>
+                <a:cs typeface="Arial" panose="020B0604020202020204" pitchFamily="34" charset="0"/>
+              </a:rPr>
+              <a:t> amplifier circuit </a:t>
+            </a:r>
+            <a:r>
+              <a:rPr lang="fr-FR" sz="1400" dirty="0" err="1">
+                <a:latin typeface="Arial" panose="020B0604020202020204" pitchFamily="34" charset="0"/>
+                <a:cs typeface="Arial" panose="020B0604020202020204" pitchFamily="34" charset="0"/>
+              </a:rPr>
+              <a:t>designed</a:t>
+            </a:r>
+            <a:r>
+              <a:rPr lang="fr-FR" sz="1400" dirty="0">
+                <a:latin typeface="Arial" panose="020B0604020202020204" pitchFamily="34" charset="0"/>
+                <a:cs typeface="Arial" panose="020B0604020202020204" pitchFamily="34" charset="0"/>
+              </a:rPr>
+              <a:t> to cancel noise. </a:t>
+            </a:r>
+          </a:p>
+          <a:p>
+            <a:endParaRPr lang="fr-FR" sz="1400">
+              <a:latin typeface="Arial" panose="020B0604020202020204" pitchFamily="34" charset="0"/>
+              <a:cs typeface="Arial" panose="020B0604020202020204" pitchFamily="34" charset="0"/>
+            </a:endParaRPr>
+          </a:p>
+          <a:p>
+            <a:r>
+              <a:rPr lang="fr-FR" sz="1400">
+                <a:latin typeface="Arial" panose="020B0604020202020204" pitchFamily="34" charset="0"/>
+                <a:cs typeface="Arial" panose="020B0604020202020204" pitchFamily="34" charset="0"/>
+              </a:rPr>
+              <a:t>and </a:t>
+            </a:r>
+            <a:r>
+              <a:rPr lang="fr-FR" sz="1400" dirty="0" err="1">
+                <a:latin typeface="Arial" panose="020B0604020202020204" pitchFamily="34" charset="0"/>
+                <a:cs typeface="Arial" panose="020B0604020202020204" pitchFamily="34" charset="0"/>
+              </a:rPr>
+              <a:t>allow</a:t>
+            </a:r>
+            <a:r>
+              <a:rPr lang="fr-FR" sz="1400" dirty="0">
+                <a:latin typeface="Arial" panose="020B0604020202020204" pitchFamily="34" charset="0"/>
+                <a:cs typeface="Arial" panose="020B0604020202020204" pitchFamily="34" charset="0"/>
+              </a:rPr>
+              <a:t> the GT-LGT2803 to </a:t>
+            </a:r>
+            <a:r>
+              <a:rPr lang="fr-FR" sz="1400" dirty="0" err="1">
+                <a:latin typeface="Arial" panose="020B0604020202020204" pitchFamily="34" charset="0"/>
+                <a:cs typeface="Arial" panose="020B0604020202020204" pitchFamily="34" charset="0"/>
+              </a:rPr>
+              <a:t>be</a:t>
+            </a:r>
+            <a:r>
+              <a:rPr lang="fr-FR" sz="1400" dirty="0">
+                <a:latin typeface="Arial" panose="020B0604020202020204" pitchFamily="34" charset="0"/>
+                <a:cs typeface="Arial" panose="020B0604020202020204" pitchFamily="34" charset="0"/>
+              </a:rPr>
+              <a:t> </a:t>
+            </a:r>
+            <a:r>
+              <a:rPr lang="fr-FR" sz="1400" dirty="0" err="1">
+                <a:latin typeface="Arial" panose="020B0604020202020204" pitchFamily="34" charset="0"/>
+                <a:cs typeface="Arial" panose="020B0604020202020204" pitchFamily="34" charset="0"/>
+              </a:rPr>
+              <a:t>connected</a:t>
+            </a:r>
+            <a:r>
+              <a:rPr lang="fr-FR" sz="1400" dirty="0">
+                <a:latin typeface="Arial" panose="020B0604020202020204" pitchFamily="34" charset="0"/>
+                <a:cs typeface="Arial" panose="020B0604020202020204" pitchFamily="34" charset="0"/>
+              </a:rPr>
+              <a:t> to an </a:t>
+            </a:r>
+          </a:p>
+        </p:txBody>
+      </p:sp>
     </p:spTree>
     <p:extLst>
       <p:ext uri="{BB962C8B-B14F-4D97-AF65-F5344CB8AC3E}">
-        <p14:creationId xmlns:p14="http://schemas.microsoft.com/office/powerpoint/2010/main" val="3233950406"/>
+        <p14:creationId xmlns:p14="http://schemas.microsoft.com/office/powerpoint/2010/main" val="2208176943"/>
+      </p:ext>
+    </p:extLst>
+  </p:cSld>
+  <p:clrMapOvr>
+    <a:masterClrMapping/>
+  </p:clrMapOvr>
+</p:sld>
+</file>
+
+<file path=ppt/slides/slide5.xml><?xml version="1.0" encoding="utf-8"?>
+<p:sld xmlns:a="http://schemas.openxmlformats.org/drawingml/2006/main" xmlns:r="http://schemas.openxmlformats.org/officeDocument/2006/relationships" xmlns:p="http://schemas.openxmlformats.org/presentationml/2006/main">
+  <p:cSld>
+    <p:spTree>
+      <p:nvGrpSpPr>
+        <p:cNvPr id="1" name=""/>
+        <p:cNvGrpSpPr/>
+        <p:nvPr/>
+      </p:nvGrpSpPr>
+      <p:grpSpPr>
+        <a:xfrm>
+          <a:off x="0" y="0"/>
+          <a:ext cx="0" cy="0"/>
+          <a:chOff x="0" y="0"/>
+          <a:chExt cx="0" cy="0"/>
+        </a:xfrm>
+      </p:grpSpPr>
+      <p:sp>
+        <p:nvSpPr>
+          <p:cNvPr id="2" name="Titre 1">
+            <a:extLst>
+              <a:ext uri="{FF2B5EF4-FFF2-40B4-BE49-F238E27FC236}">
+                <a16:creationId xmlns:a16="http://schemas.microsoft.com/office/drawing/2014/main" id="{B990268B-324A-E3BD-5462-E3FA86D1B626}"/>
+              </a:ext>
+            </a:extLst>
+          </p:cNvPr>
+          <p:cNvSpPr>
+            <a:spLocks noGrp="1"/>
+          </p:cNvSpPr>
+          <p:nvPr>
+            <p:ph type="title"/>
+          </p:nvPr>
+        </p:nvSpPr>
+        <p:spPr/>
+        <p:txBody>
+          <a:bodyPr/>
+          <a:lstStyle/>
+          <a:p>
+            <a:endParaRPr lang="fr-FR"/>
+          </a:p>
+        </p:txBody>
+      </p:sp>
+      <p:sp>
+        <p:nvSpPr>
+          <p:cNvPr id="3" name="Espace réservé du contenu 2">
+            <a:extLst>
+              <a:ext uri="{FF2B5EF4-FFF2-40B4-BE49-F238E27FC236}">
+                <a16:creationId xmlns:a16="http://schemas.microsoft.com/office/drawing/2014/main" id="{C832128D-AC11-56DD-C132-CFC302EA7E16}"/>
+              </a:ext>
+            </a:extLst>
+          </p:cNvPr>
+          <p:cNvSpPr>
+            <a:spLocks noGrp="1"/>
+          </p:cNvSpPr>
+          <p:nvPr>
+            <p:ph idx="1"/>
+          </p:nvPr>
+        </p:nvSpPr>
+        <p:spPr/>
+        <p:txBody>
+          <a:bodyPr/>
+          <a:lstStyle/>
+          <a:p>
+            <a:endParaRPr lang="fr-FR"/>
+          </a:p>
+        </p:txBody>
+      </p:sp>
+      <p:sp>
+        <p:nvSpPr>
+          <p:cNvPr id="4" name="ZoneTexte 3">
+            <a:extLst>
+              <a:ext uri="{FF2B5EF4-FFF2-40B4-BE49-F238E27FC236}">
+                <a16:creationId xmlns:a16="http://schemas.microsoft.com/office/drawing/2014/main" id="{E723174D-DA9A-B1D4-1AAF-24789B090C3F}"/>
+              </a:ext>
+            </a:extLst>
+          </p:cNvPr>
+          <p:cNvSpPr txBox="1"/>
+          <p:nvPr/>
+        </p:nvSpPr>
+        <p:spPr>
+          <a:xfrm>
+            <a:off x="125896" y="9484518"/>
+            <a:ext cx="2890837" cy="276999"/>
+          </a:xfrm>
+          <a:prstGeom prst="rect">
+            <a:avLst/>
+          </a:prstGeom>
+          <a:noFill/>
+        </p:spPr>
+        <p:txBody>
+          <a:bodyPr wrap="square" rtlCol="0">
+            <a:spAutoFit/>
+          </a:bodyPr>
+          <a:lstStyle/>
+          <a:p>
+            <a:r>
+              <a:rPr lang="fr-FR" sz="1200" dirty="0">
+                <a:latin typeface="Abadi" panose="020B0604020104020204" pitchFamily="34" charset="0"/>
+              </a:rPr>
+              <a:t>HAMADI </a:t>
+            </a:r>
+            <a:r>
+              <a:rPr lang="fr-FR" sz="1200" dirty="0" err="1">
+                <a:latin typeface="Abadi" panose="020B0604020104020204" pitchFamily="34" charset="0"/>
+              </a:rPr>
+              <a:t>Maoulida</a:t>
+            </a:r>
+            <a:r>
+              <a:rPr lang="fr-FR" sz="1200" dirty="0">
+                <a:latin typeface="Abadi" panose="020B0604020104020204" pitchFamily="34" charset="0"/>
+              </a:rPr>
+              <a:t> - TARTERA Maëlys</a:t>
+            </a:r>
+          </a:p>
+        </p:txBody>
+      </p:sp>
+      <p:cxnSp>
+        <p:nvCxnSpPr>
+          <p:cNvPr id="5" name="Connecteur droit 4">
+            <a:extLst>
+              <a:ext uri="{FF2B5EF4-FFF2-40B4-BE49-F238E27FC236}">
+                <a16:creationId xmlns:a16="http://schemas.microsoft.com/office/drawing/2014/main" id="{003466D4-26E2-246C-D429-03323C58E5D3}"/>
+              </a:ext>
+            </a:extLst>
+          </p:cNvPr>
+          <p:cNvCxnSpPr/>
+          <p:nvPr/>
+        </p:nvCxnSpPr>
+        <p:spPr>
+          <a:xfrm>
+            <a:off x="221146" y="9446805"/>
+            <a:ext cx="6274904" cy="0"/>
+          </a:xfrm>
+          <a:prstGeom prst="line">
+            <a:avLst/>
+          </a:prstGeom>
+          <a:ln w="6350"/>
+        </p:spPr>
+        <p:style>
+          <a:lnRef idx="2">
+            <a:schemeClr val="dk1"/>
+          </a:lnRef>
+          <a:fillRef idx="0">
+            <a:schemeClr val="dk1"/>
+          </a:fillRef>
+          <a:effectRef idx="1">
+            <a:schemeClr val="dk1"/>
+          </a:effectRef>
+          <a:fontRef idx="minor">
+            <a:schemeClr val="tx1"/>
+          </a:fontRef>
+        </p:style>
+      </p:cxnSp>
+      <p:sp>
+        <p:nvSpPr>
+          <p:cNvPr id="6" name="ZoneTexte 5">
+            <a:extLst>
+              <a:ext uri="{FF2B5EF4-FFF2-40B4-BE49-F238E27FC236}">
+                <a16:creationId xmlns:a16="http://schemas.microsoft.com/office/drawing/2014/main" id="{294D0207-601E-AAC2-3F5C-BBE6E06836A5}"/>
+              </a:ext>
+            </a:extLst>
+          </p:cNvPr>
+          <p:cNvSpPr txBox="1"/>
+          <p:nvPr/>
+        </p:nvSpPr>
+        <p:spPr>
+          <a:xfrm>
+            <a:off x="6286500" y="9484518"/>
+            <a:ext cx="308098" cy="369332"/>
+          </a:xfrm>
+          <a:prstGeom prst="rect">
+            <a:avLst/>
+          </a:prstGeom>
+          <a:noFill/>
+        </p:spPr>
+        <p:txBody>
+          <a:bodyPr wrap="none" rtlCol="0">
+            <a:spAutoFit/>
+          </a:bodyPr>
+          <a:lstStyle/>
+          <a:p>
+            <a:r>
+              <a:rPr lang="fr-FR" dirty="0"/>
+              <a:t>5</a:t>
+            </a:r>
+          </a:p>
+        </p:txBody>
+      </p:sp>
+      <p:cxnSp>
+        <p:nvCxnSpPr>
+          <p:cNvPr id="7" name="Connecteur droit 6">
+            <a:extLst>
+              <a:ext uri="{FF2B5EF4-FFF2-40B4-BE49-F238E27FC236}">
+                <a16:creationId xmlns:a16="http://schemas.microsoft.com/office/drawing/2014/main" id="{88922098-C172-D1BE-8919-5F867EDEA7D0}"/>
+              </a:ext>
+            </a:extLst>
+          </p:cNvPr>
+          <p:cNvCxnSpPr/>
+          <p:nvPr/>
+        </p:nvCxnSpPr>
+        <p:spPr>
+          <a:xfrm>
+            <a:off x="221146" y="966787"/>
+            <a:ext cx="6274904" cy="0"/>
+          </a:xfrm>
+          <a:prstGeom prst="line">
+            <a:avLst/>
+          </a:prstGeom>
+          <a:ln w="76200"/>
+        </p:spPr>
+        <p:style>
+          <a:lnRef idx="2">
+            <a:schemeClr val="dk1"/>
+          </a:lnRef>
+          <a:fillRef idx="0">
+            <a:schemeClr val="dk1"/>
+          </a:fillRef>
+          <a:effectRef idx="1">
+            <a:schemeClr val="dk1"/>
+          </a:effectRef>
+          <a:fontRef idx="minor">
+            <a:schemeClr val="tx1"/>
+          </a:fontRef>
+        </p:style>
+      </p:cxnSp>
+      <p:cxnSp>
+        <p:nvCxnSpPr>
+          <p:cNvPr id="8" name="Connecteur droit 7">
+            <a:extLst>
+              <a:ext uri="{FF2B5EF4-FFF2-40B4-BE49-F238E27FC236}">
+                <a16:creationId xmlns:a16="http://schemas.microsoft.com/office/drawing/2014/main" id="{29539393-5BB9-2AB6-0A51-C38FCAE420DC}"/>
+              </a:ext>
+            </a:extLst>
+          </p:cNvPr>
+          <p:cNvCxnSpPr/>
+          <p:nvPr/>
+        </p:nvCxnSpPr>
+        <p:spPr>
+          <a:xfrm>
+            <a:off x="221146" y="1109662"/>
+            <a:ext cx="6274904" cy="0"/>
+          </a:xfrm>
+          <a:prstGeom prst="line">
+            <a:avLst/>
+          </a:prstGeom>
+          <a:ln w="28575"/>
+        </p:spPr>
+        <p:style>
+          <a:lnRef idx="2">
+            <a:schemeClr val="dk1"/>
+          </a:lnRef>
+          <a:fillRef idx="0">
+            <a:schemeClr val="dk1"/>
+          </a:fillRef>
+          <a:effectRef idx="1">
+            <a:schemeClr val="dk1"/>
+          </a:effectRef>
+          <a:fontRef idx="minor">
+            <a:schemeClr val="tx1"/>
+          </a:fontRef>
+        </p:style>
+      </p:cxnSp>
+      <p:pic>
+        <p:nvPicPr>
+          <p:cNvPr id="9" name="Picture 2" descr="INSA Toulouse">
+            <a:extLst>
+              <a:ext uri="{FF2B5EF4-FFF2-40B4-BE49-F238E27FC236}">
+                <a16:creationId xmlns:a16="http://schemas.microsoft.com/office/drawing/2014/main" id="{AD78DBC9-9482-7C9F-CF6A-0D8E7AB0F897}"/>
+              </a:ext>
+            </a:extLst>
+          </p:cNvPr>
+          <p:cNvPicPr>
+            <a:picLocks noChangeAspect="1" noChangeArrowheads="1"/>
+          </p:cNvPicPr>
+          <p:nvPr/>
+        </p:nvPicPr>
+        <p:blipFill rotWithShape="1">
+          <a:blip r:embed="rId2">
+            <a:extLst>
+              <a:ext uri="{28A0092B-C50C-407E-A947-70E740481C1C}">
+                <a14:useLocalDpi xmlns:a14="http://schemas.microsoft.com/office/drawing/2010/main" val="0"/>
+              </a:ext>
+            </a:extLst>
+          </a:blip>
+          <a:srcRect b="16429"/>
+          <a:stretch/>
+        </p:blipFill>
+        <p:spPr bwMode="auto">
+          <a:xfrm>
+            <a:off x="221146" y="15590"/>
+            <a:ext cx="1066800" cy="891544"/>
+          </a:xfrm>
+          <a:prstGeom prst="rect">
+            <a:avLst/>
+          </a:prstGeom>
+          <a:noFill/>
+          <a:extLst>
+            <a:ext uri="{909E8E84-426E-40DD-AFC4-6F175D3DCCD1}">
+              <a14:hiddenFill xmlns:a14="http://schemas.microsoft.com/office/drawing/2010/main">
+                <a:solidFill>
+                  <a:srgbClr val="FFFFFF"/>
+                </a:solidFill>
+              </a14:hiddenFill>
+            </a:ext>
+          </a:extLst>
+        </p:spPr>
+      </p:pic>
+      <p:sp>
+        <p:nvSpPr>
+          <p:cNvPr id="10" name="ZoneTexte 9">
+            <a:extLst>
+              <a:ext uri="{FF2B5EF4-FFF2-40B4-BE49-F238E27FC236}">
+                <a16:creationId xmlns:a16="http://schemas.microsoft.com/office/drawing/2014/main" id="{8239DFEF-71B8-D876-01FE-05DA1CD94B8D}"/>
+              </a:ext>
+            </a:extLst>
+          </p:cNvPr>
+          <p:cNvSpPr txBox="1"/>
+          <p:nvPr/>
+        </p:nvSpPr>
+        <p:spPr>
+          <a:xfrm>
+            <a:off x="1892782" y="454283"/>
+            <a:ext cx="5441468" cy="369332"/>
+          </a:xfrm>
+          <a:prstGeom prst="rect">
+            <a:avLst/>
+          </a:prstGeom>
+          <a:noFill/>
+        </p:spPr>
+        <p:txBody>
+          <a:bodyPr wrap="square" rtlCol="0">
+            <a:spAutoFit/>
+          </a:bodyPr>
+          <a:lstStyle/>
+          <a:p>
+            <a:r>
+              <a:rPr lang="fr-FR" b="1" dirty="0">
+                <a:latin typeface="Abadi" panose="020B0604020104020204" pitchFamily="34" charset="0"/>
+              </a:rPr>
+              <a:t>GT-LGT2803-Low Tech Graphite </a:t>
+            </a:r>
+            <a:r>
+              <a:rPr lang="fr-FR" b="1" dirty="0" err="1">
+                <a:latin typeface="Abadi" panose="020B0604020104020204" pitchFamily="34" charset="0"/>
+              </a:rPr>
+              <a:t>Strain</a:t>
+            </a:r>
+            <a:r>
+              <a:rPr lang="fr-FR" b="1" dirty="0">
+                <a:latin typeface="Abadi" panose="020B0604020104020204" pitchFamily="34" charset="0"/>
+              </a:rPr>
+              <a:t> </a:t>
+            </a:r>
+            <a:r>
+              <a:rPr lang="fr-FR" b="1" dirty="0" err="1">
+                <a:latin typeface="Abadi" panose="020B0604020104020204" pitchFamily="34" charset="0"/>
+              </a:rPr>
+              <a:t>Sensor</a:t>
+            </a:r>
+            <a:endParaRPr lang="fr-FR" b="1" dirty="0">
+              <a:latin typeface="Abadi" panose="020B0604020104020204" pitchFamily="34" charset="0"/>
+            </a:endParaRPr>
+          </a:p>
+        </p:txBody>
+      </p:sp>
+    </p:spTree>
+    <p:extLst>
+      <p:ext uri="{BB962C8B-B14F-4D97-AF65-F5344CB8AC3E}">
+        <p14:creationId xmlns:p14="http://schemas.microsoft.com/office/powerpoint/2010/main" val="3652695754"/>
       </p:ext>
     </p:extLst>
   </p:cSld>

</xml_diff>

<commit_message>
Rajout d'images du banc de test, Rajout texte de fin de la datasheet, Rajout d'un sommaire sur le ReadME
</commit_message>
<xml_diff>
--- a/Datasheet/Datasheet_capteur_2025.pptx
+++ b/Datasheet/Datasheet_capteur_2025.pptx
@@ -108,6 +108,11 @@
       </a:defRPr>
     </a:lvl9pPr>
   </p:defaultTextStyle>
+  <p:extLst>
+    <p:ext uri="{EFAFB233-063F-42B5-8137-9DF3F51BA10A}">
+      <p15:sldGuideLst xmlns:p15="http://schemas.microsoft.com/office/powerpoint/2012/main"/>
+    </p:ext>
+  </p:extLst>
 </p:presentation>
 </file>
 
@@ -242,7 +247,7 @@
           <a:p>
             <a:fld id="{E030C13D-1992-4B2B-B408-E2F8B4A6D092}" type="datetimeFigureOut">
               <a:rPr lang="fr-FR" smtClean="0"/>
-              <a:t>28/03/2025</a:t>
+              <a:t>29/03/2025</a:t>
             </a:fld>
             <a:endParaRPr lang="fr-FR"/>
           </a:p>
@@ -412,7 +417,7 @@
           <a:p>
             <a:fld id="{E030C13D-1992-4B2B-B408-E2F8B4A6D092}" type="datetimeFigureOut">
               <a:rPr lang="fr-FR" smtClean="0"/>
-              <a:t>28/03/2025</a:t>
+              <a:t>29/03/2025</a:t>
             </a:fld>
             <a:endParaRPr lang="fr-FR"/>
           </a:p>
@@ -592,7 +597,7 @@
           <a:p>
             <a:fld id="{E030C13D-1992-4B2B-B408-E2F8B4A6D092}" type="datetimeFigureOut">
               <a:rPr lang="fr-FR" smtClean="0"/>
-              <a:t>28/03/2025</a:t>
+              <a:t>29/03/2025</a:t>
             </a:fld>
             <a:endParaRPr lang="fr-FR"/>
           </a:p>
@@ -762,7 +767,7 @@
           <a:p>
             <a:fld id="{E030C13D-1992-4B2B-B408-E2F8B4A6D092}" type="datetimeFigureOut">
               <a:rPr lang="fr-FR" smtClean="0"/>
-              <a:t>28/03/2025</a:t>
+              <a:t>29/03/2025</a:t>
             </a:fld>
             <a:endParaRPr lang="fr-FR"/>
           </a:p>
@@ -1008,7 +1013,7 @@
           <a:p>
             <a:fld id="{E030C13D-1992-4B2B-B408-E2F8B4A6D092}" type="datetimeFigureOut">
               <a:rPr lang="fr-FR" smtClean="0"/>
-              <a:t>28/03/2025</a:t>
+              <a:t>29/03/2025</a:t>
             </a:fld>
             <a:endParaRPr lang="fr-FR"/>
           </a:p>
@@ -1240,7 +1245,7 @@
           <a:p>
             <a:fld id="{E030C13D-1992-4B2B-B408-E2F8B4A6D092}" type="datetimeFigureOut">
               <a:rPr lang="fr-FR" smtClean="0"/>
-              <a:t>28/03/2025</a:t>
+              <a:t>29/03/2025</a:t>
             </a:fld>
             <a:endParaRPr lang="fr-FR"/>
           </a:p>
@@ -1607,7 +1612,7 @@
           <a:p>
             <a:fld id="{E030C13D-1992-4B2B-B408-E2F8B4A6D092}" type="datetimeFigureOut">
               <a:rPr lang="fr-FR" smtClean="0"/>
-              <a:t>28/03/2025</a:t>
+              <a:t>29/03/2025</a:t>
             </a:fld>
             <a:endParaRPr lang="fr-FR"/>
           </a:p>
@@ -1725,7 +1730,7 @@
           <a:p>
             <a:fld id="{E030C13D-1992-4B2B-B408-E2F8B4A6D092}" type="datetimeFigureOut">
               <a:rPr lang="fr-FR" smtClean="0"/>
-              <a:t>28/03/2025</a:t>
+              <a:t>29/03/2025</a:t>
             </a:fld>
             <a:endParaRPr lang="fr-FR"/>
           </a:p>
@@ -1820,7 +1825,7 @@
           <a:p>
             <a:fld id="{E030C13D-1992-4B2B-B408-E2F8B4A6D092}" type="datetimeFigureOut">
               <a:rPr lang="fr-FR" smtClean="0"/>
-              <a:t>28/03/2025</a:t>
+              <a:t>29/03/2025</a:t>
             </a:fld>
             <a:endParaRPr lang="fr-FR"/>
           </a:p>
@@ -2097,7 +2102,7 @@
           <a:p>
             <a:fld id="{E030C13D-1992-4B2B-B408-E2F8B4A6D092}" type="datetimeFigureOut">
               <a:rPr lang="fr-FR" smtClean="0"/>
-              <a:t>28/03/2025</a:t>
+              <a:t>29/03/2025</a:t>
             </a:fld>
             <a:endParaRPr lang="fr-FR"/>
           </a:p>
@@ -2354,7 +2359,7 @@
           <a:p>
             <a:fld id="{E030C13D-1992-4B2B-B408-E2F8B4A6D092}" type="datetimeFigureOut">
               <a:rPr lang="fr-FR" smtClean="0"/>
-              <a:t>28/03/2025</a:t>
+              <a:t>29/03/2025</a:t>
             </a:fld>
             <a:endParaRPr lang="fr-FR"/>
           </a:p>
@@ -2567,7 +2572,7 @@
           <a:p>
             <a:fld id="{E030C13D-1992-4B2B-B408-E2F8B4A6D092}" type="datetimeFigureOut">
               <a:rPr lang="fr-FR" smtClean="0"/>
-              <a:t>28/03/2025</a:t>
+              <a:t>29/03/2025</a:t>
             </a:fld>
             <a:endParaRPr lang="fr-FR"/>
           </a:p>
@@ -3196,19 +3201,19 @@
           <a:lstStyle/>
           <a:p>
             <a:r>
-              <a:rPr lang="fr-FR" sz="1200" dirty="0">
+              <a:rPr lang="en-US" sz="1200" noProof="0" dirty="0">
                 <a:latin typeface="Abadi" panose="020B0604020104020204" pitchFamily="34" charset="0"/>
               </a:rPr>
               <a:t>HAMADI </a:t>
             </a:r>
             <a:r>
-              <a:rPr lang="fr-FR" sz="1200" dirty="0" err="1">
+              <a:rPr lang="en-US" sz="1200" noProof="0" dirty="0" err="1">
                 <a:latin typeface="Abadi" panose="020B0604020104020204" pitchFamily="34" charset="0"/>
               </a:rPr>
               <a:t>Maoulida</a:t>
             </a:r>
             <a:r>
-              <a:rPr lang="fr-FR" sz="1200" dirty="0">
+              <a:rPr lang="en-US" sz="1200" noProof="0" dirty="0">
                 <a:latin typeface="Abadi" panose="020B0604020104020204" pitchFamily="34" charset="0"/>
               </a:rPr>
               <a:t> - TARTERA Maëlys</a:t>
@@ -3245,32 +3250,11 @@
           <a:lstStyle/>
           <a:p>
             <a:r>
-              <a:rPr lang="fr-FR" b="1" dirty="0">
+              <a:rPr lang="en-US" b="1" noProof="0" dirty="0">
                 <a:latin typeface="Abadi" panose="020B0604020104020204" pitchFamily="34" charset="0"/>
               </a:rPr>
-              <a:t>GT-LGT2803-Low Tech Graphite </a:t>
-            </a:r>
-            <a:r>
-              <a:rPr lang="fr-FR" b="1" dirty="0" err="1">
-                <a:latin typeface="Abadi" panose="020B0604020104020204" pitchFamily="34" charset="0"/>
-              </a:rPr>
-              <a:t>Strain</a:t>
-            </a:r>
-            <a:r>
-              <a:rPr lang="fr-FR" b="1" dirty="0">
-                <a:latin typeface="Abadi" panose="020B0604020104020204" pitchFamily="34" charset="0"/>
-              </a:rPr>
-              <a:t> </a:t>
-            </a:r>
-            <a:r>
-              <a:rPr lang="fr-FR" b="1" dirty="0" err="1">
-                <a:latin typeface="Abadi" panose="020B0604020104020204" pitchFamily="34" charset="0"/>
-              </a:rPr>
-              <a:t>Sensor</a:t>
-            </a:r>
-            <a:endParaRPr lang="fr-FR" b="1" dirty="0">
-              <a:latin typeface="Abadi" panose="020B0604020104020204" pitchFamily="34" charset="0"/>
-            </a:endParaRPr>
+              <a:t>GT-LGT2803-Low Tech Graphite Strain Sensor</a:t>
+            </a:r>
           </a:p>
         </p:txBody>
       </p:sp>
@@ -3303,19 +3287,13 @@
           <a:lstStyle/>
           <a:p>
             <a:r>
-              <a:rPr lang="fr-FR" b="1" u="sng" dirty="0">
+              <a:rPr lang="en-US" b="1" u="sng" noProof="0" dirty="0">
                 <a:latin typeface="Abadi" panose="020B0604020104020204" pitchFamily="34" charset="0"/>
               </a:rPr>
-              <a:t>General </a:t>
-            </a:r>
-            <a:r>
-              <a:rPr lang="fr-FR" b="1" u="sng" dirty="0" err="1">
-                <a:latin typeface="Abadi" panose="020B0604020104020204" pitchFamily="34" charset="0"/>
-              </a:rPr>
-              <a:t>Features</a:t>
-            </a:r>
-            <a:r>
-              <a:rPr lang="fr-FR" dirty="0">
+              <a:t>General Features</a:t>
+            </a:r>
+            <a:r>
+              <a:rPr lang="en-US" noProof="0" dirty="0">
                 <a:latin typeface="Abadi" panose="020B0604020104020204" pitchFamily="34" charset="0"/>
               </a:rPr>
               <a:t>: </a:t>
@@ -3323,46 +3301,46 @@
           </a:p>
           <a:p>
             <a:r>
-              <a:rPr lang="en-US" sz="1400" dirty="0"/>
+              <a:rPr lang="en-US" sz="1400" noProof="0" dirty="0"/>
               <a:t>-Low power consumption (3V-5V)</a:t>
             </a:r>
           </a:p>
           <a:p>
             <a:r>
-              <a:rPr lang="en-US" sz="1400" dirty="0"/>
+              <a:rPr lang="en-US" sz="1400" noProof="0" dirty="0"/>
               <a:t>-Low cost </a:t>
             </a:r>
           </a:p>
           <a:p>
             <a:r>
-              <a:rPr lang="en-US" sz="1400" dirty="0"/>
+              <a:rPr lang="en-US" sz="1400" noProof="0" dirty="0"/>
               <a:t>-Light and small (10cm2)</a:t>
             </a:r>
           </a:p>
           <a:p>
             <a:r>
-              <a:rPr lang="en-US" sz="1400" dirty="0"/>
+              <a:rPr lang="en-US" sz="1400" noProof="0" dirty="0"/>
               <a:t>-Flexible and biodegradable</a:t>
             </a:r>
           </a:p>
           <a:p>
             <a:r>
-              <a:rPr lang="en-US" sz="1400" dirty="0"/>
+              <a:rPr lang="en-US" sz="1400" noProof="0" dirty="0"/>
               <a:t>-Easy-to-use : plug and use</a:t>
             </a:r>
           </a:p>
           <a:p>
             <a:r>
-              <a:rPr lang="en-US" sz="1400" dirty="0"/>
+              <a:rPr lang="en-US" sz="1400" noProof="0" dirty="0"/>
               <a:t>-Easily replaceable and reproductible)</a:t>
             </a:r>
           </a:p>
           <a:p>
             <a:r>
-              <a:rPr lang="en-US" sz="1400" dirty="0"/>
+              <a:rPr lang="en-US" sz="1400" noProof="0" dirty="0"/>
               <a:t>-Bluetooth connection possible</a:t>
             </a:r>
-            <a:endParaRPr lang="fr-FR" sz="1400" dirty="0">
+            <a:endParaRPr lang="en-US" sz="1400" noProof="0" dirty="0">
               <a:latin typeface="Arial" panose="020B0604020202020204" pitchFamily="34" charset="0"/>
               <a:cs typeface="Arial" panose="020B0604020202020204" pitchFamily="34" charset="0"/>
             </a:endParaRPr>
@@ -3398,13 +3376,13 @@
           <a:lstStyle/>
           <a:p>
             <a:r>
-              <a:rPr lang="fr-FR" b="1" u="sng" dirty="0">
+              <a:rPr lang="en-US" b="1" u="sng" noProof="0" dirty="0">
                 <a:latin typeface="Abadi" panose="020B0604020104020204" pitchFamily="34" charset="0"/>
               </a:rPr>
               <a:t>Description</a:t>
             </a:r>
             <a:r>
-              <a:rPr lang="fr-FR" dirty="0">
+              <a:rPr lang="en-US" noProof="0" dirty="0">
                 <a:latin typeface="Abadi" panose="020B0604020104020204" pitchFamily="34" charset="0"/>
               </a:rPr>
               <a:t>: </a:t>
@@ -3412,74 +3390,74 @@
           </a:p>
           <a:p>
             <a:r>
-              <a:rPr lang="en-US" sz="1400" dirty="0"/>
+              <a:rPr lang="en-US" sz="1400" noProof="0" dirty="0"/>
               <a:t>The strain sensor was developed and made in the Applied Physics Department at the National Institute of Applied Sciences (INSA) of Toulouse, France. </a:t>
             </a:r>
           </a:p>
           <a:p>
-            <a:endParaRPr lang="en-US" sz="1400" dirty="0"/>
-          </a:p>
-          <a:p>
-            <a:r>
-              <a:rPr lang="en-US" sz="1400" dirty="0"/>
+            <a:endParaRPr lang="en-US" sz="1400" noProof="0" dirty="0"/>
+          </a:p>
+          <a:p>
+            <a:r>
+              <a:rPr lang="en-US" sz="1400" noProof="0" dirty="0"/>
               <a:t>The sensor technology is based on </a:t>
             </a:r>
             <a:r>
-              <a:rPr lang="en-US" sz="1400" dirty="0" err="1"/>
+              <a:rPr lang="en-US" sz="1400" noProof="0" dirty="0" err="1"/>
               <a:t>chemiresistor</a:t>
             </a:r>
             <a:r>
-              <a:rPr lang="en-US" sz="1400" dirty="0"/>
+              <a:rPr lang="en-US" sz="1400" noProof="0" dirty="0"/>
               <a:t> properties of graphite found in the article  "</a:t>
             </a:r>
             <a:r>
-              <a:rPr lang="en-US" sz="1400" i="1" dirty="0"/>
+              <a:rPr lang="en-US" sz="1400" i="1" noProof="0" dirty="0"/>
               <a:t>Pencil Drawn Strain Gauges and </a:t>
             </a:r>
             <a:r>
-              <a:rPr lang="en-US" sz="1400" i="1" dirty="0" err="1"/>
+              <a:rPr lang="en-US" sz="1400" i="1" noProof="0" dirty="0" err="1"/>
               <a:t>Chemiresistors</a:t>
             </a:r>
             <a:r>
-              <a:rPr lang="en-US" sz="1400" i="1" dirty="0"/>
+              <a:rPr lang="en-US" sz="1400" i="1" noProof="0" dirty="0"/>
               <a:t> on Paper</a:t>
             </a:r>
             <a:r>
-              <a:rPr lang="en-US" sz="1400" dirty="0"/>
+              <a:rPr lang="en-US" sz="1400" noProof="0" dirty="0"/>
               <a:t>" published in 2014  by Cheng-Wei Lin, </a:t>
             </a:r>
             <a:r>
-              <a:rPr lang="en-US" sz="1400" dirty="0" err="1"/>
+              <a:rPr lang="en-US" sz="1400" noProof="0" dirty="0" err="1"/>
               <a:t>Zhibo</a:t>
             </a:r>
             <a:r>
-              <a:rPr lang="en-US" sz="1400" dirty="0"/>
+              <a:rPr lang="en-US" sz="1400" noProof="0" dirty="0"/>
               <a:t> Zhao, </a:t>
             </a:r>
             <a:r>
-              <a:rPr lang="en-US" sz="1400" dirty="0" err="1"/>
+              <a:rPr lang="en-US" sz="1400" noProof="0" dirty="0" err="1"/>
               <a:t>Jaemyung</a:t>
             </a:r>
             <a:r>
-              <a:rPr lang="en-US" sz="1400" dirty="0"/>
+              <a:rPr lang="en-US" sz="1400" noProof="0" dirty="0"/>
               <a:t> Kim, and Jiaxing Huang. The sensor can measure a resistance variation </a:t>
             </a:r>
           </a:p>
           <a:p>
-            <a:endParaRPr lang="en-US" sz="1400" dirty="0"/>
-          </a:p>
-          <a:p>
-            <a:r>
-              <a:rPr lang="en-US" sz="1400" dirty="0"/>
+            <a:endParaRPr lang="en-US" sz="1400" noProof="0" dirty="0"/>
+          </a:p>
+          <a:p>
+            <a:r>
+              <a:rPr lang="en-US" sz="1400" noProof="0" dirty="0"/>
               <a:t>This sensor consists of a small piece of paper coated with a graphite layer from a pencil. It can measure a resistance variation when applying a strain. The deformation leads to a change of the number of connected graphite particles in the thin layer of graphite and so it changes the resistance of the sensor. This allows us to measure deformation, like a traditional strain gauge. </a:t>
             </a:r>
           </a:p>
           <a:p>
-            <a:endParaRPr lang="en-US" sz="1400" dirty="0"/>
-          </a:p>
-          <a:p>
-            <a:r>
-              <a:rPr lang="en-US" sz="1400" dirty="0"/>
+            <a:endParaRPr lang="en-US" sz="1400" noProof="0" dirty="0"/>
+          </a:p>
+          <a:p>
+            <a:r>
+              <a:rPr lang="en-US" sz="1400" noProof="0" dirty="0"/>
               <a:t>The structure of the graphite layer varies depending on the type of pencil used. In order to fully understand the impact of the graphite structure on the variation of the resistance, we conducted tests with two types of pencils: HB (medium hardness) and 2B (softer). To achieve this, our sensors were coupled with a transimpedance amplifier and an Arduino Uno, all integrated on a PCB designed for tests. </a:t>
             </a:r>
           </a:p>
@@ -3514,13 +3492,13 @@
           <a:lstStyle/>
           <a:p>
             <a:r>
-              <a:rPr lang="fr-FR" b="1" u="sng" dirty="0">
+              <a:rPr lang="en-US" b="1" u="sng" noProof="0" dirty="0">
                 <a:latin typeface="Abadi" panose="020B0604020104020204" pitchFamily="34" charset="0"/>
               </a:rPr>
               <a:t>Pin configuration and dimensions</a:t>
             </a:r>
             <a:r>
-              <a:rPr lang="fr-FR" dirty="0">
+              <a:rPr lang="en-US" noProof="0" dirty="0">
                 <a:latin typeface="Abadi" panose="020B0604020104020204" pitchFamily="34" charset="0"/>
               </a:rPr>
               <a:t>: </a:t>
@@ -3594,7 +3572,7 @@
           <a:lstStyle/>
           <a:p>
             <a:r>
-              <a:rPr lang="fr-FR" dirty="0"/>
+              <a:rPr lang="en-US" noProof="0" dirty="0"/>
               <a:t>1</a:t>
             </a:r>
           </a:p>
@@ -3659,25 +3637,13 @@
           <a:lstStyle/>
           <a:p>
             <a:r>
-              <a:rPr lang="fr-FR" b="1" u="sng" dirty="0" err="1">
+              <a:rPr lang="en-US" b="1" u="sng" noProof="0" dirty="0">
                 <a:latin typeface="Abadi" panose="020B0604020104020204" pitchFamily="34" charset="0"/>
               </a:rPr>
-              <a:t>Technical</a:t>
-            </a:r>
-            <a:r>
-              <a:rPr lang="fr-FR" b="1" u="sng" dirty="0">
-                <a:latin typeface="Abadi" panose="020B0604020104020204" pitchFamily="34" charset="0"/>
-              </a:rPr>
-              <a:t> </a:t>
-            </a:r>
-            <a:r>
-              <a:rPr lang="fr-FR" b="1" u="sng" dirty="0" err="1">
-                <a:latin typeface="Abadi" panose="020B0604020104020204" pitchFamily="34" charset="0"/>
-              </a:rPr>
-              <a:t>specifications</a:t>
-            </a:r>
-            <a:r>
-              <a:rPr lang="fr-FR" dirty="0">
+              <a:t>Technical specifications</a:t>
+            </a:r>
+            <a:r>
+              <a:rPr lang="en-US" noProof="0" dirty="0">
                 <a:latin typeface="Abadi" panose="020B0604020104020204" pitchFamily="34" charset="0"/>
               </a:rPr>
               <a:t>: </a:t>
@@ -3714,13 +3680,13 @@
           <a:lstStyle/>
           <a:p>
             <a:r>
-              <a:rPr lang="fr-FR" b="1" u="sng" dirty="0">
+              <a:rPr lang="en-US" b="1" u="sng" noProof="0" dirty="0">
                 <a:latin typeface="Abadi" panose="020B0604020104020204" pitchFamily="34" charset="0"/>
               </a:rPr>
               <a:t>Standard use conditions</a:t>
             </a:r>
             <a:r>
-              <a:rPr lang="fr-FR" dirty="0">
+              <a:rPr lang="en-US" noProof="0" dirty="0">
                 <a:latin typeface="Abadi" panose="020B0604020104020204" pitchFamily="34" charset="0"/>
               </a:rPr>
               <a:t>: </a:t>
@@ -3757,19 +3723,19 @@
           <a:lstStyle/>
           <a:p>
             <a:r>
-              <a:rPr lang="fr-FR" sz="1200" dirty="0">
+              <a:rPr lang="en-US" sz="1200" noProof="0" dirty="0">
                 <a:latin typeface="Abadi" panose="020B0604020104020204" pitchFamily="34" charset="0"/>
               </a:rPr>
               <a:t>HAMADI </a:t>
             </a:r>
             <a:r>
-              <a:rPr lang="fr-FR" sz="1200" dirty="0" err="1">
+              <a:rPr lang="en-US" sz="1200" noProof="0" dirty="0" err="1">
                 <a:latin typeface="Abadi" panose="020B0604020104020204" pitchFamily="34" charset="0"/>
               </a:rPr>
               <a:t>Maoulida</a:t>
             </a:r>
             <a:r>
-              <a:rPr lang="fr-FR" sz="1200" dirty="0">
+              <a:rPr lang="en-US" sz="1200" noProof="0" dirty="0">
                 <a:latin typeface="Abadi" panose="020B0604020104020204" pitchFamily="34" charset="0"/>
               </a:rPr>
               <a:t> - TARTERA Maëlys</a:t>
@@ -3843,7 +3809,7 @@
           <a:lstStyle/>
           <a:p>
             <a:r>
-              <a:rPr lang="fr-FR" dirty="0"/>
+              <a:rPr lang="en-US" noProof="0" dirty="0"/>
               <a:t>2</a:t>
             </a:r>
           </a:p>
@@ -3878,25 +3844,13 @@
           <a:lstStyle/>
           <a:p>
             <a:r>
-              <a:rPr lang="fr-FR" b="1" u="sng" dirty="0" err="1">
+              <a:rPr lang="en-US" b="1" u="sng" noProof="0" dirty="0">
                 <a:latin typeface="Abadi" panose="020B0604020104020204" pitchFamily="34" charset="0"/>
               </a:rPr>
-              <a:t>Electrical</a:t>
-            </a:r>
-            <a:r>
-              <a:rPr lang="fr-FR" b="1" u="sng" dirty="0">
-                <a:latin typeface="Abadi" panose="020B0604020104020204" pitchFamily="34" charset="0"/>
-              </a:rPr>
-              <a:t> </a:t>
-            </a:r>
-            <a:r>
-              <a:rPr lang="fr-FR" b="1" u="sng" dirty="0" err="1">
-                <a:latin typeface="Abadi" panose="020B0604020104020204" pitchFamily="34" charset="0"/>
-              </a:rPr>
-              <a:t>characteristics</a:t>
-            </a:r>
-            <a:r>
-              <a:rPr lang="fr-FR" dirty="0">
+              <a:t>Electrical characteristics</a:t>
+            </a:r>
+            <a:r>
+              <a:rPr lang="en-US" noProof="0" dirty="0">
                 <a:latin typeface="Abadi" panose="020B0604020104020204" pitchFamily="34" charset="0"/>
               </a:rPr>
               <a:t>: </a:t>
@@ -4052,32 +4006,11 @@
           <a:lstStyle/>
           <a:p>
             <a:r>
-              <a:rPr lang="fr-FR" b="1" dirty="0">
+              <a:rPr lang="en-US" b="1" noProof="0" dirty="0">
                 <a:latin typeface="Abadi" panose="020B0604020104020204" pitchFamily="34" charset="0"/>
               </a:rPr>
-              <a:t>GT-LGT2803-Low Tech Graphite </a:t>
-            </a:r>
-            <a:r>
-              <a:rPr lang="fr-FR" b="1" dirty="0" err="1">
-                <a:latin typeface="Abadi" panose="020B0604020104020204" pitchFamily="34" charset="0"/>
-              </a:rPr>
-              <a:t>Strain</a:t>
-            </a:r>
-            <a:r>
-              <a:rPr lang="fr-FR" b="1" dirty="0">
-                <a:latin typeface="Abadi" panose="020B0604020104020204" pitchFamily="34" charset="0"/>
-              </a:rPr>
-              <a:t> </a:t>
-            </a:r>
-            <a:r>
-              <a:rPr lang="fr-FR" b="1" dirty="0" err="1">
-                <a:latin typeface="Abadi" panose="020B0604020104020204" pitchFamily="34" charset="0"/>
-              </a:rPr>
-              <a:t>Sensor</a:t>
-            </a:r>
-            <a:endParaRPr lang="fr-FR" b="1" dirty="0">
-              <a:latin typeface="Abadi" panose="020B0604020104020204" pitchFamily="34" charset="0"/>
-            </a:endParaRPr>
+              <a:t>GT-LGT2803-Low Tech Graphite Strain Sensor</a:t>
+            </a:r>
           </a:p>
         </p:txBody>
       </p:sp>
@@ -4096,7 +4029,7 @@
           <p:nvPr>
             <p:extLst>
               <p:ext uri="{D42A27DB-BD31-4B8C-83A1-F6EECF244321}">
-                <p14:modId xmlns:p14="http://schemas.microsoft.com/office/powerpoint/2010/main" val="446406124"/>
+                <p14:modId xmlns:p14="http://schemas.microsoft.com/office/powerpoint/2010/main" val="3863207930"/>
               </p:ext>
             </p:extLst>
           </p:nvPr>
@@ -4135,7 +4068,7 @@
                     <a:p>
                       <a:pPr algn="ctr"/>
                       <a:r>
-                        <a:rPr lang="fr-FR" dirty="0"/>
+                        <a:rPr lang="en-US" noProof="0" dirty="0"/>
                         <a:t>Type</a:t>
                       </a:r>
                     </a:p>
@@ -4191,18 +4124,9 @@
                     <a:p>
                       <a:pPr algn="ctr"/>
                       <a:r>
-                        <a:rPr lang="fr-FR" dirty="0" err="1"/>
-                        <a:t>Strain</a:t>
+                        <a:rPr lang="en-US" noProof="0" dirty="0"/>
+                        <a:t>Strain sensor</a:t>
                       </a:r>
-                      <a:r>
-                        <a:rPr lang="fr-FR" dirty="0"/>
-                        <a:t> </a:t>
-                      </a:r>
-                      <a:r>
-                        <a:rPr lang="fr-FR" dirty="0" err="1"/>
-                        <a:t>sensor</a:t>
-                      </a:r>
-                      <a:endParaRPr lang="fr-FR" dirty="0"/>
                     </a:p>
                   </a:txBody>
                   <a:tcPr>
@@ -4258,7 +4182,7 @@
                     <a:p>
                       <a:pPr algn="ctr"/>
                       <a:r>
-                        <a:rPr lang="fr-FR" dirty="0"/>
+                        <a:rPr lang="en-US" noProof="0" dirty="0"/>
                         <a:t>Materials</a:t>
                       </a:r>
                     </a:p>
@@ -4314,16 +4238,8 @@
                     <a:p>
                       <a:pPr algn="ctr"/>
                       <a:r>
-                        <a:rPr lang="fr-FR" dirty="0"/>
-                        <a:t>Graphite (4B to 2H graphite </a:t>
-                      </a:r>
-                      <a:r>
-                        <a:rPr lang="fr-FR" dirty="0" err="1"/>
-                        <a:t>pencil</a:t>
-                      </a:r>
-                      <a:r>
-                        <a:rPr lang="fr-FR" dirty="0"/>
-                        <a:t>)</a:t>
+                        <a:rPr lang="en-US" noProof="0" dirty="0"/>
+                        <a:t>Graphite (4B to 2H graphite pencil)</a:t>
                       </a:r>
                     </a:p>
                   </a:txBody>
@@ -4380,12 +4296,8 @@
                     <a:p>
                       <a:pPr algn="ctr"/>
                       <a:r>
-                        <a:rPr lang="fr-FR" dirty="0" err="1"/>
-                        <a:t>Sensor</a:t>
-                      </a:r>
-                      <a:r>
-                        <a:rPr lang="fr-FR" dirty="0"/>
-                        <a:t> type</a:t>
+                        <a:rPr lang="en-US" noProof="0" dirty="0"/>
+                        <a:t>Sensor type</a:t>
                       </a:r>
                     </a:p>
                   </a:txBody>
@@ -4440,24 +4352,16 @@
                     <a:p>
                       <a:pPr algn="ctr"/>
                       <a:r>
-                        <a:rPr lang="fr-FR" dirty="0"/>
+                        <a:rPr lang="en-US" noProof="0" dirty="0"/>
                         <a:t>Passive: Power </a:t>
                       </a:r>
                       <a:r>
-                        <a:rPr lang="fr-FR" dirty="0" err="1"/>
+                        <a:rPr lang="en-US" noProof="0" dirty="0" err="1"/>
                         <a:t>suply</a:t>
                       </a:r>
                       <a:r>
-                        <a:rPr lang="fr-FR" dirty="0"/>
-                        <a:t> </a:t>
-                      </a:r>
-                      <a:r>
-                        <a:rPr lang="fr-FR" dirty="0" err="1"/>
-                        <a:t>required</a:t>
-                      </a:r>
-                      <a:r>
-                        <a:rPr lang="fr-FR" dirty="0"/>
-                        <a:t> </a:t>
+                        <a:rPr lang="en-US" noProof="0" dirty="0"/>
+                        <a:t> required </a:t>
                       </a:r>
                     </a:p>
                   </a:txBody>
@@ -4514,14 +4418,9 @@
                     <a:p>
                       <a:pPr algn="ctr"/>
                       <a:r>
-                        <a:rPr lang="fr-FR" dirty="0"/>
-                        <a:t>Power </a:t>
+                        <a:rPr lang="en-US" noProof="0" dirty="0"/>
+                        <a:t>Power supply</a:t>
                       </a:r>
-                      <a:r>
-                        <a:rPr lang="fr-FR" dirty="0" err="1"/>
-                        <a:t>supply</a:t>
-                      </a:r>
-                      <a:endParaRPr lang="fr-FR" dirty="0"/>
                     </a:p>
                   </a:txBody>
                   <a:tcPr>
@@ -4575,8 +4474,12 @@
                     <a:p>
                       <a:pPr algn="ctr"/>
                       <a:r>
-                        <a:rPr lang="fr-FR" dirty="0"/>
-                        <a:t>Vcc=+5V</a:t>
+                        <a:rPr lang="en-US" noProof="0" dirty="0" err="1"/>
+                        <a:t>Vcc</a:t>
+                      </a:r>
+                      <a:r>
+                        <a:rPr lang="en-US" noProof="0" dirty="0"/>
+                        <a:t>=+5V</a:t>
                       </a:r>
                     </a:p>
                   </a:txBody>
@@ -4633,7 +4536,7 @@
                     <a:p>
                       <a:pPr algn="ctr"/>
                       <a:r>
-                        <a:rPr lang="fr-FR" dirty="0"/>
+                        <a:rPr lang="en-US" noProof="0" dirty="0"/>
                         <a:t>Nature of output signal</a:t>
                       </a:r>
                     </a:p>
@@ -4689,10 +4592,9 @@
                     <a:p>
                       <a:pPr algn="ctr"/>
                       <a:r>
-                        <a:rPr lang="fr-FR" dirty="0" err="1"/>
+                        <a:rPr lang="en-US" noProof="0" dirty="0"/>
                         <a:t>Analog</a:t>
                       </a:r>
-                      <a:endParaRPr lang="fr-FR" dirty="0"/>
                     </a:p>
                   </a:txBody>
                   <a:tcPr>
@@ -4748,14 +4650,9 @@
                     <a:p>
                       <a:pPr algn="ctr"/>
                       <a:r>
-                        <a:rPr lang="fr-FR" dirty="0"/>
-                        <a:t>Nature of </a:t>
+                        <a:rPr lang="en-US" noProof="0" dirty="0"/>
+                        <a:t>Nature of measurand</a:t>
                       </a:r>
-                      <a:r>
-                        <a:rPr lang="fr-FR" dirty="0" err="1"/>
-                        <a:t>measurand</a:t>
-                      </a:r>
-                      <a:endParaRPr lang="fr-FR" dirty="0"/>
                     </a:p>
                   </a:txBody>
                   <a:tcPr>
@@ -4809,7 +4706,7 @@
                     <a:p>
                       <a:pPr algn="ctr"/>
                       <a:r>
-                        <a:rPr lang="fr-FR" dirty="0"/>
+                        <a:rPr lang="en-US" noProof="0" dirty="0"/>
                         <a:t>Voltage</a:t>
                       </a:r>
                     </a:p>
@@ -4867,20 +4764,8 @@
                     <a:p>
                       <a:pPr algn="ctr"/>
                       <a:r>
-                        <a:rPr lang="fr-FR" dirty="0" err="1"/>
-                        <a:t>Typical</a:t>
-                      </a:r>
-                      <a:r>
-                        <a:rPr lang="fr-FR" dirty="0"/>
-                        <a:t> </a:t>
-                      </a:r>
-                      <a:r>
-                        <a:rPr lang="fr-FR" dirty="0" err="1"/>
-                        <a:t>response</a:t>
-                      </a:r>
-                      <a:r>
-                        <a:rPr lang="fr-FR" dirty="0"/>
-                        <a:t> time</a:t>
+                        <a:rPr lang="en-US" noProof="0" dirty="0"/>
+                        <a:t>Typical response time</a:t>
                       </a:r>
                     </a:p>
                   </a:txBody>
@@ -4935,21 +4820,14 @@
                     <a:p>
                       <a:pPr algn="ctr"/>
                       <a:r>
-                        <a:rPr lang="fr-FR" dirty="0" err="1"/>
-                        <a:t>Less</a:t>
+                        <a:rPr lang="en-US" noProof="0" dirty="0"/>
+                        <a:t>Less than 50 </a:t>
                       </a:r>
                       <a:r>
-                        <a:rPr lang="fr-FR" dirty="0"/>
-                        <a:t> </a:t>
+                        <a:rPr lang="en-US" noProof="0" dirty="0" err="1"/>
+                        <a:t>ms</a:t>
                       </a:r>
-                      <a:r>
-                        <a:rPr lang="fr-FR" dirty="0" err="1"/>
-                        <a:t>than</a:t>
-                      </a:r>
-                      <a:r>
-                        <a:rPr lang="fr-FR" dirty="0"/>
-                        <a:t> 50 ms</a:t>
-                      </a:r>
+                      <a:endParaRPr lang="en-US" noProof="0" dirty="0"/>
                     </a:p>
                   </a:txBody>
                   <a:tcPr>
@@ -5005,12 +4883,8 @@
                     <a:p>
                       <a:pPr algn="ctr"/>
                       <a:r>
-                        <a:rPr lang="fr-FR" dirty="0" err="1"/>
-                        <a:t>Typical</a:t>
-                      </a:r>
-                      <a:r>
-                        <a:rPr lang="fr-FR" dirty="0"/>
-                        <a:t> use</a:t>
+                        <a:rPr lang="en-US" noProof="0" dirty="0"/>
+                        <a:t>Typical use</a:t>
                       </a:r>
                     </a:p>
                   </a:txBody>
@@ -5065,18 +4939,9 @@
                     <a:p>
                       <a:pPr algn="ctr"/>
                       <a:r>
-                        <a:rPr lang="fr-FR" dirty="0" err="1"/>
-                        <a:t>Measurement</a:t>
+                        <a:rPr lang="en-US" noProof="0" dirty="0"/>
+                        <a:t>Measurement of compression deformation</a:t>
                       </a:r>
-                      <a:r>
-                        <a:rPr lang="fr-FR" dirty="0"/>
-                        <a:t> of compression </a:t>
-                      </a:r>
-                      <a:r>
-                        <a:rPr lang="fr-FR" dirty="0" err="1"/>
-                        <a:t>deformation</a:t>
-                      </a:r>
-                      <a:endParaRPr lang="fr-FR" dirty="0"/>
                     </a:p>
                   </a:txBody>
                   <a:tcPr>
@@ -5173,7 +5038,7 @@
           <p:nvPr>
             <p:extLst>
               <p:ext uri="{D42A27DB-BD31-4B8C-83A1-F6EECF244321}">
-                <p14:modId xmlns:p14="http://schemas.microsoft.com/office/powerpoint/2010/main" val="109542920"/>
+                <p14:modId xmlns:p14="http://schemas.microsoft.com/office/powerpoint/2010/main" val="2339016446"/>
               </p:ext>
             </p:extLst>
           </p:nvPr>
@@ -5228,17 +5093,12 @@
                         <a:defRPr/>
                       </a:pPr>
                       <a:r>
-                        <a:rPr lang="fr-FR" dirty="0"/>
-                        <a:t>Pin </a:t>
+                        <a:rPr lang="en-US" noProof="0" dirty="0"/>
+                        <a:t>Pin Number</a:t>
                       </a:r>
-                      <a:r>
-                        <a:rPr lang="fr-FR" dirty="0" err="1"/>
-                        <a:t>Number</a:t>
-                      </a:r>
-                      <a:endParaRPr lang="fr-FR" dirty="0"/>
                     </a:p>
                     <a:p>
-                      <a:endParaRPr lang="fr-FR" dirty="0"/>
+                      <a:endParaRPr lang="en-US" noProof="0" dirty="0"/>
                     </a:p>
                   </a:txBody>
                   <a:tcPr>
@@ -5309,7 +5169,7 @@
                         <a:defRPr/>
                       </a:pPr>
                       <a:r>
-                        <a:rPr lang="fr-FR" dirty="0"/>
+                        <a:rPr lang="en-US" noProof="0" dirty="0"/>
                         <a:t>Usage</a:t>
                       </a:r>
                     </a:p>
@@ -5373,7 +5233,7 @@
                     <a:p>
                       <a:pPr algn="ctr"/>
                       <a:r>
-                        <a:rPr lang="fr-FR" sz="1600" b="1" dirty="0">
+                        <a:rPr lang="en-US" sz="1600" b="1" noProof="0" dirty="0">
                           <a:solidFill>
                             <a:schemeClr val="tx1"/>
                           </a:solidFill>
@@ -5428,7 +5288,7 @@
                     <a:p>
                       <a:pPr algn="ctr"/>
                       <a:r>
-                        <a:rPr lang="fr-FR" dirty="0"/>
+                        <a:rPr lang="en-US" noProof="0" dirty="0"/>
                         <a:t>Vin</a:t>
                       </a:r>
                     </a:p>
@@ -5486,7 +5346,7 @@
                     <a:p>
                       <a:pPr algn="ctr"/>
                       <a:r>
-                        <a:rPr lang="fr-FR" sz="1600" b="1" dirty="0">
+                        <a:rPr lang="en-US" sz="1600" b="1" noProof="0" dirty="0">
                           <a:solidFill>
                             <a:schemeClr val="tx1"/>
                           </a:solidFill>
@@ -5541,8 +5401,16 @@
                     <a:p>
                       <a:pPr algn="ctr"/>
                       <a:r>
-                        <a:rPr lang="fr-FR" dirty="0"/>
-                        <a:t>+Vcc (5V)</a:t>
+                        <a:rPr lang="en-US" noProof="0" dirty="0"/>
+                        <a:t>+</a:t>
+                      </a:r>
+                      <a:r>
+                        <a:rPr lang="en-US" noProof="0" dirty="0" err="1"/>
+                        <a:t>Vcc</a:t>
+                      </a:r>
+                      <a:r>
+                        <a:rPr lang="en-US" noProof="0" dirty="0"/>
+                        <a:t> (5V)</a:t>
                       </a:r>
                     </a:p>
                   </a:txBody>
@@ -5624,7 +5492,7 @@
           <a:lstStyle/>
           <a:p>
             <a:r>
-              <a:rPr lang="fr-FR" b="1" dirty="0">
+              <a:rPr lang="en-US" b="1" noProof="0" dirty="0">
                 <a:solidFill>
                   <a:schemeClr val="bg1"/>
                 </a:solidFill>
@@ -5663,7 +5531,7 @@
           <a:lstStyle/>
           <a:p>
             <a:r>
-              <a:rPr lang="fr-FR" b="1" dirty="0">
+              <a:rPr lang="en-US" b="1" noProof="0" dirty="0">
                 <a:solidFill>
                   <a:schemeClr val="bg1"/>
                 </a:solidFill>
@@ -5688,7 +5556,7 @@
           <p:nvPr>
             <p:extLst>
               <p:ext uri="{D42A27DB-BD31-4B8C-83A1-F6EECF244321}">
-                <p14:modId xmlns:p14="http://schemas.microsoft.com/office/powerpoint/2010/main" val="2905982416"/>
+                <p14:modId xmlns:p14="http://schemas.microsoft.com/office/powerpoint/2010/main" val="3811419963"/>
               </p:ext>
             </p:extLst>
           </p:nvPr>
@@ -5732,7 +5600,7 @@
                     <a:bodyPr/>
                     <a:lstStyle/>
                     <a:p>
-                      <a:endParaRPr lang="fr-FR" dirty="0"/>
+                      <a:endParaRPr lang="en-US" noProof="0" dirty="0"/>
                     </a:p>
                   </a:txBody>
                   <a:tcPr>
@@ -5784,12 +5652,8 @@
                     <a:p>
                       <a:pPr algn="ctr"/>
                       <a:r>
-                        <a:rPr lang="fr-FR" dirty="0" err="1"/>
-                        <a:t>Typical</a:t>
-                      </a:r>
-                      <a:r>
-                        <a:rPr lang="fr-FR" dirty="0"/>
-                        <a:t> Value</a:t>
+                        <a:rPr lang="en-US" noProof="0" dirty="0"/>
+                        <a:t>Typical Value</a:t>
                       </a:r>
                     </a:p>
                   </a:txBody>
@@ -5845,7 +5709,7 @@
                     <a:p>
                       <a:pPr algn="ctr"/>
                       <a:r>
-                        <a:rPr lang="fr-FR" dirty="0"/>
+                        <a:rPr lang="en-US" noProof="0" dirty="0"/>
                         <a:t>Unit</a:t>
                       </a:r>
                     </a:p>
@@ -5909,10 +5773,9 @@
                     <a:p>
                       <a:pPr algn="ctr"/>
                       <a:r>
-                        <a:rPr lang="fr-FR" dirty="0" err="1"/>
+                        <a:rPr lang="en-US" noProof="0" dirty="0"/>
                         <a:t>Temperature</a:t>
                       </a:r>
-                      <a:endParaRPr lang="fr-FR" dirty="0"/>
                     </a:p>
                   </a:txBody>
                   <a:tcPr>
@@ -5966,7 +5829,7 @@
                     <a:p>
                       <a:pPr algn="ctr"/>
                       <a:r>
-                        <a:rPr lang="fr-FR" dirty="0"/>
+                        <a:rPr lang="en-US" noProof="0" dirty="0"/>
                         <a:t>20±5</a:t>
                       </a:r>
                     </a:p>
@@ -6017,7 +5880,7 @@
                     <a:p>
                       <a:pPr algn="ctr"/>
                       <a:r>
-                        <a:rPr lang="fr-FR" dirty="0"/>
+                        <a:rPr lang="en-US" noProof="0" dirty="0"/>
                         <a:t>°C</a:t>
                       </a:r>
                     </a:p>
@@ -6075,10 +5938,9 @@
                     <a:p>
                       <a:pPr algn="ctr"/>
                       <a:r>
-                        <a:rPr lang="fr-FR" dirty="0" err="1"/>
+                        <a:rPr lang="en-US" noProof="0" dirty="0"/>
                         <a:t>Humidity</a:t>
                       </a:r>
-                      <a:endParaRPr lang="fr-FR" dirty="0"/>
                     </a:p>
                   </a:txBody>
                   <a:tcPr>
@@ -6132,7 +5994,7 @@
                     <a:p>
                       <a:pPr algn="ctr"/>
                       <a:r>
-                        <a:rPr lang="fr-FR" dirty="0"/>
+                        <a:rPr lang="en-US" noProof="0" dirty="0"/>
                         <a:t>50±5</a:t>
                       </a:r>
                     </a:p>
@@ -6183,7 +6045,7 @@
                     <a:p>
                       <a:pPr algn="ctr"/>
                       <a:r>
-                        <a:rPr lang="fr-FR" dirty="0"/>
+                        <a:rPr lang="en-US" noProof="0" dirty="0"/>
                         <a:t>%</a:t>
                       </a:r>
                     </a:p>
@@ -6241,16 +6103,8 @@
                     <a:p>
                       <a:pPr algn="ctr"/>
                       <a:r>
-                        <a:rPr lang="fr-FR" dirty="0"/>
-                        <a:t>Bluetooth </a:t>
-                      </a:r>
-                      <a:r>
-                        <a:rPr lang="fr-FR" dirty="0" err="1"/>
-                        <a:t>operation</a:t>
-                      </a:r>
-                      <a:r>
-                        <a:rPr lang="fr-FR" dirty="0"/>
-                        <a:t> distance</a:t>
+                        <a:rPr lang="en-US" noProof="0" dirty="0"/>
+                        <a:t>Bluetooth operation distance</a:t>
                       </a:r>
                     </a:p>
                   </a:txBody>
@@ -6305,7 +6159,7 @@
                     <a:p>
                       <a:pPr algn="ctr"/>
                       <a:r>
-                        <a:rPr lang="fr-FR" dirty="0"/>
+                        <a:rPr lang="en-US" noProof="0" dirty="0"/>
                         <a:t>1±4</a:t>
                       </a:r>
                     </a:p>
@@ -6356,7 +6210,7 @@
                     <a:p>
                       <a:pPr algn="ctr"/>
                       <a:r>
-                        <a:rPr lang="fr-FR" dirty="0"/>
+                        <a:rPr lang="en-US" noProof="0" dirty="0"/>
                         <a:t>m</a:t>
                       </a:r>
                     </a:p>
@@ -6469,19 +6323,19 @@
           <a:lstStyle/>
           <a:p>
             <a:r>
-              <a:rPr lang="fr-FR" sz="1200" dirty="0">
+              <a:rPr lang="en-US" sz="1200" noProof="0" dirty="0">
                 <a:latin typeface="Abadi" panose="020B0604020104020204" pitchFamily="34" charset="0"/>
               </a:rPr>
               <a:t>HAMADI </a:t>
             </a:r>
             <a:r>
-              <a:rPr lang="fr-FR" sz="1200" dirty="0" err="1">
+              <a:rPr lang="en-US" sz="1200" noProof="0" dirty="0" err="1">
                 <a:latin typeface="Abadi" panose="020B0604020104020204" pitchFamily="34" charset="0"/>
               </a:rPr>
               <a:t>Maoulida</a:t>
             </a:r>
             <a:r>
-              <a:rPr lang="fr-FR" sz="1200" dirty="0">
+              <a:rPr lang="en-US" sz="1200" noProof="0" dirty="0">
                 <a:latin typeface="Abadi" panose="020B0604020104020204" pitchFamily="34" charset="0"/>
               </a:rPr>
               <a:t> - TARTERA Maëlys</a:t>
@@ -6555,7 +6409,7 @@
           <a:lstStyle/>
           <a:p>
             <a:r>
-              <a:rPr lang="fr-FR" dirty="0"/>
+              <a:rPr lang="en-US" noProof="0" dirty="0"/>
               <a:t>3</a:t>
             </a:r>
           </a:p>
@@ -6590,25 +6444,13 @@
           <a:lstStyle/>
           <a:p>
             <a:r>
-              <a:rPr lang="fr-FR" b="1" u="sng" dirty="0" err="1">
+              <a:rPr lang="en-US" b="1" u="sng" noProof="0" dirty="0">
                 <a:latin typeface="Abadi" panose="020B0604020104020204" pitchFamily="34" charset="0"/>
               </a:rPr>
-              <a:t>Typical</a:t>
-            </a:r>
-            <a:r>
-              <a:rPr lang="fr-FR" b="1" u="sng" dirty="0">
-                <a:latin typeface="Abadi" panose="020B0604020104020204" pitchFamily="34" charset="0"/>
-              </a:rPr>
-              <a:t> performance </a:t>
-            </a:r>
-            <a:r>
-              <a:rPr lang="fr-FR" b="1" u="sng" dirty="0" err="1">
-                <a:latin typeface="Abadi" panose="020B0604020104020204" pitchFamily="34" charset="0"/>
-              </a:rPr>
-              <a:t>characteristics</a:t>
-            </a:r>
-            <a:r>
-              <a:rPr lang="fr-FR" dirty="0">
+              <a:t>Typical performance characteristics</a:t>
+            </a:r>
+            <a:r>
+              <a:rPr lang="en-US" noProof="0" dirty="0">
                 <a:latin typeface="Abadi" panose="020B0604020104020204" pitchFamily="34" charset="0"/>
               </a:rPr>
               <a:t>: </a:t>
@@ -6764,32 +6606,11 @@
           <a:lstStyle/>
           <a:p>
             <a:r>
-              <a:rPr lang="fr-FR" b="1" dirty="0">
+              <a:rPr lang="en-US" b="1" noProof="0" dirty="0">
                 <a:latin typeface="Abadi" panose="020B0604020104020204" pitchFamily="34" charset="0"/>
               </a:rPr>
-              <a:t>GT-LGT2803-Low Tech Graphite </a:t>
-            </a:r>
-            <a:r>
-              <a:rPr lang="fr-FR" b="1" dirty="0" err="1">
-                <a:latin typeface="Abadi" panose="020B0604020104020204" pitchFamily="34" charset="0"/>
-              </a:rPr>
-              <a:t>Strain</a:t>
-            </a:r>
-            <a:r>
-              <a:rPr lang="fr-FR" b="1" dirty="0">
-                <a:latin typeface="Abadi" panose="020B0604020104020204" pitchFamily="34" charset="0"/>
-              </a:rPr>
-              <a:t> </a:t>
-            </a:r>
-            <a:r>
-              <a:rPr lang="fr-FR" b="1" dirty="0" err="1">
-                <a:latin typeface="Abadi" panose="020B0604020104020204" pitchFamily="34" charset="0"/>
-              </a:rPr>
-              <a:t>Sensor</a:t>
-            </a:r>
-            <a:endParaRPr lang="fr-FR" b="1" dirty="0">
-              <a:latin typeface="Abadi" panose="020B0604020104020204" pitchFamily="34" charset="0"/>
-            </a:endParaRPr>
+              <a:t>GT-LGT2803-Low Tech Graphite Strain Sensor</a:t>
+            </a:r>
           </a:p>
         </p:txBody>
       </p:sp>
@@ -6822,46 +6643,9 @@
           <a:lstStyle/>
           <a:p>
             <a:r>
-              <a:rPr lang="fr-FR" dirty="0"/>
-              <a:t>Pencil type-unit of the </a:t>
-            </a:r>
-            <a:r>
-              <a:rPr lang="fr-FR" dirty="0" err="1"/>
-              <a:t>resistance</a:t>
-            </a:r>
-            <a:r>
-              <a:rPr lang="fr-FR" dirty="0"/>
-              <a:t> and the </a:t>
-            </a:r>
-            <a:r>
-              <a:rPr lang="fr-FR" dirty="0" err="1"/>
-              <a:t>resistance</a:t>
-            </a:r>
-            <a:r>
-              <a:rPr lang="fr-FR" dirty="0"/>
-              <a:t> </a:t>
-            </a:r>
-            <a:r>
-              <a:rPr lang="fr-FR" dirty="0" err="1"/>
-              <a:t>when</a:t>
-            </a:r>
-            <a:r>
-              <a:rPr lang="fr-FR" dirty="0"/>
-              <a:t> no </a:t>
-            </a:r>
-            <a:r>
-              <a:rPr lang="fr-FR" dirty="0" err="1"/>
-              <a:t>strain</a:t>
-            </a:r>
-            <a:r>
-              <a:rPr lang="fr-FR" dirty="0"/>
-              <a:t> </a:t>
-            </a:r>
-            <a:r>
-              <a:rPr lang="fr-FR" dirty="0" err="1"/>
-              <a:t>applied</a:t>
-            </a:r>
-            <a:endParaRPr lang="fr-FR" dirty="0"/>
+              <a:rPr lang="en-US" noProof="0" dirty="0"/>
+              <a:t>Pencil type-unit of the resistance and the resistance when no strain applied</a:t>
+            </a:r>
           </a:p>
         </p:txBody>
       </p:sp>
@@ -6894,24 +6678,68 @@
           <a:lstStyle/>
           <a:p>
             <a:r>
-              <a:rPr lang="fr-FR" dirty="0"/>
-              <a:t>Courbes de </a:t>
-            </a:r>
-            <a:r>
-              <a:rPr lang="fr-FR" dirty="0" err="1"/>
+              <a:rPr lang="en-US" noProof="0" dirty="0" err="1"/>
+              <a:t>Courbes</a:t>
+            </a:r>
+            <a:r>
+              <a:rPr lang="en-US" noProof="0" dirty="0"/>
+              <a:t> de </a:t>
+            </a:r>
+            <a:r>
+              <a:rPr lang="en-US" noProof="0" dirty="0" err="1"/>
               <a:t>deltaR</a:t>
             </a:r>
             <a:r>
-              <a:rPr lang="fr-FR" dirty="0"/>
-              <a:t>/R0 en fonction de la </a:t>
-            </a:r>
-            <a:r>
-              <a:rPr lang="fr-FR" dirty="0" err="1"/>
-              <a:t>deformation</a:t>
-            </a:r>
-            <a:r>
-              <a:rPr lang="fr-FR" dirty="0"/>
-              <a:t> soit en % soit en cm</a:t>
+              <a:rPr lang="en-US" noProof="0" dirty="0"/>
+              <a:t>/R0 </a:t>
+            </a:r>
+            <a:r>
+              <a:rPr lang="en-US" noProof="0" dirty="0" err="1"/>
+              <a:t>en</a:t>
+            </a:r>
+            <a:r>
+              <a:rPr lang="en-US" noProof="0" dirty="0"/>
+              <a:t> </a:t>
+            </a:r>
+            <a:r>
+              <a:rPr lang="en-US" noProof="0" dirty="0" err="1"/>
+              <a:t>fonction</a:t>
+            </a:r>
+            <a:r>
+              <a:rPr lang="en-US" noProof="0" dirty="0"/>
+              <a:t> de la deformation </a:t>
+            </a:r>
+            <a:r>
+              <a:rPr lang="en-US" noProof="0" dirty="0" err="1"/>
+              <a:t>soit</a:t>
+            </a:r>
+            <a:r>
+              <a:rPr lang="en-US" noProof="0" dirty="0"/>
+              <a:t> </a:t>
+            </a:r>
+            <a:r>
+              <a:rPr lang="en-US" noProof="0" dirty="0" err="1"/>
+              <a:t>en</a:t>
+            </a:r>
+            <a:r>
+              <a:rPr lang="en-US" noProof="0" dirty="0"/>
+              <a:t> % </a:t>
+            </a:r>
+            <a:r>
+              <a:rPr lang="en-US" noProof="0" dirty="0" err="1"/>
+              <a:t>soit</a:t>
+            </a:r>
+            <a:r>
+              <a:rPr lang="en-US" noProof="0" dirty="0"/>
+              <a:t> </a:t>
+            </a:r>
+            <a:r>
+              <a:rPr lang="en-US" noProof="0" dirty="0" err="1"/>
+              <a:t>en</a:t>
+            </a:r>
+            <a:r>
+              <a:rPr lang="en-US" noProof="0" dirty="0"/>
+              <a:t> cm</a:t>
             </a:r>
           </a:p>
         </p:txBody>
@@ -6975,19 +6803,19 @@
           <a:lstStyle/>
           <a:p>
             <a:r>
-              <a:rPr lang="fr-FR" sz="1200" dirty="0">
+              <a:rPr lang="en-US" sz="1200" noProof="0" dirty="0">
                 <a:latin typeface="Abadi" panose="020B0604020104020204" pitchFamily="34" charset="0"/>
               </a:rPr>
               <a:t>HAMADI </a:t>
             </a:r>
             <a:r>
-              <a:rPr lang="fr-FR" sz="1200" dirty="0" err="1">
+              <a:rPr lang="en-US" sz="1200" noProof="0" dirty="0" err="1">
                 <a:latin typeface="Abadi" panose="020B0604020104020204" pitchFamily="34" charset="0"/>
               </a:rPr>
               <a:t>Maoulida</a:t>
             </a:r>
             <a:r>
-              <a:rPr lang="fr-FR" sz="1200" dirty="0">
+              <a:rPr lang="en-US" sz="1200" noProof="0" dirty="0">
                 <a:latin typeface="Abadi" panose="020B0604020104020204" pitchFamily="34" charset="0"/>
               </a:rPr>
               <a:t> - TARTERA Maëlys</a:t>
@@ -7061,7 +6889,7 @@
           <a:lstStyle/>
           <a:p>
             <a:r>
-              <a:rPr lang="fr-FR" dirty="0"/>
+              <a:rPr lang="en-US" noProof="0" dirty="0"/>
               <a:t>4</a:t>
             </a:r>
           </a:p>
@@ -7215,32 +7043,11 @@
           <a:lstStyle/>
           <a:p>
             <a:r>
-              <a:rPr lang="fr-FR" b="1" dirty="0">
+              <a:rPr lang="en-US" b="1" noProof="0" dirty="0">
                 <a:latin typeface="Abadi" panose="020B0604020104020204" pitchFamily="34" charset="0"/>
               </a:rPr>
-              <a:t>GT-LGT2803-Low Tech Graphite </a:t>
-            </a:r>
-            <a:r>
-              <a:rPr lang="fr-FR" b="1" dirty="0" err="1">
-                <a:latin typeface="Abadi" panose="020B0604020104020204" pitchFamily="34" charset="0"/>
-              </a:rPr>
-              <a:t>Strain</a:t>
-            </a:r>
-            <a:r>
-              <a:rPr lang="fr-FR" b="1" dirty="0">
-                <a:latin typeface="Abadi" panose="020B0604020104020204" pitchFamily="34" charset="0"/>
-              </a:rPr>
-              <a:t> </a:t>
-            </a:r>
-            <a:r>
-              <a:rPr lang="fr-FR" b="1" dirty="0" err="1">
-                <a:latin typeface="Abadi" panose="020B0604020104020204" pitchFamily="34" charset="0"/>
-              </a:rPr>
-              <a:t>Sensor</a:t>
-            </a:r>
-            <a:endParaRPr lang="fr-FR" b="1" dirty="0">
-              <a:latin typeface="Abadi" panose="020B0604020104020204" pitchFamily="34" charset="0"/>
-            </a:endParaRPr>
+              <a:t>GT-LGT2803-Low Tech Graphite Strain Sensor</a:t>
+            </a:r>
           </a:p>
         </p:txBody>
       </p:sp>
@@ -7273,19 +7080,13 @@
           <a:lstStyle/>
           <a:p>
             <a:r>
-              <a:rPr lang="fr-FR" b="1" u="sng" dirty="0" err="1">
+              <a:rPr lang="en-US" b="1" u="sng" noProof="0" dirty="0">
                 <a:latin typeface="Abadi" panose="020B0604020104020204" pitchFamily="34" charset="0"/>
               </a:rPr>
-              <a:t>Typical</a:t>
-            </a:r>
-            <a:r>
-              <a:rPr lang="fr-FR" b="1" u="sng" dirty="0">
-                <a:latin typeface="Abadi" panose="020B0604020104020204" pitchFamily="34" charset="0"/>
-              </a:rPr>
-              <a:t> application </a:t>
-            </a:r>
-            <a:r>
-              <a:rPr lang="fr-FR" dirty="0">
+              <a:t>Typical application </a:t>
+            </a:r>
+            <a:r>
+              <a:rPr lang="en-US" noProof="0" dirty="0">
                 <a:latin typeface="Abadi" panose="020B0604020104020204" pitchFamily="34" charset="0"/>
               </a:rPr>
               <a:t>: </a:t>
@@ -7315,7 +7116,7 @@
         </p:blipFill>
         <p:spPr>
           <a:xfrm>
-            <a:off x="221146" y="1778830"/>
+            <a:off x="359986" y="1806727"/>
             <a:ext cx="5900739" cy="2048468"/>
           </a:xfrm>
           <a:prstGeom prst="rect">
@@ -7323,255 +7124,492 @@
           </a:prstGeom>
         </p:spPr>
       </p:pic>
-      <p:sp>
-        <p:nvSpPr>
-          <p:cNvPr id="13" name="ZoneTexte 12">
-            <a:extLst>
-              <a:ext uri="{FF2B5EF4-FFF2-40B4-BE49-F238E27FC236}">
-                <a16:creationId xmlns:a16="http://schemas.microsoft.com/office/drawing/2014/main" id="{67C71F0A-70DE-B87C-7E2D-EF1061F36C38}"/>
-              </a:ext>
-            </a:extLst>
-          </p:cNvPr>
-          <p:cNvSpPr txBox="1"/>
-          <p:nvPr/>
-        </p:nvSpPr>
-        <p:spPr>
-          <a:xfrm>
-            <a:off x="201251" y="4163402"/>
-            <a:ext cx="6218210" cy="1169551"/>
-          </a:xfrm>
-          <a:prstGeom prst="rect">
-            <a:avLst/>
-          </a:prstGeom>
-          <a:noFill/>
-        </p:spPr>
-        <p:txBody>
-          <a:bodyPr wrap="square" rtlCol="0">
-            <a:spAutoFit/>
-          </a:bodyPr>
-          <a:lstStyle/>
-          <a:p>
-            <a:r>
-              <a:rPr lang="fr-FR" sz="1400" dirty="0">
-                <a:latin typeface="Arial" panose="020B0604020202020204" pitchFamily="34" charset="0"/>
-                <a:cs typeface="Arial" panose="020B0604020202020204" pitchFamily="34" charset="0"/>
-              </a:rPr>
-              <a:t>The graphite </a:t>
-            </a:r>
-            <a:r>
-              <a:rPr lang="fr-FR" sz="1400" dirty="0" err="1">
-                <a:latin typeface="Arial" panose="020B0604020202020204" pitchFamily="34" charset="0"/>
-                <a:cs typeface="Arial" panose="020B0604020202020204" pitchFamily="34" charset="0"/>
-              </a:rPr>
-              <a:t>strain</a:t>
-            </a:r>
-            <a:r>
-              <a:rPr lang="fr-FR" sz="1400" dirty="0">
-                <a:latin typeface="Arial" panose="020B0604020202020204" pitchFamily="34" charset="0"/>
-                <a:cs typeface="Arial" panose="020B0604020202020204" pitchFamily="34" charset="0"/>
-              </a:rPr>
-              <a:t> </a:t>
-            </a:r>
-            <a:r>
-              <a:rPr lang="fr-FR" sz="1400" dirty="0" err="1">
-                <a:latin typeface="Arial" panose="020B0604020202020204" pitchFamily="34" charset="0"/>
-                <a:cs typeface="Arial" panose="020B0604020202020204" pitchFamily="34" charset="0"/>
-              </a:rPr>
-              <a:t>sensor</a:t>
-            </a:r>
-            <a:r>
-              <a:rPr lang="fr-FR" sz="1400" dirty="0">
-                <a:latin typeface="Arial" panose="020B0604020202020204" pitchFamily="34" charset="0"/>
-                <a:cs typeface="Arial" panose="020B0604020202020204" pitchFamily="34" charset="0"/>
-              </a:rPr>
-              <a:t> GT-LGT2803 </a:t>
-            </a:r>
-            <a:r>
-              <a:rPr lang="fr-FR" sz="1400" dirty="0" err="1">
-                <a:latin typeface="Arial" panose="020B0604020202020204" pitchFamily="34" charset="0"/>
-                <a:cs typeface="Arial" panose="020B0604020202020204" pitchFamily="34" charset="0"/>
-              </a:rPr>
-              <a:t>is</a:t>
-            </a:r>
-            <a:r>
-              <a:rPr lang="fr-FR" sz="1400" dirty="0">
-                <a:latin typeface="Arial" panose="020B0604020202020204" pitchFamily="34" charset="0"/>
-                <a:cs typeface="Arial" panose="020B0604020202020204" pitchFamily="34" charset="0"/>
-              </a:rPr>
-              <a:t> </a:t>
-            </a:r>
-            <a:r>
-              <a:rPr lang="fr-FR" sz="1400" dirty="0" err="1">
-                <a:latin typeface="Arial" panose="020B0604020202020204" pitchFamily="34" charset="0"/>
-                <a:cs typeface="Arial" panose="020B0604020202020204" pitchFamily="34" charset="0"/>
-              </a:rPr>
-              <a:t>connected</a:t>
-            </a:r>
-            <a:r>
-              <a:rPr lang="fr-FR" sz="1400" dirty="0">
-                <a:latin typeface="Arial" panose="020B0604020202020204" pitchFamily="34" charset="0"/>
-                <a:cs typeface="Arial" panose="020B0604020202020204" pitchFamily="34" charset="0"/>
-              </a:rPr>
-              <a:t> to a Vcc=5V power </a:t>
-            </a:r>
-            <a:r>
-              <a:rPr lang="fr-FR" sz="1400" dirty="0" err="1">
-                <a:latin typeface="Arial" panose="020B0604020202020204" pitchFamily="34" charset="0"/>
-                <a:cs typeface="Arial" panose="020B0604020202020204" pitchFamily="34" charset="0"/>
-              </a:rPr>
-              <a:t>supply</a:t>
-            </a:r>
-            <a:r>
-              <a:rPr lang="fr-FR" sz="1400" dirty="0">
-                <a:latin typeface="Arial" panose="020B0604020202020204" pitchFamily="34" charset="0"/>
-                <a:cs typeface="Arial" panose="020B0604020202020204" pitchFamily="34" charset="0"/>
-              </a:rPr>
-              <a:t> on </a:t>
-            </a:r>
-            <a:r>
-              <a:rPr lang="fr-FR" sz="1400" dirty="0" err="1">
-                <a:latin typeface="Arial" panose="020B0604020202020204" pitchFamily="34" charset="0"/>
-                <a:cs typeface="Arial" panose="020B0604020202020204" pitchFamily="34" charset="0"/>
-              </a:rPr>
-              <a:t>its</a:t>
-            </a:r>
-            <a:r>
-              <a:rPr lang="fr-FR" sz="1400" dirty="0">
-                <a:latin typeface="Arial" panose="020B0604020202020204" pitchFamily="34" charset="0"/>
-                <a:cs typeface="Arial" panose="020B0604020202020204" pitchFamily="34" charset="0"/>
-              </a:rPr>
-              <a:t> pin 2, </a:t>
-            </a:r>
-            <a:r>
-              <a:rPr lang="fr-FR" sz="1400" dirty="0" err="1">
-                <a:latin typeface="Arial" panose="020B0604020202020204" pitchFamily="34" charset="0"/>
-                <a:cs typeface="Arial" panose="020B0604020202020204" pitchFamily="34" charset="0"/>
-              </a:rPr>
-              <a:t>its</a:t>
-            </a:r>
-            <a:r>
-              <a:rPr lang="fr-FR" sz="1400" dirty="0">
-                <a:latin typeface="Arial" panose="020B0604020202020204" pitchFamily="34" charset="0"/>
-                <a:cs typeface="Arial" panose="020B0604020202020204" pitchFamily="34" charset="0"/>
-              </a:rPr>
-              <a:t> pin 1 </a:t>
-            </a:r>
-            <a:r>
-              <a:rPr lang="fr-FR" sz="1400" dirty="0" err="1">
-                <a:latin typeface="Arial" panose="020B0604020202020204" pitchFamily="34" charset="0"/>
-                <a:cs typeface="Arial" panose="020B0604020202020204" pitchFamily="34" charset="0"/>
-              </a:rPr>
-              <a:t>is</a:t>
-            </a:r>
-            <a:r>
-              <a:rPr lang="fr-FR" sz="1400" dirty="0">
-                <a:latin typeface="Arial" panose="020B0604020202020204" pitchFamily="34" charset="0"/>
-                <a:cs typeface="Arial" panose="020B0604020202020204" pitchFamily="34" charset="0"/>
-              </a:rPr>
-              <a:t> </a:t>
-            </a:r>
-            <a:r>
-              <a:rPr lang="fr-FR" sz="1400" dirty="0" err="1">
-                <a:latin typeface="Arial" panose="020B0604020202020204" pitchFamily="34" charset="0"/>
-                <a:cs typeface="Arial" panose="020B0604020202020204" pitchFamily="34" charset="0"/>
-              </a:rPr>
-              <a:t>connected</a:t>
-            </a:r>
-            <a:r>
-              <a:rPr lang="fr-FR" sz="1400" dirty="0">
-                <a:latin typeface="Arial" panose="020B0604020202020204" pitchFamily="34" charset="0"/>
-                <a:cs typeface="Arial" panose="020B0604020202020204" pitchFamily="34" charset="0"/>
-              </a:rPr>
-              <a:t> to a </a:t>
-            </a:r>
-            <a:r>
-              <a:rPr lang="fr-FR" sz="1400" dirty="0" err="1">
-                <a:latin typeface="Arial" panose="020B0604020202020204" pitchFamily="34" charset="0"/>
-                <a:cs typeface="Arial" panose="020B0604020202020204" pitchFamily="34" charset="0"/>
-              </a:rPr>
-              <a:t>transimpedence</a:t>
-            </a:r>
-            <a:r>
-              <a:rPr lang="fr-FR" sz="1400" dirty="0">
-                <a:latin typeface="Arial" panose="020B0604020202020204" pitchFamily="34" charset="0"/>
-                <a:cs typeface="Arial" panose="020B0604020202020204" pitchFamily="34" charset="0"/>
-              </a:rPr>
-              <a:t> amplifier circuit </a:t>
-            </a:r>
-            <a:r>
-              <a:rPr lang="fr-FR" sz="1400" dirty="0" err="1">
-                <a:latin typeface="Arial" panose="020B0604020202020204" pitchFamily="34" charset="0"/>
-                <a:cs typeface="Arial" panose="020B0604020202020204" pitchFamily="34" charset="0"/>
-              </a:rPr>
-              <a:t>designed</a:t>
-            </a:r>
-            <a:r>
-              <a:rPr lang="fr-FR" sz="1400" dirty="0">
-                <a:latin typeface="Arial" panose="020B0604020202020204" pitchFamily="34" charset="0"/>
-                <a:cs typeface="Arial" panose="020B0604020202020204" pitchFamily="34" charset="0"/>
-              </a:rPr>
-              <a:t> to cancel noise. </a:t>
-            </a:r>
-          </a:p>
-          <a:p>
-            <a:endParaRPr lang="fr-FR" sz="1400">
-              <a:latin typeface="Arial" panose="020B0604020202020204" pitchFamily="34" charset="0"/>
-              <a:cs typeface="Arial" panose="020B0604020202020204" pitchFamily="34" charset="0"/>
-            </a:endParaRPr>
-          </a:p>
-          <a:p>
-            <a:r>
-              <a:rPr lang="fr-FR" sz="1400">
-                <a:latin typeface="Arial" panose="020B0604020202020204" pitchFamily="34" charset="0"/>
-                <a:cs typeface="Arial" panose="020B0604020202020204" pitchFamily="34" charset="0"/>
-              </a:rPr>
-              <a:t>and </a:t>
-            </a:r>
-            <a:r>
-              <a:rPr lang="fr-FR" sz="1400" dirty="0" err="1">
-                <a:latin typeface="Arial" panose="020B0604020202020204" pitchFamily="34" charset="0"/>
-                <a:cs typeface="Arial" panose="020B0604020202020204" pitchFamily="34" charset="0"/>
-              </a:rPr>
-              <a:t>allow</a:t>
-            </a:r>
-            <a:r>
-              <a:rPr lang="fr-FR" sz="1400" dirty="0">
-                <a:latin typeface="Arial" panose="020B0604020202020204" pitchFamily="34" charset="0"/>
-                <a:cs typeface="Arial" panose="020B0604020202020204" pitchFamily="34" charset="0"/>
-              </a:rPr>
-              <a:t> the GT-LGT2803 to </a:t>
-            </a:r>
-            <a:r>
-              <a:rPr lang="fr-FR" sz="1400" dirty="0" err="1">
-                <a:latin typeface="Arial" panose="020B0604020202020204" pitchFamily="34" charset="0"/>
-                <a:cs typeface="Arial" panose="020B0604020202020204" pitchFamily="34" charset="0"/>
-              </a:rPr>
-              <a:t>be</a:t>
-            </a:r>
-            <a:r>
-              <a:rPr lang="fr-FR" sz="1400" dirty="0">
-                <a:latin typeface="Arial" panose="020B0604020202020204" pitchFamily="34" charset="0"/>
-                <a:cs typeface="Arial" panose="020B0604020202020204" pitchFamily="34" charset="0"/>
-              </a:rPr>
-              <a:t> </a:t>
-            </a:r>
-            <a:r>
-              <a:rPr lang="fr-FR" sz="1400" dirty="0" err="1">
-                <a:latin typeface="Arial" panose="020B0604020202020204" pitchFamily="34" charset="0"/>
-                <a:cs typeface="Arial" panose="020B0604020202020204" pitchFamily="34" charset="0"/>
-              </a:rPr>
-              <a:t>connected</a:t>
-            </a:r>
-            <a:r>
-              <a:rPr lang="fr-FR" sz="1400" dirty="0">
-                <a:latin typeface="Arial" panose="020B0604020202020204" pitchFamily="34" charset="0"/>
-                <a:cs typeface="Arial" panose="020B0604020202020204" pitchFamily="34" charset="0"/>
-              </a:rPr>
-              <a:t> to an </a:t>
-            </a:r>
-          </a:p>
-        </p:txBody>
-      </p:sp>
+      <mc:AlternateContent xmlns:mc="http://schemas.openxmlformats.org/markup-compatibility/2006">
+        <mc:Choice xmlns:a14="http://schemas.microsoft.com/office/drawing/2010/main" Requires="a14">
+          <p:sp>
+            <p:nvSpPr>
+              <p:cNvPr id="13" name="ZoneTexte 12">
+                <a:extLst>
+                  <a:ext uri="{FF2B5EF4-FFF2-40B4-BE49-F238E27FC236}">
+                    <a16:creationId xmlns:a16="http://schemas.microsoft.com/office/drawing/2014/main" id="{67C71F0A-70DE-B87C-7E2D-EF1061F36C38}"/>
+                  </a:ext>
+                </a:extLst>
+              </p:cNvPr>
+              <p:cNvSpPr txBox="1"/>
+              <p:nvPr/>
+            </p:nvSpPr>
+            <p:spPr>
+              <a:xfrm>
+                <a:off x="201251" y="4163402"/>
+                <a:ext cx="6218210" cy="3287375"/>
+              </a:xfrm>
+              <a:prstGeom prst="rect">
+                <a:avLst/>
+              </a:prstGeom>
+              <a:noFill/>
+            </p:spPr>
+            <p:txBody>
+              <a:bodyPr wrap="square" rtlCol="0">
+                <a:spAutoFit/>
+              </a:bodyPr>
+              <a:lstStyle/>
+              <a:p>
+                <a:r>
+                  <a:rPr lang="en-US" sz="1400" noProof="0" dirty="0">
+                    <a:latin typeface="Arial" panose="020B0604020202020204" pitchFamily="34" charset="0"/>
+                    <a:cs typeface="Arial" panose="020B0604020202020204" pitchFamily="34" charset="0"/>
+                  </a:rPr>
+                  <a:t>The graphite strain sensor GT-LGT2803 can be connected to a </a:t>
+                </a:r>
+                <a:r>
+                  <a:rPr lang="en-US" sz="1400" noProof="0" dirty="0" err="1">
+                    <a:latin typeface="Arial" panose="020B0604020202020204" pitchFamily="34" charset="0"/>
+                    <a:cs typeface="Arial" panose="020B0604020202020204" pitchFamily="34" charset="0"/>
+                  </a:rPr>
+                  <a:t>Vcc</a:t>
+                </a:r>
+                <a:r>
+                  <a:rPr lang="en-US" sz="1400" noProof="0" dirty="0">
+                    <a:latin typeface="Arial" panose="020B0604020202020204" pitchFamily="34" charset="0"/>
+                    <a:cs typeface="Arial" panose="020B0604020202020204" pitchFamily="34" charset="0"/>
+                  </a:rPr>
+                  <a:t>=5V power supply on its pin 2 and its pin 1 can be connected to a transimpedance amplifier circuit designed to cancel noise. The transimpedance amplifier is composed of three low pass filters designed to deliver a 50mV~1V voltage (</a:t>
+                </a:r>
+                <a:r>
+                  <a:rPr lang="en-US" sz="1400" noProof="0" dirty="0" err="1">
+                    <a:latin typeface="Arial" panose="020B0604020202020204" pitchFamily="34" charset="0"/>
+                    <a:cs typeface="Arial" panose="020B0604020202020204" pitchFamily="34" charset="0"/>
+                  </a:rPr>
+                  <a:t>Ampout</a:t>
+                </a:r>
+                <a:r>
+                  <a:rPr lang="en-US" sz="1400" noProof="0" dirty="0">
+                    <a:latin typeface="Arial" panose="020B0604020202020204" pitchFamily="34" charset="0"/>
+                    <a:cs typeface="Arial" panose="020B0604020202020204" pitchFamily="34" charset="0"/>
+                  </a:rPr>
+                  <a:t> tag) and to cancel the different noises in the amplification process and the electric network coupling. </a:t>
+                </a:r>
+              </a:p>
+              <a:p>
+                <a:endParaRPr lang="en-US" sz="1400" noProof="0" dirty="0">
+                  <a:latin typeface="Arial" panose="020B0604020202020204" pitchFamily="34" charset="0"/>
+                  <a:cs typeface="Arial" panose="020B0604020202020204" pitchFamily="34" charset="0"/>
+                </a:endParaRPr>
+              </a:p>
+              <a:p>
+                <a:r>
+                  <a:rPr lang="en-US" sz="1400" noProof="0" dirty="0">
+                    <a:latin typeface="Arial" panose="020B0604020202020204" pitchFamily="34" charset="0"/>
+                    <a:cs typeface="Arial" panose="020B0604020202020204" pitchFamily="34" charset="0"/>
+                  </a:rPr>
+                  <a:t>As a use example, we can connect the </a:t>
+                </a:r>
+                <a:r>
+                  <a:rPr lang="en-US" sz="1400" noProof="0" dirty="0" err="1">
+                    <a:latin typeface="Arial" panose="020B0604020202020204" pitchFamily="34" charset="0"/>
+                    <a:cs typeface="Arial" panose="020B0604020202020204" pitchFamily="34" charset="0"/>
+                  </a:rPr>
+                  <a:t>Ampout</a:t>
+                </a:r>
+                <a:r>
+                  <a:rPr lang="en-US" sz="1400" noProof="0" dirty="0">
+                    <a:latin typeface="Arial" panose="020B0604020202020204" pitchFamily="34" charset="0"/>
+                    <a:cs typeface="Arial" panose="020B0604020202020204" pitchFamily="34" charset="0"/>
+                  </a:rPr>
+                  <a:t> to an Arduino Uno and plug a variable resistor at “R2” tag that can be modified in accordance with the graphite quantity of the sensor so that the Arduino analog input pin is never saturated. </a:t>
+                </a:r>
+              </a:p>
+              <a:p>
+                <a:endParaRPr lang="en-US" sz="1400" dirty="0">
+                  <a:latin typeface="Arial" panose="020B0604020202020204" pitchFamily="34" charset="0"/>
+                  <a:cs typeface="Arial" panose="020B0604020202020204" pitchFamily="34" charset="0"/>
+                </a:endParaRPr>
+              </a:p>
+              <a:p>
+                <a:r>
+                  <a:rPr lang="en-US" sz="1400" noProof="0" dirty="0">
+                    <a:latin typeface="Arial" panose="020B0604020202020204" pitchFamily="34" charset="0"/>
+                    <a:cs typeface="Arial" panose="020B0604020202020204" pitchFamily="34" charset="0"/>
+                  </a:rPr>
+                  <a:t>Finally, it is possible to know the value of the sensor’s resistance with the following formula: </a:t>
+                </a:r>
+                <a14:m>
+                  <m:oMath xmlns:m="http://schemas.openxmlformats.org/officeDocument/2006/math">
+                    <m:r>
+                      <a:rPr lang="fr-FR" sz="1400" b="0" i="1" noProof="0" smtClean="0">
+                        <a:latin typeface="Cambria Math" panose="02040503050406030204" pitchFamily="18" charset="0"/>
+                        <a:cs typeface="Arial" panose="020B0604020202020204" pitchFamily="34" charset="0"/>
+                      </a:rPr>
+                      <m:t>𝑅</m:t>
+                    </m:r>
+                    <m:sSub>
+                      <m:sSubPr>
+                        <m:ctrlPr>
+                          <a:rPr lang="fr-FR" sz="1400" b="0" i="1" noProof="0" smtClean="0">
+                            <a:latin typeface="Cambria Math" panose="02040503050406030204" pitchFamily="18" charset="0"/>
+                            <a:cs typeface="Arial" panose="020B0604020202020204" pitchFamily="34" charset="0"/>
+                          </a:rPr>
+                        </m:ctrlPr>
+                      </m:sSubPr>
+                      <m:e>
+                        <m:r>
+                          <a:rPr lang="fr-FR" sz="1400" b="0" i="1" noProof="0" smtClean="0">
+                            <a:latin typeface="Cambria Math" panose="02040503050406030204" pitchFamily="18" charset="0"/>
+                            <a:cs typeface="Arial" panose="020B0604020202020204" pitchFamily="34" charset="0"/>
+                          </a:rPr>
+                          <m:t>𝑅</m:t>
+                        </m:r>
+                      </m:e>
+                      <m:sub>
+                        <m:r>
+                          <a:rPr lang="fr-FR" sz="1400" b="0" i="1" noProof="0" smtClean="0">
+                            <a:latin typeface="Cambria Math" panose="02040503050406030204" pitchFamily="18" charset="0"/>
+                            <a:cs typeface="Arial" panose="020B0604020202020204" pitchFamily="34" charset="0"/>
+                          </a:rPr>
+                          <m:t>𝐺𝑇</m:t>
+                        </m:r>
+                        <m:r>
+                          <a:rPr lang="fr-FR" sz="1400" b="0" i="1" noProof="0" smtClean="0">
+                            <a:latin typeface="Cambria Math" panose="02040503050406030204" pitchFamily="18" charset="0"/>
+                            <a:cs typeface="Arial" panose="020B0604020202020204" pitchFamily="34" charset="0"/>
+                          </a:rPr>
+                          <m:t>−</m:t>
+                        </m:r>
+                        <m:r>
+                          <a:rPr lang="fr-FR" sz="1400" b="0" i="1" noProof="0" smtClean="0">
+                            <a:latin typeface="Cambria Math" panose="02040503050406030204" pitchFamily="18" charset="0"/>
+                            <a:cs typeface="Arial" panose="020B0604020202020204" pitchFamily="34" charset="0"/>
+                          </a:rPr>
+                          <m:t>𝐿𝐺𝑇</m:t>
+                        </m:r>
+                        <m:r>
+                          <a:rPr lang="fr-FR" sz="1400" b="0" i="1" noProof="0" smtClean="0">
+                            <a:latin typeface="Cambria Math" panose="02040503050406030204" pitchFamily="18" charset="0"/>
+                            <a:cs typeface="Arial" panose="020B0604020202020204" pitchFamily="34" charset="0"/>
+                          </a:rPr>
+                          <m:t>2803</m:t>
+                        </m:r>
+                      </m:sub>
+                    </m:sSub>
+                    <m:r>
+                      <a:rPr lang="fr-FR" sz="1400" b="0" i="1" noProof="0" smtClean="0">
+                        <a:latin typeface="Cambria Math" panose="02040503050406030204" pitchFamily="18" charset="0"/>
+                        <a:cs typeface="Arial" panose="020B0604020202020204" pitchFamily="34" charset="0"/>
+                      </a:rPr>
+                      <m:t>=</m:t>
+                    </m:r>
+                    <m:sSub>
+                      <m:sSubPr>
+                        <m:ctrlPr>
+                          <a:rPr lang="fr-FR" sz="1400" b="0" i="1" noProof="0" smtClean="0">
+                            <a:latin typeface="Cambria Math" panose="02040503050406030204" pitchFamily="18" charset="0"/>
+                            <a:cs typeface="Arial" panose="020B0604020202020204" pitchFamily="34" charset="0"/>
+                          </a:rPr>
+                        </m:ctrlPr>
+                      </m:sSubPr>
+                      <m:e>
+                        <m:r>
+                          <a:rPr lang="fr-FR" sz="1400" b="0" i="1" noProof="0" smtClean="0">
+                            <a:latin typeface="Cambria Math" panose="02040503050406030204" pitchFamily="18" charset="0"/>
+                            <a:cs typeface="Arial" panose="020B0604020202020204" pitchFamily="34" charset="0"/>
+                          </a:rPr>
+                          <m:t>𝑅</m:t>
+                        </m:r>
+                      </m:e>
+                      <m:sub>
+                        <m:r>
+                          <a:rPr lang="fr-FR" sz="1400" b="0" i="1" noProof="0" smtClean="0">
+                            <a:latin typeface="Cambria Math" panose="02040503050406030204" pitchFamily="18" charset="0"/>
+                            <a:cs typeface="Arial" panose="020B0604020202020204" pitchFamily="34" charset="0"/>
+                          </a:rPr>
+                          <m:t>1</m:t>
+                        </m:r>
+                      </m:sub>
+                    </m:sSub>
+                    <m:d>
+                      <m:dPr>
+                        <m:ctrlPr>
+                          <a:rPr lang="fr-FR" sz="1400" b="0" i="1" noProof="0" smtClean="0">
+                            <a:latin typeface="Cambria Math" panose="02040503050406030204" pitchFamily="18" charset="0"/>
+                            <a:cs typeface="Arial" panose="020B0604020202020204" pitchFamily="34" charset="0"/>
+                          </a:rPr>
+                        </m:ctrlPr>
+                      </m:dPr>
+                      <m:e>
+                        <m:r>
+                          <a:rPr lang="fr-FR" sz="1400" b="0" i="1" noProof="0" smtClean="0">
+                            <a:latin typeface="Cambria Math" panose="02040503050406030204" pitchFamily="18" charset="0"/>
+                            <a:cs typeface="Arial" panose="020B0604020202020204" pitchFamily="34" charset="0"/>
+                          </a:rPr>
+                          <m:t>1+</m:t>
+                        </m:r>
+                        <m:f>
+                          <m:fPr>
+                            <m:ctrlPr>
+                              <a:rPr lang="fr-FR" sz="1400" b="0" i="1" noProof="0" smtClean="0">
+                                <a:latin typeface="Cambria Math" panose="02040503050406030204" pitchFamily="18" charset="0"/>
+                                <a:cs typeface="Arial" panose="020B0604020202020204" pitchFamily="34" charset="0"/>
+                              </a:rPr>
+                            </m:ctrlPr>
+                          </m:fPr>
+                          <m:num>
+                            <m:sSub>
+                              <m:sSubPr>
+                                <m:ctrlPr>
+                                  <a:rPr lang="fr-FR" sz="1400" b="0" i="1" noProof="0" smtClean="0">
+                                    <a:latin typeface="Cambria Math" panose="02040503050406030204" pitchFamily="18" charset="0"/>
+                                    <a:cs typeface="Arial" panose="020B0604020202020204" pitchFamily="34" charset="0"/>
+                                  </a:rPr>
+                                </m:ctrlPr>
+                              </m:sSubPr>
+                              <m:e>
+                                <m:r>
+                                  <a:rPr lang="fr-FR" sz="1400" b="0" i="1" noProof="0" smtClean="0">
+                                    <a:latin typeface="Cambria Math" panose="02040503050406030204" pitchFamily="18" charset="0"/>
+                                    <a:cs typeface="Arial" panose="020B0604020202020204" pitchFamily="34" charset="0"/>
+                                  </a:rPr>
+                                  <m:t>𝑅</m:t>
+                                </m:r>
+                              </m:e>
+                              <m:sub>
+                                <m:r>
+                                  <a:rPr lang="fr-FR" sz="1400" b="0" i="1" noProof="0" smtClean="0">
+                                    <a:latin typeface="Cambria Math" panose="02040503050406030204" pitchFamily="18" charset="0"/>
+                                    <a:cs typeface="Arial" panose="020B0604020202020204" pitchFamily="34" charset="0"/>
+                                  </a:rPr>
+                                  <m:t>3</m:t>
+                                </m:r>
+                              </m:sub>
+                            </m:sSub>
+                          </m:num>
+                          <m:den>
+                            <m:sSub>
+                              <m:sSubPr>
+                                <m:ctrlPr>
+                                  <a:rPr lang="fr-FR" sz="1400" b="0" i="1" noProof="0" smtClean="0">
+                                    <a:latin typeface="Cambria Math" panose="02040503050406030204" pitchFamily="18" charset="0"/>
+                                    <a:cs typeface="Arial" panose="020B0604020202020204" pitchFamily="34" charset="0"/>
+                                  </a:rPr>
+                                </m:ctrlPr>
+                              </m:sSubPr>
+                              <m:e>
+                                <m:r>
+                                  <a:rPr lang="fr-FR" sz="1400" b="0" i="1" noProof="0" smtClean="0">
+                                    <a:latin typeface="Cambria Math" panose="02040503050406030204" pitchFamily="18" charset="0"/>
+                                    <a:cs typeface="Arial" panose="020B0604020202020204" pitchFamily="34" charset="0"/>
+                                  </a:rPr>
+                                  <m:t>𝑅</m:t>
+                                </m:r>
+                              </m:e>
+                              <m:sub>
+                                <m:r>
+                                  <a:rPr lang="fr-FR" sz="1400" b="0" i="1" noProof="0" smtClean="0">
+                                    <a:latin typeface="Cambria Math" panose="02040503050406030204" pitchFamily="18" charset="0"/>
+                                    <a:cs typeface="Arial" panose="020B0604020202020204" pitchFamily="34" charset="0"/>
+                                  </a:rPr>
+                                  <m:t>2</m:t>
+                                </m:r>
+                              </m:sub>
+                            </m:sSub>
+                          </m:den>
+                        </m:f>
+                      </m:e>
+                    </m:d>
+                    <m:f>
+                      <m:fPr>
+                        <m:ctrlPr>
+                          <a:rPr lang="fr-FR" sz="1400" b="0" i="1" noProof="0" smtClean="0">
+                            <a:latin typeface="Cambria Math" panose="02040503050406030204" pitchFamily="18" charset="0"/>
+                            <a:cs typeface="Arial" panose="020B0604020202020204" pitchFamily="34" charset="0"/>
+                          </a:rPr>
+                        </m:ctrlPr>
+                      </m:fPr>
+                      <m:num>
+                        <m:sSub>
+                          <m:sSubPr>
+                            <m:ctrlPr>
+                              <a:rPr lang="fr-FR" sz="1400" b="0" i="1" noProof="0" smtClean="0">
+                                <a:latin typeface="Cambria Math" panose="02040503050406030204" pitchFamily="18" charset="0"/>
+                                <a:cs typeface="Arial" panose="020B0604020202020204" pitchFamily="34" charset="0"/>
+                              </a:rPr>
+                            </m:ctrlPr>
+                          </m:sSubPr>
+                          <m:e>
+                            <m:r>
+                              <a:rPr lang="fr-FR" sz="1400" b="0" i="1" noProof="0" smtClean="0">
+                                <a:latin typeface="Cambria Math" panose="02040503050406030204" pitchFamily="18" charset="0"/>
+                                <a:cs typeface="Arial" panose="020B0604020202020204" pitchFamily="34" charset="0"/>
+                              </a:rPr>
+                              <m:t>𝑉</m:t>
+                            </m:r>
+                          </m:e>
+                          <m:sub>
+                            <m:r>
+                              <a:rPr lang="fr-FR" sz="1400" b="0" i="1" noProof="0" smtClean="0">
+                                <a:latin typeface="Cambria Math" panose="02040503050406030204" pitchFamily="18" charset="0"/>
+                                <a:cs typeface="Arial" panose="020B0604020202020204" pitchFamily="34" charset="0"/>
+                              </a:rPr>
+                              <m:t>𝑐𝑐</m:t>
+                            </m:r>
+                          </m:sub>
+                        </m:sSub>
+                      </m:num>
+                      <m:den>
+                        <m:sSub>
+                          <m:sSubPr>
+                            <m:ctrlPr>
+                              <a:rPr lang="fr-FR" sz="1400" b="0" i="1" noProof="0" smtClean="0">
+                                <a:latin typeface="Cambria Math" panose="02040503050406030204" pitchFamily="18" charset="0"/>
+                                <a:cs typeface="Arial" panose="020B0604020202020204" pitchFamily="34" charset="0"/>
+                              </a:rPr>
+                            </m:ctrlPr>
+                          </m:sSubPr>
+                          <m:e>
+                            <m:r>
+                              <a:rPr lang="fr-FR" sz="1400" b="0" i="1" noProof="0" smtClean="0">
+                                <a:latin typeface="Cambria Math" panose="02040503050406030204" pitchFamily="18" charset="0"/>
+                                <a:cs typeface="Arial" panose="020B0604020202020204" pitchFamily="34" charset="0"/>
+                              </a:rPr>
+                              <m:t>𝑉</m:t>
+                            </m:r>
+                          </m:e>
+                          <m:sub>
+                            <m:r>
+                              <a:rPr lang="fr-FR" sz="1400" b="0" i="1" noProof="0" smtClean="0">
+                                <a:latin typeface="Cambria Math" panose="02040503050406030204" pitchFamily="18" charset="0"/>
+                                <a:cs typeface="Arial" panose="020B0604020202020204" pitchFamily="34" charset="0"/>
+                              </a:rPr>
+                              <m:t>𝐴𝑚𝑝𝑜𝑢𝑡</m:t>
+                            </m:r>
+                          </m:sub>
+                        </m:sSub>
+                      </m:den>
+                    </m:f>
+                    <m:r>
+                      <a:rPr lang="fr-FR" sz="1400" b="0" i="1" noProof="0" smtClean="0">
+                        <a:latin typeface="Cambria Math" panose="02040503050406030204" pitchFamily="18" charset="0"/>
+                        <a:cs typeface="Arial" panose="020B0604020202020204" pitchFamily="34" charset="0"/>
+                      </a:rPr>
+                      <m:t>−</m:t>
+                    </m:r>
+                    <m:sSub>
+                      <m:sSubPr>
+                        <m:ctrlPr>
+                          <a:rPr lang="fr-FR" sz="1400" b="0" i="1" noProof="0" smtClean="0">
+                            <a:latin typeface="Cambria Math" panose="02040503050406030204" pitchFamily="18" charset="0"/>
+                            <a:cs typeface="Arial" panose="020B0604020202020204" pitchFamily="34" charset="0"/>
+                          </a:rPr>
+                        </m:ctrlPr>
+                      </m:sSubPr>
+                      <m:e>
+                        <m:r>
+                          <a:rPr lang="fr-FR" sz="1400" b="0" i="1" noProof="0" smtClean="0">
+                            <a:latin typeface="Cambria Math" panose="02040503050406030204" pitchFamily="18" charset="0"/>
+                            <a:cs typeface="Arial" panose="020B0604020202020204" pitchFamily="34" charset="0"/>
+                          </a:rPr>
+                          <m:t>𝑅</m:t>
+                        </m:r>
+                      </m:e>
+                      <m:sub>
+                        <m:r>
+                          <a:rPr lang="fr-FR" sz="1400" b="0" i="1" noProof="0" smtClean="0">
+                            <a:latin typeface="Cambria Math" panose="02040503050406030204" pitchFamily="18" charset="0"/>
+                            <a:cs typeface="Arial" panose="020B0604020202020204" pitchFamily="34" charset="0"/>
+                          </a:rPr>
+                          <m:t>1</m:t>
+                        </m:r>
+                      </m:sub>
+                    </m:sSub>
+                    <m:r>
+                      <a:rPr lang="fr-FR" sz="1400" b="0" i="1" noProof="0" smtClean="0">
+                        <a:latin typeface="Cambria Math" panose="02040503050406030204" pitchFamily="18" charset="0"/>
+                        <a:cs typeface="Arial" panose="020B0604020202020204" pitchFamily="34" charset="0"/>
+                      </a:rPr>
+                      <m:t>−</m:t>
+                    </m:r>
+                    <m:sSub>
+                      <m:sSubPr>
+                        <m:ctrlPr>
+                          <a:rPr lang="fr-FR" sz="1400" b="0" i="1" noProof="0" smtClean="0">
+                            <a:latin typeface="Cambria Math" panose="02040503050406030204" pitchFamily="18" charset="0"/>
+                            <a:cs typeface="Arial" panose="020B0604020202020204" pitchFamily="34" charset="0"/>
+                          </a:rPr>
+                        </m:ctrlPr>
+                      </m:sSubPr>
+                      <m:e>
+                        <m:r>
+                          <a:rPr lang="fr-FR" sz="1400" b="0" i="1" noProof="0" smtClean="0">
+                            <a:latin typeface="Cambria Math" panose="02040503050406030204" pitchFamily="18" charset="0"/>
+                            <a:cs typeface="Arial" panose="020B0604020202020204" pitchFamily="34" charset="0"/>
+                          </a:rPr>
+                          <m:t>𝑅</m:t>
+                        </m:r>
+                      </m:e>
+                      <m:sub>
+                        <m:r>
+                          <a:rPr lang="fr-FR" sz="1400" b="0" i="1" noProof="0" smtClean="0">
+                            <a:latin typeface="Cambria Math" panose="02040503050406030204" pitchFamily="18" charset="0"/>
+                            <a:cs typeface="Arial" panose="020B0604020202020204" pitchFamily="34" charset="0"/>
+                          </a:rPr>
+                          <m:t>6</m:t>
+                        </m:r>
+                      </m:sub>
+                    </m:sSub>
+                  </m:oMath>
+                </a14:m>
+                <a:endParaRPr lang="en-US" sz="1400" noProof="0" dirty="0">
+                  <a:latin typeface="Arial" panose="020B0604020202020204" pitchFamily="34" charset="0"/>
+                  <a:cs typeface="Arial" panose="020B0604020202020204" pitchFamily="34" charset="0"/>
+                </a:endParaRPr>
+              </a:p>
+            </p:txBody>
+          </p:sp>
+        </mc:Choice>
+        <mc:Fallback>
+          <p:sp>
+            <p:nvSpPr>
+              <p:cNvPr id="13" name="ZoneTexte 12">
+                <a:extLst>
+                  <a:ext uri="{FF2B5EF4-FFF2-40B4-BE49-F238E27FC236}">
+                    <a16:creationId xmlns:a16="http://schemas.microsoft.com/office/drawing/2014/main" id="{67C71F0A-70DE-B87C-7E2D-EF1061F36C38}"/>
+                  </a:ext>
+                </a:extLst>
+              </p:cNvPr>
+              <p:cNvSpPr txBox="1">
+                <a:spLocks noRot="1" noChangeAspect="1" noMove="1" noResize="1" noEditPoints="1" noAdjustHandles="1" noChangeArrowheads="1" noChangeShapeType="1" noTextEdit="1"/>
+              </p:cNvSpPr>
+              <p:nvPr/>
+            </p:nvSpPr>
+            <p:spPr>
+              <a:xfrm>
+                <a:off x="201251" y="4163402"/>
+                <a:ext cx="6218210" cy="3287375"/>
+              </a:xfrm>
+              <a:prstGeom prst="rect">
+                <a:avLst/>
+              </a:prstGeom>
+              <a:blipFill>
+                <a:blip r:embed="rId4"/>
+                <a:stretch>
+                  <a:fillRect l="-294" t="-371" r="-980"/>
+                </a:stretch>
+              </a:blipFill>
+            </p:spPr>
+            <p:txBody>
+              <a:bodyPr/>
+              <a:lstStyle/>
+              <a:p>
+                <a:r>
+                  <a:rPr lang="fr-FR">
+                    <a:noFill/>
+                  </a:rPr>
+                  <a:t> </a:t>
+                </a:r>
+              </a:p>
+            </p:txBody>
+          </p:sp>
+        </mc:Fallback>
+      </mc:AlternateContent>
     </p:spTree>
     <p:extLst>
       <p:ext uri="{BB962C8B-B14F-4D97-AF65-F5344CB8AC3E}">
@@ -7623,7 +7661,7 @@
           <a:bodyPr/>
           <a:lstStyle/>
           <a:p>
-            <a:endParaRPr lang="fr-FR"/>
+            <a:endParaRPr lang="en-US" noProof="0" dirty="0"/>
           </a:p>
         </p:txBody>
       </p:sp>
@@ -7648,7 +7686,7 @@
           <a:bodyPr/>
           <a:lstStyle/>
           <a:p>
-            <a:endParaRPr lang="fr-FR"/>
+            <a:endParaRPr lang="en-US" noProof="0" dirty="0"/>
           </a:p>
         </p:txBody>
       </p:sp>
@@ -7681,19 +7719,19 @@
           <a:lstStyle/>
           <a:p>
             <a:r>
-              <a:rPr lang="fr-FR" sz="1200" dirty="0">
+              <a:rPr lang="en-US" sz="1200" noProof="0" dirty="0">
                 <a:latin typeface="Abadi" panose="020B0604020104020204" pitchFamily="34" charset="0"/>
               </a:rPr>
               <a:t>HAMADI </a:t>
             </a:r>
             <a:r>
-              <a:rPr lang="fr-FR" sz="1200" dirty="0" err="1">
+              <a:rPr lang="en-US" sz="1200" noProof="0" dirty="0" err="1">
                 <a:latin typeface="Abadi" panose="020B0604020104020204" pitchFamily="34" charset="0"/>
               </a:rPr>
               <a:t>Maoulida</a:t>
             </a:r>
             <a:r>
-              <a:rPr lang="fr-FR" sz="1200" dirty="0">
+              <a:rPr lang="en-US" sz="1200" noProof="0" dirty="0">
                 <a:latin typeface="Abadi" panose="020B0604020104020204" pitchFamily="34" charset="0"/>
               </a:rPr>
               <a:t> - TARTERA Maëlys</a:t>
@@ -7767,7 +7805,7 @@
           <a:lstStyle/>
           <a:p>
             <a:r>
-              <a:rPr lang="fr-FR" dirty="0"/>
+              <a:rPr lang="en-US" noProof="0" dirty="0"/>
               <a:t>5</a:t>
             </a:r>
           </a:p>
@@ -7921,32 +7959,11 @@
           <a:lstStyle/>
           <a:p>
             <a:r>
-              <a:rPr lang="fr-FR" b="1" dirty="0">
+              <a:rPr lang="en-US" b="1" noProof="0" dirty="0">
                 <a:latin typeface="Abadi" panose="020B0604020104020204" pitchFamily="34" charset="0"/>
               </a:rPr>
-              <a:t>GT-LGT2803-Low Tech Graphite </a:t>
-            </a:r>
-            <a:r>
-              <a:rPr lang="fr-FR" b="1" dirty="0" err="1">
-                <a:latin typeface="Abadi" panose="020B0604020104020204" pitchFamily="34" charset="0"/>
-              </a:rPr>
-              <a:t>Strain</a:t>
-            </a:r>
-            <a:r>
-              <a:rPr lang="fr-FR" b="1" dirty="0">
-                <a:latin typeface="Abadi" panose="020B0604020104020204" pitchFamily="34" charset="0"/>
-              </a:rPr>
-              <a:t> </a:t>
-            </a:r>
-            <a:r>
-              <a:rPr lang="fr-FR" b="1" dirty="0" err="1">
-                <a:latin typeface="Abadi" panose="020B0604020104020204" pitchFamily="34" charset="0"/>
-              </a:rPr>
-              <a:t>Sensor</a:t>
-            </a:r>
-            <a:endParaRPr lang="fr-FR" b="1" dirty="0">
-              <a:latin typeface="Abadi" panose="020B0604020104020204" pitchFamily="34" charset="0"/>
-            </a:endParaRPr>
+              <a:t>GT-LGT2803-Low Tech Graphite Strain Sensor</a:t>
+            </a:r>
           </a:p>
         </p:txBody>
       </p:sp>

</xml_diff>

<commit_message>
Rajout images sur le README
</commit_message>
<xml_diff>
--- a/Datasheet/Datasheet_capteur_2025.pptx
+++ b/Datasheet/Datasheet_capteur_2025.pptx
@@ -247,7 +247,7 @@
           <a:p>
             <a:fld id="{E030C13D-1992-4B2B-B408-E2F8B4A6D092}" type="datetimeFigureOut">
               <a:rPr lang="fr-FR" smtClean="0"/>
-              <a:t>29/03/2025</a:t>
+              <a:t>11/04/2025</a:t>
             </a:fld>
             <a:endParaRPr lang="fr-FR"/>
           </a:p>
@@ -417,7 +417,7 @@
           <a:p>
             <a:fld id="{E030C13D-1992-4B2B-B408-E2F8B4A6D092}" type="datetimeFigureOut">
               <a:rPr lang="fr-FR" smtClean="0"/>
-              <a:t>29/03/2025</a:t>
+              <a:t>11/04/2025</a:t>
             </a:fld>
             <a:endParaRPr lang="fr-FR"/>
           </a:p>
@@ -597,7 +597,7 @@
           <a:p>
             <a:fld id="{E030C13D-1992-4B2B-B408-E2F8B4A6D092}" type="datetimeFigureOut">
               <a:rPr lang="fr-FR" smtClean="0"/>
-              <a:t>29/03/2025</a:t>
+              <a:t>11/04/2025</a:t>
             </a:fld>
             <a:endParaRPr lang="fr-FR"/>
           </a:p>
@@ -767,7 +767,7 @@
           <a:p>
             <a:fld id="{E030C13D-1992-4B2B-B408-E2F8B4A6D092}" type="datetimeFigureOut">
               <a:rPr lang="fr-FR" smtClean="0"/>
-              <a:t>29/03/2025</a:t>
+              <a:t>11/04/2025</a:t>
             </a:fld>
             <a:endParaRPr lang="fr-FR"/>
           </a:p>
@@ -1013,7 +1013,7 @@
           <a:p>
             <a:fld id="{E030C13D-1992-4B2B-B408-E2F8B4A6D092}" type="datetimeFigureOut">
               <a:rPr lang="fr-FR" smtClean="0"/>
-              <a:t>29/03/2025</a:t>
+              <a:t>11/04/2025</a:t>
             </a:fld>
             <a:endParaRPr lang="fr-FR"/>
           </a:p>
@@ -1245,7 +1245,7 @@
           <a:p>
             <a:fld id="{E030C13D-1992-4B2B-B408-E2F8B4A6D092}" type="datetimeFigureOut">
               <a:rPr lang="fr-FR" smtClean="0"/>
-              <a:t>29/03/2025</a:t>
+              <a:t>11/04/2025</a:t>
             </a:fld>
             <a:endParaRPr lang="fr-FR"/>
           </a:p>
@@ -1612,7 +1612,7 @@
           <a:p>
             <a:fld id="{E030C13D-1992-4B2B-B408-E2F8B4A6D092}" type="datetimeFigureOut">
               <a:rPr lang="fr-FR" smtClean="0"/>
-              <a:t>29/03/2025</a:t>
+              <a:t>11/04/2025</a:t>
             </a:fld>
             <a:endParaRPr lang="fr-FR"/>
           </a:p>
@@ -1730,7 +1730,7 @@
           <a:p>
             <a:fld id="{E030C13D-1992-4B2B-B408-E2F8B4A6D092}" type="datetimeFigureOut">
               <a:rPr lang="fr-FR" smtClean="0"/>
-              <a:t>29/03/2025</a:t>
+              <a:t>11/04/2025</a:t>
             </a:fld>
             <a:endParaRPr lang="fr-FR"/>
           </a:p>
@@ -1825,7 +1825,7 @@
           <a:p>
             <a:fld id="{E030C13D-1992-4B2B-B408-E2F8B4A6D092}" type="datetimeFigureOut">
               <a:rPr lang="fr-FR" smtClean="0"/>
-              <a:t>29/03/2025</a:t>
+              <a:t>11/04/2025</a:t>
             </a:fld>
             <a:endParaRPr lang="fr-FR"/>
           </a:p>
@@ -2102,7 +2102,7 @@
           <a:p>
             <a:fld id="{E030C13D-1992-4B2B-B408-E2F8B4A6D092}" type="datetimeFigureOut">
               <a:rPr lang="fr-FR" smtClean="0"/>
-              <a:t>29/03/2025</a:t>
+              <a:t>11/04/2025</a:t>
             </a:fld>
             <a:endParaRPr lang="fr-FR"/>
           </a:p>
@@ -2359,7 +2359,7 @@
           <a:p>
             <a:fld id="{E030C13D-1992-4B2B-B408-E2F8B4A6D092}" type="datetimeFigureOut">
               <a:rPr lang="fr-FR" smtClean="0"/>
-              <a:t>29/03/2025</a:t>
+              <a:t>11/04/2025</a:t>
             </a:fld>
             <a:endParaRPr lang="fr-FR"/>
           </a:p>
@@ -2572,7 +2572,7 @@
           <a:p>
             <a:fld id="{E030C13D-1992-4B2B-B408-E2F8B4A6D092}" type="datetimeFigureOut">
               <a:rPr lang="fr-FR" smtClean="0"/>
-              <a:t>29/03/2025</a:t>
+              <a:t>11/04/2025</a:t>
             </a:fld>
             <a:endParaRPr lang="fr-FR"/>
           </a:p>
@@ -3578,6 +3578,53 @@
           </a:p>
         </p:txBody>
       </p:sp>
+      <p:pic>
+        <p:nvPicPr>
+          <p:cNvPr id="2" name="Picture 2" descr="No description available.">
+            <a:extLst>
+              <a:ext uri="{FF2B5EF4-FFF2-40B4-BE49-F238E27FC236}">
+                <a16:creationId xmlns:a16="http://schemas.microsoft.com/office/drawing/2014/main" id="{40886D57-88FC-1CFD-DC9E-5E0679C170AA}"/>
+              </a:ext>
+            </a:extLst>
+          </p:cNvPr>
+          <p:cNvPicPr>
+            <a:picLocks noChangeAspect="1" noChangeArrowheads="1"/>
+          </p:cNvPicPr>
+          <p:nvPr/>
+        </p:nvPicPr>
+        <p:blipFill>
+          <a:blip r:embed="rId3">
+            <a:extLst>
+              <a:ext uri="{28A0092B-C50C-407E-A947-70E740481C1C}">
+                <a14:useLocalDpi xmlns:a14="http://schemas.microsoft.com/office/drawing/2010/main" val="0"/>
+              </a:ext>
+            </a:extLst>
+          </a:blip>
+          <a:srcRect/>
+          <a:stretch>
+            <a:fillRect/>
+          </a:stretch>
+        </p:blipFill>
+        <p:spPr bwMode="auto">
+          <a:xfrm>
+            <a:off x="4414192" y="2208200"/>
+            <a:ext cx="1872308" cy="1872308"/>
+          </a:xfrm>
+          <a:prstGeom prst="rect">
+            <a:avLst/>
+          </a:prstGeom>
+          <a:noFill/>
+          <a:extLst>
+            <a:ext uri="{909E8E84-426E-40DD-AFC4-6F175D3DCCD1}">
+              <a14:hiddenFill xmlns:a14="http://schemas.microsoft.com/office/drawing/2010/main">
+                <a:solidFill>
+                  <a:srgbClr val="FFFFFF"/>
+                </a:solidFill>
+              </a14:hiddenFill>
+            </a:ext>
+          </a:extLst>
+        </p:spPr>
+      </p:pic>
     </p:spTree>
     <p:extLst>
       <p:ext uri="{BB962C8B-B14F-4D97-AF65-F5344CB8AC3E}">
@@ -7124,8 +7171,8 @@
           </a:prstGeom>
         </p:spPr>
       </p:pic>
-      <mc:AlternateContent xmlns:mc="http://schemas.openxmlformats.org/markup-compatibility/2006">
-        <mc:Choice xmlns:a14="http://schemas.microsoft.com/office/drawing/2010/main" Requires="a14">
+      <mc:AlternateContent xmlns:mc="http://schemas.openxmlformats.org/markup-compatibility/2006" xmlns:a14="http://schemas.microsoft.com/office/drawing/2010/main">
+        <mc:Choice Requires="a14">
           <p:sp>
             <p:nvSpPr>
               <p:cNvPr id="13" name="ZoneTexte 12">
@@ -7565,7 +7612,7 @@
             </p:txBody>
           </p:sp>
         </mc:Choice>
-        <mc:Fallback>
+        <mc:Fallback xmlns="">
           <p:sp>
             <p:nvSpPr>
               <p:cNvPr id="13" name="ZoneTexte 12">

</xml_diff>

<commit_message>
Modification Readme banc de test
</commit_message>
<xml_diff>
--- a/Datasheet/Datasheet_capteur_2025.pptx
+++ b/Datasheet/Datasheet_capteur_2025.pptx
@@ -247,7 +247,7 @@
           <a:p>
             <a:fld id="{E030C13D-1992-4B2B-B408-E2F8B4A6D092}" type="datetimeFigureOut">
               <a:rPr lang="fr-FR" smtClean="0"/>
-              <a:t>11/04/2025</a:t>
+              <a:t>19/05/2025</a:t>
             </a:fld>
             <a:endParaRPr lang="fr-FR"/>
           </a:p>
@@ -417,7 +417,7 @@
           <a:p>
             <a:fld id="{E030C13D-1992-4B2B-B408-E2F8B4A6D092}" type="datetimeFigureOut">
               <a:rPr lang="fr-FR" smtClean="0"/>
-              <a:t>11/04/2025</a:t>
+              <a:t>19/05/2025</a:t>
             </a:fld>
             <a:endParaRPr lang="fr-FR"/>
           </a:p>
@@ -597,7 +597,7 @@
           <a:p>
             <a:fld id="{E030C13D-1992-4B2B-B408-E2F8B4A6D092}" type="datetimeFigureOut">
               <a:rPr lang="fr-FR" smtClean="0"/>
-              <a:t>11/04/2025</a:t>
+              <a:t>19/05/2025</a:t>
             </a:fld>
             <a:endParaRPr lang="fr-FR"/>
           </a:p>
@@ -767,7 +767,7 @@
           <a:p>
             <a:fld id="{E030C13D-1992-4B2B-B408-E2F8B4A6D092}" type="datetimeFigureOut">
               <a:rPr lang="fr-FR" smtClean="0"/>
-              <a:t>11/04/2025</a:t>
+              <a:t>19/05/2025</a:t>
             </a:fld>
             <a:endParaRPr lang="fr-FR"/>
           </a:p>
@@ -1013,7 +1013,7 @@
           <a:p>
             <a:fld id="{E030C13D-1992-4B2B-B408-E2F8B4A6D092}" type="datetimeFigureOut">
               <a:rPr lang="fr-FR" smtClean="0"/>
-              <a:t>11/04/2025</a:t>
+              <a:t>19/05/2025</a:t>
             </a:fld>
             <a:endParaRPr lang="fr-FR"/>
           </a:p>
@@ -1245,7 +1245,7 @@
           <a:p>
             <a:fld id="{E030C13D-1992-4B2B-B408-E2F8B4A6D092}" type="datetimeFigureOut">
               <a:rPr lang="fr-FR" smtClean="0"/>
-              <a:t>11/04/2025</a:t>
+              <a:t>19/05/2025</a:t>
             </a:fld>
             <a:endParaRPr lang="fr-FR"/>
           </a:p>
@@ -1612,7 +1612,7 @@
           <a:p>
             <a:fld id="{E030C13D-1992-4B2B-B408-E2F8B4A6D092}" type="datetimeFigureOut">
               <a:rPr lang="fr-FR" smtClean="0"/>
-              <a:t>11/04/2025</a:t>
+              <a:t>19/05/2025</a:t>
             </a:fld>
             <a:endParaRPr lang="fr-FR"/>
           </a:p>
@@ -1730,7 +1730,7 @@
           <a:p>
             <a:fld id="{E030C13D-1992-4B2B-B408-E2F8B4A6D092}" type="datetimeFigureOut">
               <a:rPr lang="fr-FR" smtClean="0"/>
-              <a:t>11/04/2025</a:t>
+              <a:t>19/05/2025</a:t>
             </a:fld>
             <a:endParaRPr lang="fr-FR"/>
           </a:p>
@@ -1825,7 +1825,7 @@
           <a:p>
             <a:fld id="{E030C13D-1992-4B2B-B408-E2F8B4A6D092}" type="datetimeFigureOut">
               <a:rPr lang="fr-FR" smtClean="0"/>
-              <a:t>11/04/2025</a:t>
+              <a:t>19/05/2025</a:t>
             </a:fld>
             <a:endParaRPr lang="fr-FR"/>
           </a:p>
@@ -2102,7 +2102,7 @@
           <a:p>
             <a:fld id="{E030C13D-1992-4B2B-B408-E2F8B4A6D092}" type="datetimeFigureOut">
               <a:rPr lang="fr-FR" smtClean="0"/>
-              <a:t>11/04/2025</a:t>
+              <a:t>19/05/2025</a:t>
             </a:fld>
             <a:endParaRPr lang="fr-FR"/>
           </a:p>
@@ -2359,7 +2359,7 @@
           <a:p>
             <a:fld id="{E030C13D-1992-4B2B-B408-E2F8B4A6D092}" type="datetimeFigureOut">
               <a:rPr lang="fr-FR" smtClean="0"/>
-              <a:t>11/04/2025</a:t>
+              <a:t>19/05/2025</a:t>
             </a:fld>
             <a:endParaRPr lang="fr-FR"/>
           </a:p>
@@ -2572,7 +2572,7 @@
           <a:p>
             <a:fld id="{E030C13D-1992-4B2B-B408-E2F8B4A6D092}" type="datetimeFigureOut">
               <a:rPr lang="fr-FR" smtClean="0"/>
-              <a:t>11/04/2025</a:t>
+              <a:t>19/05/2025</a:t>
             </a:fld>
             <a:endParaRPr lang="fr-FR"/>
           </a:p>

</xml_diff>

<commit_message>
Modification de la datasheet
</commit_message>
<xml_diff>
--- a/Datasheet/Datasheet_capteur_2025.pptx
+++ b/Datasheet/Datasheet_capteur_2025.pptx
@@ -7194,51 +7194,6 @@
           </a:p>
         </p:txBody>
       </p:sp>
-      <p:pic>
-        <p:nvPicPr>
-          <p:cNvPr id="1026" name="Picture 2" descr="var_R/RO_crayons">
-            <a:extLst>
-              <a:ext uri="{FF2B5EF4-FFF2-40B4-BE49-F238E27FC236}">
-                <a16:creationId xmlns:a16="http://schemas.microsoft.com/office/drawing/2014/main" id="{425D0CA8-FB5B-A774-EF68-3649DC975538}"/>
-              </a:ext>
-            </a:extLst>
-          </p:cNvPr>
-          <p:cNvPicPr>
-            <a:picLocks noChangeAspect="1" noChangeArrowheads="1"/>
-          </p:cNvPicPr>
-          <p:nvPr/>
-        </p:nvPicPr>
-        <p:blipFill rotWithShape="1">
-          <a:blip r:embed="rId4">
-            <a:extLst>
-              <a:ext uri="{28A0092B-C50C-407E-A947-70E740481C1C}">
-                <a14:useLocalDpi xmlns:a14="http://schemas.microsoft.com/office/drawing/2010/main" val="0"/>
-              </a:ext>
-            </a:extLst>
-          </a:blip>
-          <a:srcRect t="10486"/>
-          <a:stretch/>
-        </p:blipFill>
-        <p:spPr bwMode="auto">
-          <a:xfrm>
-            <a:off x="605873" y="5061094"/>
-            <a:ext cx="5505450" cy="4143769"/>
-          </a:xfrm>
-          <a:prstGeom prst="rect">
-            <a:avLst/>
-          </a:prstGeom>
-          <a:noFill/>
-          <a:extLst>
-            <a:ext uri="{909E8E84-426E-40DD-AFC4-6F175D3DCCD1}">
-              <a14:hiddenFill xmlns:a14="http://schemas.microsoft.com/office/drawing/2010/main">
-                <a:solidFill>
-                  <a:srgbClr val="FFFFFF"/>
-                </a:solidFill>
-              </a14:hiddenFill>
-            </a:ext>
-          </a:extLst>
-        </p:spPr>
-      </p:pic>
       <p:sp>
         <p:nvSpPr>
           <p:cNvPr id="2" name="ZoneTexte 1">
@@ -7407,8 +7362,8 @@
           </a:p>
         </p:txBody>
       </p:sp>
-      <mc:AlternateContent xmlns:mc="http://schemas.openxmlformats.org/markup-compatibility/2006">
-        <mc:Choice xmlns:a14="http://schemas.microsoft.com/office/drawing/2010/main" Requires="a14">
+      <mc:AlternateContent xmlns:mc="http://schemas.openxmlformats.org/markup-compatibility/2006" xmlns:a14="http://schemas.microsoft.com/office/drawing/2010/main">
+        <mc:Choice Requires="a14">
           <p:graphicFrame>
             <p:nvGraphicFramePr>
               <p:cNvPr id="8" name="Tableau 7">
@@ -9721,7 +9676,7 @@
             </a:graphic>
           </p:graphicFrame>
         </mc:Choice>
-        <mc:Fallback>
+        <mc:Fallback xmlns="">
           <p:graphicFrame>
             <p:nvGraphicFramePr>
               <p:cNvPr id="8" name="Tableau 7">
@@ -11846,6 +11801,36 @@
           </p:graphicFrame>
         </mc:Fallback>
       </mc:AlternateContent>
+      <p:pic>
+        <p:nvPicPr>
+          <p:cNvPr id="16" name="Image 15">
+            <a:extLst>
+              <a:ext uri="{FF2B5EF4-FFF2-40B4-BE49-F238E27FC236}">
+                <a16:creationId xmlns:a16="http://schemas.microsoft.com/office/drawing/2014/main" id="{20CA7617-BCF0-F29B-6542-B49AEB8E2C7D}"/>
+              </a:ext>
+            </a:extLst>
+          </p:cNvPr>
+          <p:cNvPicPr>
+            <a:picLocks noChangeAspect="1"/>
+          </p:cNvPicPr>
+          <p:nvPr/>
+        </p:nvPicPr>
+        <p:blipFill>
+          <a:blip r:embed="rId6"/>
+          <a:stretch>
+            <a:fillRect/>
+          </a:stretch>
+        </p:blipFill>
+        <p:spPr>
+          <a:xfrm>
+            <a:off x="1075399" y="5161100"/>
+            <a:ext cx="4566397" cy="3793622"/>
+          </a:xfrm>
+          <a:prstGeom prst="rect">
+            <a:avLst/>
+          </a:prstGeom>
+        </p:spPr>
+      </p:pic>
     </p:spTree>
     <p:extLst>
       <p:ext uri="{BB962C8B-B14F-4D97-AF65-F5344CB8AC3E}">

</xml_diff>

<commit_message>
Modification une ligne de la datasheet
</commit_message>
<xml_diff>
--- a/Datasheet/Datasheet_capteur_2025.pptx
+++ b/Datasheet/Datasheet_capteur_2025.pptx
@@ -7317,6 +7317,30 @@
             </a:r>
             <a:r>
               <a:rPr lang="fr-FR" sz="900" i="1" dirty="0"/>
+              <a:t>=compressive </a:t>
+            </a:r>
+            <a:r>
+              <a:rPr lang="fr-FR" sz="900" i="1" dirty="0" err="1"/>
+              <a:t>strain</a:t>
+            </a:r>
+            <a:r>
+              <a:rPr lang="fr-FR" sz="900" i="1" dirty="0"/>
+              <a:t> &amp; </a:t>
+            </a:r>
+            <a:r>
+              <a:rPr lang="fr-FR" sz="900" i="1" dirty="0" err="1"/>
+              <a:t>negative</a:t>
+            </a:r>
+            <a:r>
+              <a:rPr lang="fr-FR" sz="900" i="1" dirty="0"/>
+              <a:t> </a:t>
+            </a:r>
+            <a:r>
+              <a:rPr lang="fr-FR" sz="900" i="1" dirty="0" err="1"/>
+              <a:t>strain</a:t>
+            </a:r>
+            <a:r>
+              <a:rPr lang="fr-FR" sz="900" i="1" dirty="0"/>
               <a:t>=</a:t>
             </a:r>
             <a:r>
@@ -7326,30 +7350,6 @@
             <a:r>
               <a:rPr lang="fr-FR" sz="900" i="1" dirty="0"/>
               <a:t> </a:t>
-            </a:r>
-            <a:r>
-              <a:rPr lang="fr-FR" sz="900" i="1" dirty="0" err="1"/>
-              <a:t>strain</a:t>
-            </a:r>
-            <a:r>
-              <a:rPr lang="fr-FR" sz="900" i="1" dirty="0"/>
-              <a:t> &amp; </a:t>
-            </a:r>
-            <a:r>
-              <a:rPr lang="fr-FR" sz="900" i="1" dirty="0" err="1"/>
-              <a:t>negative</a:t>
-            </a:r>
-            <a:r>
-              <a:rPr lang="fr-FR" sz="900" i="1" dirty="0"/>
-              <a:t> </a:t>
-            </a:r>
-            <a:r>
-              <a:rPr lang="fr-FR" sz="900" i="1" dirty="0" err="1"/>
-              <a:t>strain</a:t>
-            </a:r>
-            <a:r>
-              <a:rPr lang="fr-FR" sz="900" i="1" dirty="0"/>
-              <a:t>=compressive </a:t>
             </a:r>
             <a:r>
               <a:rPr lang="fr-FR" sz="900" i="1" dirty="0" err="1"/>

</xml_diff>

<commit_message>
Modification datasheet et code
</commit_message>
<xml_diff>
--- a/Datasheet/Datasheet_capteur_2025.pptx
+++ b/Datasheet/Datasheet_capteur_2025.pptx
@@ -200,7 +200,7 @@
           <a:p>
             <a:fld id="{C1D843DA-A392-4B16-AD22-4E5E3E7ED1AC}" type="datetimeFigureOut">
               <a:rPr lang="fr-FR" smtClean="0"/>
-              <a:t>20/05/2025</a:t>
+              <a:t>23/05/2025</a:t>
             </a:fld>
             <a:endParaRPr lang="fr-FR"/>
           </a:p>
@@ -682,7 +682,7 @@
           <a:p>
             <a:fld id="{E030C13D-1992-4B2B-B408-E2F8B4A6D092}" type="datetimeFigureOut">
               <a:rPr lang="fr-FR" smtClean="0"/>
-              <a:t>20/05/2025</a:t>
+              <a:t>23/05/2025</a:t>
             </a:fld>
             <a:endParaRPr lang="fr-FR"/>
           </a:p>
@@ -852,7 +852,7 @@
           <a:p>
             <a:fld id="{E030C13D-1992-4B2B-B408-E2F8B4A6D092}" type="datetimeFigureOut">
               <a:rPr lang="fr-FR" smtClean="0"/>
-              <a:t>20/05/2025</a:t>
+              <a:t>23/05/2025</a:t>
             </a:fld>
             <a:endParaRPr lang="fr-FR"/>
           </a:p>
@@ -1032,7 +1032,7 @@
           <a:p>
             <a:fld id="{E030C13D-1992-4B2B-B408-E2F8B4A6D092}" type="datetimeFigureOut">
               <a:rPr lang="fr-FR" smtClean="0"/>
-              <a:t>20/05/2025</a:t>
+              <a:t>23/05/2025</a:t>
             </a:fld>
             <a:endParaRPr lang="fr-FR"/>
           </a:p>
@@ -1202,7 +1202,7 @@
           <a:p>
             <a:fld id="{E030C13D-1992-4B2B-B408-E2F8B4A6D092}" type="datetimeFigureOut">
               <a:rPr lang="fr-FR" smtClean="0"/>
-              <a:t>20/05/2025</a:t>
+              <a:t>23/05/2025</a:t>
             </a:fld>
             <a:endParaRPr lang="fr-FR"/>
           </a:p>
@@ -1448,7 +1448,7 @@
           <a:p>
             <a:fld id="{E030C13D-1992-4B2B-B408-E2F8B4A6D092}" type="datetimeFigureOut">
               <a:rPr lang="fr-FR" smtClean="0"/>
-              <a:t>20/05/2025</a:t>
+              <a:t>23/05/2025</a:t>
             </a:fld>
             <a:endParaRPr lang="fr-FR"/>
           </a:p>
@@ -1680,7 +1680,7 @@
           <a:p>
             <a:fld id="{E030C13D-1992-4B2B-B408-E2F8B4A6D092}" type="datetimeFigureOut">
               <a:rPr lang="fr-FR" smtClean="0"/>
-              <a:t>20/05/2025</a:t>
+              <a:t>23/05/2025</a:t>
             </a:fld>
             <a:endParaRPr lang="fr-FR"/>
           </a:p>
@@ -2047,7 +2047,7 @@
           <a:p>
             <a:fld id="{E030C13D-1992-4B2B-B408-E2F8B4A6D092}" type="datetimeFigureOut">
               <a:rPr lang="fr-FR" smtClean="0"/>
-              <a:t>20/05/2025</a:t>
+              <a:t>23/05/2025</a:t>
             </a:fld>
             <a:endParaRPr lang="fr-FR"/>
           </a:p>
@@ -2165,7 +2165,7 @@
           <a:p>
             <a:fld id="{E030C13D-1992-4B2B-B408-E2F8B4A6D092}" type="datetimeFigureOut">
               <a:rPr lang="fr-FR" smtClean="0"/>
-              <a:t>20/05/2025</a:t>
+              <a:t>23/05/2025</a:t>
             </a:fld>
             <a:endParaRPr lang="fr-FR"/>
           </a:p>
@@ -2260,7 +2260,7 @@
           <a:p>
             <a:fld id="{E030C13D-1992-4B2B-B408-E2F8B4A6D092}" type="datetimeFigureOut">
               <a:rPr lang="fr-FR" smtClean="0"/>
-              <a:t>20/05/2025</a:t>
+              <a:t>23/05/2025</a:t>
             </a:fld>
             <a:endParaRPr lang="fr-FR"/>
           </a:p>
@@ -2537,7 +2537,7 @@
           <a:p>
             <a:fld id="{E030C13D-1992-4B2B-B408-E2F8B4A6D092}" type="datetimeFigureOut">
               <a:rPr lang="fr-FR" smtClean="0"/>
-              <a:t>20/05/2025</a:t>
+              <a:t>23/05/2025</a:t>
             </a:fld>
             <a:endParaRPr lang="fr-FR"/>
           </a:p>
@@ -2794,7 +2794,7 @@
           <a:p>
             <a:fld id="{E030C13D-1992-4B2B-B408-E2F8B4A6D092}" type="datetimeFigureOut">
               <a:rPr lang="fr-FR" smtClean="0"/>
-              <a:t>20/05/2025</a:t>
+              <a:t>23/05/2025</a:t>
             </a:fld>
             <a:endParaRPr lang="fr-FR"/>
           </a:p>
@@ -3007,7 +3007,7 @@
           <a:p>
             <a:fld id="{E030C13D-1992-4B2B-B408-E2F8B4A6D092}" type="datetimeFigureOut">
               <a:rPr lang="fr-FR" smtClean="0"/>
-              <a:t>20/05/2025</a:t>
+              <a:t>23/05/2025</a:t>
             </a:fld>
             <a:endParaRPr lang="fr-FR"/>
           </a:p>
@@ -7379,7 +7379,7 @@
               <p:nvPr>
                 <p:extLst>
                   <p:ext uri="{D42A27DB-BD31-4B8C-83A1-F6EECF244321}">
-                    <p14:modId xmlns:p14="http://schemas.microsoft.com/office/powerpoint/2010/main" val="963410585"/>
+                    <p14:modId xmlns:p14="http://schemas.microsoft.com/office/powerpoint/2010/main" val="2152663897"/>
                   </p:ext>
                 </p:extLst>
               </p:nvPr>
@@ -7896,7 +7896,7 @@
                           <a:pPr algn="ctr"/>
                           <a:r>
                             <a:rPr lang="fr-FR" dirty="0"/>
-                            <a:t>3.0</a:t>
+                            <a:t>5.0</a:t>
                           </a:r>
                         </a:p>
                       </a:txBody>
@@ -8008,7 +8008,7 @@
                           <a:pPr algn="ctr"/>
                           <a:r>
                             <a:rPr lang="fr-FR" dirty="0"/>
-                            <a:t>7.0</a:t>
+                            <a:t>5.0</a:t>
                           </a:r>
                         </a:p>
                       </a:txBody>
@@ -9692,7 +9692,7 @@
               <p:nvPr>
                 <p:extLst>
                   <p:ext uri="{D42A27DB-BD31-4B8C-83A1-F6EECF244321}">
-                    <p14:modId xmlns:p14="http://schemas.microsoft.com/office/powerpoint/2010/main" val="963410585"/>
+                    <p14:modId xmlns:p14="http://schemas.microsoft.com/office/powerpoint/2010/main" val="2152663897"/>
                   </p:ext>
                 </p:extLst>
               </p:nvPr>
@@ -10209,7 +10209,7 @@
                           <a:pPr algn="ctr"/>
                           <a:r>
                             <a:rPr lang="fr-FR" dirty="0"/>
-                            <a:t>3.0</a:t>
+                            <a:t>5.0</a:t>
                           </a:r>
                         </a:p>
                       </a:txBody>
@@ -10321,7 +10321,7 @@
                           <a:pPr algn="ctr"/>
                           <a:r>
                             <a:rPr lang="fr-FR" dirty="0"/>
-                            <a:t>7.0</a:t>
+                            <a:t>5.0</a:t>
                           </a:r>
                         </a:p>
                       </a:txBody>

</xml_diff>